<commit_message>
add what I think *might* be what Dr. Clement wanted--good suggestions, by the way
</commit_message>
<xml_diff>
--- a/thesis_presentation/How to Make the Internet Faster.pptx
+++ b/thesis_presentation/How to Make the Internet Faster.pptx
@@ -5,11 +5,16 @@
     <p:sldMasterId id="2147483648" r:id="rId1"/>
   </p:sldMasterIdLst>
   <p:notesMasterIdLst>
-    <p:notesMasterId r:id="rId4"/>
+    <p:notesMasterId r:id="rId9"/>
   </p:notesMasterIdLst>
   <p:sldIdLst>
     <p:sldId id="256" r:id="rId2"/>
     <p:sldId id="257" r:id="rId3"/>
+    <p:sldId id="258" r:id="rId4"/>
+    <p:sldId id="259" r:id="rId5"/>
+    <p:sldId id="260" r:id="rId6"/>
+    <p:sldId id="261" r:id="rId7"/>
+    <p:sldId id="262" r:id="rId8"/>
   </p:sldIdLst>
   <p:sldSz cx="9144000" cy="6858000" type="screen4x3"/>
   <p:notesSz cx="6858000" cy="9144000"/>
@@ -193,7 +198,8 @@
           <a:p>
             <a:fld id="{9826D637-6924-4A4F-8550-0E64EF887888}" type="datetimeFigureOut">
               <a:rPr lang="en-US" smtClean="0"/>
-              <a:t>3/26/2010</a:t>
+              <a:pPr/>
+              <a:t>4/1/2010</a:t>
             </a:fld>
             <a:endParaRPr lang="en-US"/>
           </a:p>
@@ -354,6 +360,7 @@
           <a:p>
             <a:fld id="{CFD85767-B34F-4122-8642-982296400DCD}" type="slidenum">
               <a:rPr lang="en-US" smtClean="0"/>
+              <a:pPr/>
               <a:t>‹#›</a:t>
             </a:fld>
             <a:endParaRPr lang="en-US"/>
@@ -506,7 +513,93 @@
           <a:p>
             <a:r>
               <a:rPr lang="en-US" dirty="0" smtClean="0"/>
-              <a:t>Disk: not enough of it.</a:t>
+              <a:t>When the server can’t</a:t>
+            </a:r>
+            <a:endParaRPr lang="en-US" dirty="0"/>
+          </a:p>
+        </p:txBody>
+      </p:sp>
+      <p:sp>
+        <p:nvSpPr>
+          <p:cNvPr id="4" name="Slide Number Placeholder 3"/>
+          <p:cNvSpPr>
+            <a:spLocks noGrp="1"/>
+          </p:cNvSpPr>
+          <p:nvPr>
+            <p:ph type="sldNum" sz="quarter" idx="10"/>
+          </p:nvPr>
+        </p:nvSpPr>
+        <p:spPr/>
+        <p:txBody>
+          <a:bodyPr/>
+          <a:lstStyle/>
+          <a:p>
+            <a:fld id="{CFD85767-B34F-4122-8642-982296400DCD}" type="slidenum">
+              <a:rPr lang="en-US" smtClean="0"/>
+              <a:pPr/>
+              <a:t>1</a:t>
+            </a:fld>
+            <a:endParaRPr lang="en-US"/>
+          </a:p>
+        </p:txBody>
+      </p:sp>
+    </p:spTree>
+  </p:cSld>
+  <p:clrMapOvr>
+    <a:masterClrMapping/>
+  </p:clrMapOvr>
+</p:notes>
+</file>
+
+<file path=ppt/notesSlides/notesSlide2.xml><?xml version="1.0" encoding="utf-8"?>
+<p:notes xmlns:a="http://schemas.openxmlformats.org/drawingml/2006/main" xmlns:r="http://schemas.openxmlformats.org/officeDocument/2006/relationships" xmlns:p="http://schemas.openxmlformats.org/presentationml/2006/main">
+  <p:cSld>
+    <p:spTree>
+      <p:nvGrpSpPr>
+        <p:cNvPr id="1" name=""/>
+        <p:cNvGrpSpPr/>
+        <p:nvPr/>
+      </p:nvGrpSpPr>
+      <p:grpSpPr>
+        <a:xfrm>
+          <a:off x="0" y="0"/>
+          <a:ext cx="0" cy="0"/>
+          <a:chOff x="0" y="0"/>
+          <a:chExt cx="0" cy="0"/>
+        </a:xfrm>
+      </p:grpSpPr>
+      <p:sp>
+        <p:nvSpPr>
+          <p:cNvPr id="2" name="Slide Image Placeholder 1"/>
+          <p:cNvSpPr>
+            <a:spLocks noGrp="1" noRot="1" noChangeAspect="1"/>
+          </p:cNvSpPr>
+          <p:nvPr>
+            <p:ph type="sldImg"/>
+          </p:nvPr>
+        </p:nvSpPr>
+        <p:spPr/>
+      </p:sp>
+      <p:sp>
+        <p:nvSpPr>
+          <p:cNvPr id="3" name="Notes Placeholder 2"/>
+          <p:cNvSpPr>
+            <a:spLocks noGrp="1"/>
+          </p:cNvSpPr>
+          <p:nvPr>
+            <p:ph type="body" idx="1"/>
+          </p:nvPr>
+        </p:nvSpPr>
+        <p:spPr/>
+        <p:txBody>
+          <a:bodyPr>
+            <a:normAutofit/>
+          </a:bodyPr>
+          <a:lstStyle/>
+          <a:p>
+            <a:r>
+              <a:rPr lang="en-US" dirty="0" smtClean="0"/>
+              <a:t>What options do you have?</a:t>
             </a:r>
           </a:p>
           <a:p>
@@ -515,24 +608,22 @@
           <a:p>
             <a:r>
               <a:rPr lang="en-US" dirty="0" smtClean="0"/>
-              <a:t>Server bottleneck *can* become bandwidth, </a:t>
-            </a:r>
-            <a:r>
-              <a:rPr lang="en-US" smtClean="0"/>
-              <a:t>[when?] which </a:t>
-            </a:r>
-            <a:r>
-              <a:rPr lang="en-US" dirty="0" err="1" smtClean="0"/>
-              <a:t>ain’t</a:t>
-            </a:r>
+              <a:t>Go and do something else.</a:t>
+            </a:r>
+          </a:p>
+          <a:p>
+            <a:endParaRPr lang="en-US" dirty="0" smtClean="0"/>
+          </a:p>
+          <a:p>
             <a:r>
               <a:rPr lang="en-US" dirty="0" smtClean="0"/>
-              <a:t> yours. (new slide).</a:t>
+              <a:t>Add</a:t>
             </a:r>
             <a:r>
               <a:rPr lang="en-US" baseline="0" dirty="0" smtClean="0"/>
-              <a:t>  Servers can also get slammed</a:t>
-            </a:r>
+              <a:t> a graph of network speed increasing so slowly compared to processors [?]</a:t>
+            </a:r>
+            <a:endParaRPr lang="en-US" dirty="0" smtClean="0"/>
           </a:p>
         </p:txBody>
       </p:sp>
@@ -553,7 +644,397 @@
           <a:p>
             <a:fld id="{CFD85767-B34F-4122-8642-982296400DCD}" type="slidenum">
               <a:rPr lang="en-US" smtClean="0"/>
-              <a:t>2</a:t>
+              <a:pPr/>
+              <a:t>3</a:t>
+            </a:fld>
+            <a:endParaRPr lang="en-US"/>
+          </a:p>
+        </p:txBody>
+      </p:sp>
+    </p:spTree>
+  </p:cSld>
+  <p:clrMapOvr>
+    <a:masterClrMapping/>
+  </p:clrMapOvr>
+</p:notes>
+</file>
+
+<file path=ppt/notesSlides/notesSlide3.xml><?xml version="1.0" encoding="utf-8"?>
+<p:notes xmlns:a="http://schemas.openxmlformats.org/drawingml/2006/main" xmlns:r="http://schemas.openxmlformats.org/officeDocument/2006/relationships" xmlns:p="http://schemas.openxmlformats.org/presentationml/2006/main">
+  <p:cSld>
+    <p:spTree>
+      <p:nvGrpSpPr>
+        <p:cNvPr id="1" name=""/>
+        <p:cNvGrpSpPr/>
+        <p:nvPr/>
+      </p:nvGrpSpPr>
+      <p:grpSpPr>
+        <a:xfrm>
+          <a:off x="0" y="0"/>
+          <a:ext cx="0" cy="0"/>
+          <a:chOff x="0" y="0"/>
+          <a:chExt cx="0" cy="0"/>
+        </a:xfrm>
+      </p:grpSpPr>
+      <p:sp>
+        <p:nvSpPr>
+          <p:cNvPr id="2" name="Slide Image Placeholder 1"/>
+          <p:cNvSpPr>
+            <a:spLocks noGrp="1" noRot="1" noChangeAspect="1"/>
+          </p:cNvSpPr>
+          <p:nvPr>
+            <p:ph type="sldImg"/>
+          </p:nvPr>
+        </p:nvSpPr>
+        <p:spPr/>
+      </p:sp>
+      <p:sp>
+        <p:nvSpPr>
+          <p:cNvPr id="3" name="Notes Placeholder 2"/>
+          <p:cNvSpPr>
+            <a:spLocks noGrp="1"/>
+          </p:cNvSpPr>
+          <p:nvPr>
+            <p:ph type="body" idx="1"/>
+          </p:nvPr>
+        </p:nvSpPr>
+        <p:spPr/>
+        <p:txBody>
+          <a:bodyPr>
+            <a:normAutofit/>
+          </a:bodyPr>
+          <a:lstStyle/>
+          <a:p>
+            <a:r>
+              <a:rPr lang="en-US" dirty="0" smtClean="0"/>
+              <a:t>Download manager—for me speeds things up, but</a:t>
+            </a:r>
+            <a:r>
+              <a:rPr lang="en-US" baseline="0" dirty="0" smtClean="0"/>
+              <a:t> hard to use because not integrated, also the server might run out </a:t>
+            </a:r>
+            <a:r>
+              <a:rPr lang="en-US" baseline="0" smtClean="0"/>
+              <a:t>of bandwidth.</a:t>
+            </a:r>
+            <a:endParaRPr lang="en-US" dirty="0"/>
+          </a:p>
+        </p:txBody>
+      </p:sp>
+      <p:sp>
+        <p:nvSpPr>
+          <p:cNvPr id="4" name="Slide Number Placeholder 3"/>
+          <p:cNvSpPr>
+            <a:spLocks noGrp="1"/>
+          </p:cNvSpPr>
+          <p:nvPr>
+            <p:ph type="sldNum" sz="quarter" idx="10"/>
+          </p:nvPr>
+        </p:nvSpPr>
+        <p:spPr/>
+        <p:txBody>
+          <a:bodyPr/>
+          <a:lstStyle/>
+          <a:p>
+            <a:fld id="{CFD85767-B34F-4122-8642-982296400DCD}" type="slidenum">
+              <a:rPr lang="en-US" smtClean="0"/>
+              <a:pPr/>
+              <a:t>4</a:t>
+            </a:fld>
+            <a:endParaRPr lang="en-US"/>
+          </a:p>
+        </p:txBody>
+      </p:sp>
+    </p:spTree>
+  </p:cSld>
+  <p:clrMapOvr>
+    <a:masterClrMapping/>
+  </p:clrMapOvr>
+</p:notes>
+</file>
+
+<file path=ppt/notesSlides/notesSlide4.xml><?xml version="1.0" encoding="utf-8"?>
+<p:notes xmlns:a="http://schemas.openxmlformats.org/drawingml/2006/main" xmlns:r="http://schemas.openxmlformats.org/officeDocument/2006/relationships" xmlns:p="http://schemas.openxmlformats.org/presentationml/2006/main">
+  <p:cSld>
+    <p:spTree>
+      <p:nvGrpSpPr>
+        <p:cNvPr id="1" name=""/>
+        <p:cNvGrpSpPr/>
+        <p:nvPr/>
+      </p:nvGrpSpPr>
+      <p:grpSpPr>
+        <a:xfrm>
+          <a:off x="0" y="0"/>
+          <a:ext cx="0" cy="0"/>
+          <a:chOff x="0" y="0"/>
+          <a:chExt cx="0" cy="0"/>
+        </a:xfrm>
+      </p:grpSpPr>
+      <p:sp>
+        <p:nvSpPr>
+          <p:cNvPr id="2" name="Slide Image Placeholder 1"/>
+          <p:cNvSpPr>
+            <a:spLocks noGrp="1" noRot="1" noChangeAspect="1"/>
+          </p:cNvSpPr>
+          <p:nvPr>
+            <p:ph type="sldImg"/>
+          </p:nvPr>
+        </p:nvSpPr>
+        <p:spPr/>
+      </p:sp>
+      <p:sp>
+        <p:nvSpPr>
+          <p:cNvPr id="3" name="Notes Placeholder 2"/>
+          <p:cNvSpPr>
+            <a:spLocks noGrp="1"/>
+          </p:cNvSpPr>
+          <p:nvPr>
+            <p:ph type="body" idx="1"/>
+          </p:nvPr>
+        </p:nvSpPr>
+        <p:spPr/>
+        <p:txBody>
+          <a:bodyPr>
+            <a:normAutofit/>
+          </a:bodyPr>
+          <a:lstStyle/>
+          <a:p>
+            <a:r>
+              <a:rPr lang="en-US" dirty="0" smtClean="0"/>
+              <a:t>More servers closer to you.</a:t>
+            </a:r>
+            <a:endParaRPr lang="en-US" dirty="0"/>
+          </a:p>
+        </p:txBody>
+      </p:sp>
+      <p:sp>
+        <p:nvSpPr>
+          <p:cNvPr id="4" name="Slide Number Placeholder 3"/>
+          <p:cNvSpPr>
+            <a:spLocks noGrp="1"/>
+          </p:cNvSpPr>
+          <p:nvPr>
+            <p:ph type="sldNum" sz="quarter" idx="10"/>
+          </p:nvPr>
+        </p:nvSpPr>
+        <p:spPr/>
+        <p:txBody>
+          <a:bodyPr/>
+          <a:lstStyle/>
+          <a:p>
+            <a:fld id="{CFD85767-B34F-4122-8642-982296400DCD}" type="slidenum">
+              <a:rPr lang="en-US" smtClean="0"/>
+              <a:pPr/>
+              <a:t>5</a:t>
+            </a:fld>
+            <a:endParaRPr lang="en-US"/>
+          </a:p>
+        </p:txBody>
+      </p:sp>
+    </p:spTree>
+  </p:cSld>
+  <p:clrMapOvr>
+    <a:masterClrMapping/>
+  </p:clrMapOvr>
+</p:notes>
+</file>
+
+<file path=ppt/notesSlides/notesSlide5.xml><?xml version="1.0" encoding="utf-8"?>
+<p:notes xmlns:a="http://schemas.openxmlformats.org/drawingml/2006/main" xmlns:r="http://schemas.openxmlformats.org/officeDocument/2006/relationships" xmlns:p="http://schemas.openxmlformats.org/presentationml/2006/main">
+  <p:cSld>
+    <p:spTree>
+      <p:nvGrpSpPr>
+        <p:cNvPr id="1" name=""/>
+        <p:cNvGrpSpPr/>
+        <p:nvPr/>
+      </p:nvGrpSpPr>
+      <p:grpSpPr>
+        <a:xfrm>
+          <a:off x="0" y="0"/>
+          <a:ext cx="0" cy="0"/>
+          <a:chOff x="0" y="0"/>
+          <a:chExt cx="0" cy="0"/>
+        </a:xfrm>
+      </p:grpSpPr>
+      <p:sp>
+        <p:nvSpPr>
+          <p:cNvPr id="2" name="Slide Image Placeholder 1"/>
+          <p:cNvSpPr>
+            <a:spLocks noGrp="1" noRot="1" noChangeAspect="1"/>
+          </p:cNvSpPr>
+          <p:nvPr>
+            <p:ph type="sldImg"/>
+          </p:nvPr>
+        </p:nvSpPr>
+        <p:spPr/>
+      </p:sp>
+      <p:sp>
+        <p:nvSpPr>
+          <p:cNvPr id="3" name="Notes Placeholder 2"/>
+          <p:cNvSpPr>
+            <a:spLocks noGrp="1"/>
+          </p:cNvSpPr>
+          <p:nvPr>
+            <p:ph type="body" idx="1"/>
+          </p:nvPr>
+        </p:nvSpPr>
+        <p:spPr/>
+        <p:txBody>
+          <a:bodyPr>
+            <a:normAutofit/>
+          </a:bodyPr>
+          <a:lstStyle/>
+          <a:p>
+            <a:r>
+              <a:rPr lang="en-US" dirty="0" smtClean="0"/>
+              <a:t>TODO: pictures</a:t>
+            </a:r>
+          </a:p>
+          <a:p>
+            <a:endParaRPr lang="en-US" dirty="0" smtClean="0"/>
+          </a:p>
+          <a:p>
+            <a:r>
+              <a:rPr lang="en-US" dirty="0" smtClean="0"/>
+              <a:t>Barrier: not just the client, but you don’t know if using the client will actually be faster.  Many times it isn’t.</a:t>
+            </a:r>
+          </a:p>
+          <a:p>
+            <a:r>
+              <a:rPr lang="en-US" dirty="0" smtClean="0"/>
+              <a:t>And some</a:t>
+            </a:r>
+            <a:r>
+              <a:rPr lang="en-US" baseline="0" dirty="0" smtClean="0"/>
+              <a:t> sites don’t offer P2P.</a:t>
+            </a:r>
+          </a:p>
+          <a:p>
+            <a:endParaRPr lang="en-US" baseline="0" dirty="0" smtClean="0"/>
+          </a:p>
+          <a:p>
+            <a:r>
+              <a:rPr lang="en-US" baseline="0" dirty="0" smtClean="0"/>
+              <a:t>Technology is there but not easily accessible.</a:t>
+            </a:r>
+          </a:p>
+          <a:p>
+            <a:endParaRPr lang="en-US" baseline="0" dirty="0" smtClean="0"/>
+          </a:p>
+          <a:p>
+            <a:r>
+              <a:rPr lang="en-US" baseline="0" dirty="0" smtClean="0"/>
+              <a:t>How many sites actually offer you that stuff?</a:t>
+            </a:r>
+            <a:endParaRPr lang="en-US" dirty="0"/>
+          </a:p>
+        </p:txBody>
+      </p:sp>
+      <p:sp>
+        <p:nvSpPr>
+          <p:cNvPr id="4" name="Slide Number Placeholder 3"/>
+          <p:cNvSpPr>
+            <a:spLocks noGrp="1"/>
+          </p:cNvSpPr>
+          <p:nvPr>
+            <p:ph type="sldNum" sz="quarter" idx="10"/>
+          </p:nvPr>
+        </p:nvSpPr>
+        <p:spPr/>
+        <p:txBody>
+          <a:bodyPr/>
+          <a:lstStyle/>
+          <a:p>
+            <a:fld id="{CFD85767-B34F-4122-8642-982296400DCD}" type="slidenum">
+              <a:rPr lang="en-US" smtClean="0"/>
+              <a:pPr/>
+              <a:t>6</a:t>
+            </a:fld>
+            <a:endParaRPr lang="en-US"/>
+          </a:p>
+        </p:txBody>
+      </p:sp>
+    </p:spTree>
+  </p:cSld>
+  <p:clrMapOvr>
+    <a:masterClrMapping/>
+  </p:clrMapOvr>
+</p:notes>
+</file>
+
+<file path=ppt/notesSlides/notesSlide6.xml><?xml version="1.0" encoding="utf-8"?>
+<p:notes xmlns:a="http://schemas.openxmlformats.org/drawingml/2006/main" xmlns:r="http://schemas.openxmlformats.org/officeDocument/2006/relationships" xmlns:p="http://schemas.openxmlformats.org/presentationml/2006/main">
+  <p:cSld>
+    <p:spTree>
+      <p:nvGrpSpPr>
+        <p:cNvPr id="1" name=""/>
+        <p:cNvGrpSpPr/>
+        <p:nvPr/>
+      </p:nvGrpSpPr>
+      <p:grpSpPr>
+        <a:xfrm>
+          <a:off x="0" y="0"/>
+          <a:ext cx="0" cy="0"/>
+          <a:chOff x="0" y="0"/>
+          <a:chExt cx="0" cy="0"/>
+        </a:xfrm>
+      </p:grpSpPr>
+      <p:sp>
+        <p:nvSpPr>
+          <p:cNvPr id="2" name="Slide Image Placeholder 1"/>
+          <p:cNvSpPr>
+            <a:spLocks noGrp="1" noRot="1" noChangeAspect="1"/>
+          </p:cNvSpPr>
+          <p:nvPr>
+            <p:ph type="sldImg"/>
+          </p:nvPr>
+        </p:nvSpPr>
+        <p:spPr/>
+      </p:sp>
+      <p:sp>
+        <p:nvSpPr>
+          <p:cNvPr id="3" name="Notes Placeholder 2"/>
+          <p:cNvSpPr>
+            <a:spLocks noGrp="1"/>
+          </p:cNvSpPr>
+          <p:nvPr>
+            <p:ph type="body" idx="1"/>
+          </p:nvPr>
+        </p:nvSpPr>
+        <p:spPr/>
+        <p:txBody>
+          <a:bodyPr>
+            <a:normAutofit/>
+          </a:bodyPr>
+          <a:lstStyle/>
+          <a:p>
+            <a:r>
+              <a:rPr lang="en-US" dirty="0" smtClean="0"/>
+              <a:t>Barrier to entry: know how to use it, choose it, and it has to be fast.  Many people ignore it.</a:t>
+            </a:r>
+            <a:endParaRPr lang="en-US" dirty="0"/>
+          </a:p>
+        </p:txBody>
+      </p:sp>
+      <p:sp>
+        <p:nvSpPr>
+          <p:cNvPr id="4" name="Slide Number Placeholder 3"/>
+          <p:cNvSpPr>
+            <a:spLocks noGrp="1"/>
+          </p:cNvSpPr>
+          <p:nvPr>
+            <p:ph type="sldNum" sz="quarter" idx="10"/>
+          </p:nvPr>
+        </p:nvSpPr>
+        <p:spPr/>
+        <p:txBody>
+          <a:bodyPr/>
+          <a:lstStyle/>
+          <a:p>
+            <a:fld id="{CFD85767-B34F-4122-8642-982296400DCD}" type="slidenum">
+              <a:rPr lang="en-US" smtClean="0"/>
+              <a:pPr/>
+              <a:t>7</a:t>
             </a:fld>
             <a:endParaRPr lang="en-US"/>
           </a:p>
@@ -748,7 +1229,8 @@
           <a:p>
             <a:fld id="{B41A135E-287C-4591-8C88-153CD277EA84}" type="datetimeFigureOut">
               <a:rPr lang="en-US" smtClean="0"/>
-              <a:t>3/26/2010</a:t>
+              <a:pPr/>
+              <a:t>4/1/2010</a:t>
             </a:fld>
             <a:endParaRPr lang="en-US"/>
           </a:p>
@@ -790,6 +1272,7 @@
           <a:p>
             <a:fld id="{F55DB321-3E07-42A7-B023-42BE62E90D4F}" type="slidenum">
               <a:rPr lang="en-US" smtClean="0"/>
+              <a:pPr/>
               <a:t>‹#›</a:t>
             </a:fld>
             <a:endParaRPr lang="en-US"/>
@@ -913,7 +1396,8 @@
           <a:p>
             <a:fld id="{B41A135E-287C-4591-8C88-153CD277EA84}" type="datetimeFigureOut">
               <a:rPr lang="en-US" smtClean="0"/>
-              <a:t>3/26/2010</a:t>
+              <a:pPr/>
+              <a:t>4/1/2010</a:t>
             </a:fld>
             <a:endParaRPr lang="en-US"/>
           </a:p>
@@ -955,6 +1439,7 @@
           <a:p>
             <a:fld id="{F55DB321-3E07-42A7-B023-42BE62E90D4F}" type="slidenum">
               <a:rPr lang="en-US" smtClean="0"/>
+              <a:pPr/>
               <a:t>‹#›</a:t>
             </a:fld>
             <a:endParaRPr lang="en-US"/>
@@ -1088,7 +1573,8 @@
           <a:p>
             <a:fld id="{B41A135E-287C-4591-8C88-153CD277EA84}" type="datetimeFigureOut">
               <a:rPr lang="en-US" smtClean="0"/>
-              <a:t>3/26/2010</a:t>
+              <a:pPr/>
+              <a:t>4/1/2010</a:t>
             </a:fld>
             <a:endParaRPr lang="en-US"/>
           </a:p>
@@ -1130,6 +1616,7 @@
           <a:p>
             <a:fld id="{F55DB321-3E07-42A7-B023-42BE62E90D4F}" type="slidenum">
               <a:rPr lang="en-US" smtClean="0"/>
+              <a:pPr/>
               <a:t>‹#›</a:t>
             </a:fld>
             <a:endParaRPr lang="en-US"/>
@@ -1253,7 +1740,8 @@
           <a:p>
             <a:fld id="{B41A135E-287C-4591-8C88-153CD277EA84}" type="datetimeFigureOut">
               <a:rPr lang="en-US" smtClean="0"/>
-              <a:t>3/26/2010</a:t>
+              <a:pPr/>
+              <a:t>4/1/2010</a:t>
             </a:fld>
             <a:endParaRPr lang="en-US"/>
           </a:p>
@@ -1295,6 +1783,7 @@
           <a:p>
             <a:fld id="{F55DB321-3E07-42A7-B023-42BE62E90D4F}" type="slidenum">
               <a:rPr lang="en-US" smtClean="0"/>
+              <a:pPr/>
               <a:t>‹#›</a:t>
             </a:fld>
             <a:endParaRPr lang="en-US"/>
@@ -1494,7 +1983,8 @@
           <a:p>
             <a:fld id="{B41A135E-287C-4591-8C88-153CD277EA84}" type="datetimeFigureOut">
               <a:rPr lang="en-US" smtClean="0"/>
-              <a:t>3/26/2010</a:t>
+              <a:pPr/>
+              <a:t>4/1/2010</a:t>
             </a:fld>
             <a:endParaRPr lang="en-US"/>
           </a:p>
@@ -1536,6 +2026,7 @@
           <a:p>
             <a:fld id="{F55DB321-3E07-42A7-B023-42BE62E90D4F}" type="slidenum">
               <a:rPr lang="en-US" smtClean="0"/>
+              <a:pPr/>
               <a:t>‹#›</a:t>
             </a:fld>
             <a:endParaRPr lang="en-US"/>
@@ -1777,7 +2268,8 @@
           <a:p>
             <a:fld id="{B41A135E-287C-4591-8C88-153CD277EA84}" type="datetimeFigureOut">
               <a:rPr lang="en-US" smtClean="0"/>
-              <a:t>3/26/2010</a:t>
+              <a:pPr/>
+              <a:t>4/1/2010</a:t>
             </a:fld>
             <a:endParaRPr lang="en-US"/>
           </a:p>
@@ -1819,6 +2311,7 @@
           <a:p>
             <a:fld id="{F55DB321-3E07-42A7-B023-42BE62E90D4F}" type="slidenum">
               <a:rPr lang="en-US" smtClean="0"/>
+              <a:pPr/>
               <a:t>‹#›</a:t>
             </a:fld>
             <a:endParaRPr lang="en-US"/>
@@ -2194,7 +2687,8 @@
           <a:p>
             <a:fld id="{B41A135E-287C-4591-8C88-153CD277EA84}" type="datetimeFigureOut">
               <a:rPr lang="en-US" smtClean="0"/>
-              <a:t>3/26/2010</a:t>
+              <a:pPr/>
+              <a:t>4/1/2010</a:t>
             </a:fld>
             <a:endParaRPr lang="en-US"/>
           </a:p>
@@ -2236,6 +2730,7 @@
           <a:p>
             <a:fld id="{F55DB321-3E07-42A7-B023-42BE62E90D4F}" type="slidenum">
               <a:rPr lang="en-US" smtClean="0"/>
+              <a:pPr/>
               <a:t>‹#›</a:t>
             </a:fld>
             <a:endParaRPr lang="en-US"/>
@@ -2307,7 +2802,8 @@
           <a:p>
             <a:fld id="{B41A135E-287C-4591-8C88-153CD277EA84}" type="datetimeFigureOut">
               <a:rPr lang="en-US" smtClean="0"/>
-              <a:t>3/26/2010</a:t>
+              <a:pPr/>
+              <a:t>4/1/2010</a:t>
             </a:fld>
             <a:endParaRPr lang="en-US"/>
           </a:p>
@@ -2349,6 +2845,7 @@
           <a:p>
             <a:fld id="{F55DB321-3E07-42A7-B023-42BE62E90D4F}" type="slidenum">
               <a:rPr lang="en-US" smtClean="0"/>
+              <a:pPr/>
               <a:t>‹#›</a:t>
             </a:fld>
             <a:endParaRPr lang="en-US"/>
@@ -2397,7 +2894,8 @@
           <a:p>
             <a:fld id="{B41A135E-287C-4591-8C88-153CD277EA84}" type="datetimeFigureOut">
               <a:rPr lang="en-US" smtClean="0"/>
-              <a:t>3/26/2010</a:t>
+              <a:pPr/>
+              <a:t>4/1/2010</a:t>
             </a:fld>
             <a:endParaRPr lang="en-US"/>
           </a:p>
@@ -2439,6 +2937,7 @@
           <a:p>
             <a:fld id="{F55DB321-3E07-42A7-B023-42BE62E90D4F}" type="slidenum">
               <a:rPr lang="en-US" smtClean="0"/>
+              <a:pPr/>
               <a:t>‹#›</a:t>
             </a:fld>
             <a:endParaRPr lang="en-US"/>
@@ -2669,7 +3168,8 @@
           <a:p>
             <a:fld id="{B41A135E-287C-4591-8C88-153CD277EA84}" type="datetimeFigureOut">
               <a:rPr lang="en-US" smtClean="0"/>
-              <a:t>3/26/2010</a:t>
+              <a:pPr/>
+              <a:t>4/1/2010</a:t>
             </a:fld>
             <a:endParaRPr lang="en-US"/>
           </a:p>
@@ -2711,6 +3211,7 @@
           <a:p>
             <a:fld id="{F55DB321-3E07-42A7-B023-42BE62E90D4F}" type="slidenum">
               <a:rPr lang="en-US" smtClean="0"/>
+              <a:pPr/>
               <a:t>‹#›</a:t>
             </a:fld>
             <a:endParaRPr lang="en-US"/>
@@ -2917,7 +3418,8 @@
           <a:p>
             <a:fld id="{B41A135E-287C-4591-8C88-153CD277EA84}" type="datetimeFigureOut">
               <a:rPr lang="en-US" smtClean="0"/>
-              <a:t>3/26/2010</a:t>
+              <a:pPr/>
+              <a:t>4/1/2010</a:t>
             </a:fld>
             <a:endParaRPr lang="en-US"/>
           </a:p>
@@ -2959,6 +3461,7 @@
           <a:p>
             <a:fld id="{F55DB321-3E07-42A7-B023-42BE62E90D4F}" type="slidenum">
               <a:rPr lang="en-US" smtClean="0"/>
+              <a:pPr/>
               <a:t>‹#›</a:t>
             </a:fld>
             <a:endParaRPr lang="en-US"/>
@@ -3125,7 +3628,8 @@
           <a:p>
             <a:fld id="{B41A135E-287C-4591-8C88-153CD277EA84}" type="datetimeFigureOut">
               <a:rPr lang="en-US" smtClean="0"/>
-              <a:t>3/26/2010</a:t>
+              <a:pPr/>
+              <a:t>4/1/2010</a:t>
             </a:fld>
             <a:endParaRPr lang="en-US"/>
           </a:p>
@@ -3203,6 +3707,7 @@
           <a:p>
             <a:fld id="{F55DB321-3E07-42A7-B023-42BE62E90D4F}" type="slidenum">
               <a:rPr lang="en-US" smtClean="0"/>
+              <a:pPr/>
               <a:t>‹#›</a:t>
             </a:fld>
             <a:endParaRPr lang="en-US"/>
@@ -3512,7 +4017,7 @@
           <a:p>
             <a:r>
               <a:rPr lang="en-US" dirty="0" smtClean="0"/>
-              <a:t>How to Make the Internet Faster</a:t>
+              <a:t>How to Make Downloading Faster</a:t>
             </a:r>
             <a:endParaRPr lang="en-US" dirty="0"/>
           </a:p>
@@ -3596,7 +4101,7 @@
           <a:p>
             <a:r>
               <a:rPr lang="en-US" dirty="0" smtClean="0"/>
-              <a:t>Today’s Bottleneck</a:t>
+              <a:t>Fast download</a:t>
             </a:r>
             <a:endParaRPr lang="en-US" dirty="0"/>
           </a:p>
@@ -3617,26 +4122,585 @@
           <a:bodyPr/>
           <a:lstStyle/>
           <a:p>
+            <a:endParaRPr lang="en-US"/>
+          </a:p>
+        </p:txBody>
+      </p:sp>
+      <p:pic>
+        <p:nvPicPr>
+          <p:cNvPr id="1027" name="Picture 3" descr="C:\Users\packrd\Desktop\more_speed_smaller.jpg"/>
+          <p:cNvPicPr>
+            <a:picLocks noChangeAspect="1" noChangeArrowheads="1"/>
+          </p:cNvPicPr>
+          <p:nvPr/>
+        </p:nvPicPr>
+        <p:blipFill>
+          <a:blip r:embed="rId2" cstate="print"/>
+          <a:srcRect/>
+          <a:stretch>
+            <a:fillRect/>
+          </a:stretch>
+        </p:blipFill>
+        <p:spPr bwMode="auto">
+          <a:xfrm>
+            <a:off x="304800" y="1600200"/>
+            <a:ext cx="8555567" cy="4476750"/>
+          </a:xfrm>
+          <a:prstGeom prst="rect">
+            <a:avLst/>
+          </a:prstGeom>
+          <a:noFill/>
+        </p:spPr>
+      </p:pic>
+      <p:pic>
+        <p:nvPicPr>
+          <p:cNvPr id="1028" name="Picture 4" descr="C:\Users\packrd\AppData\Local\Microsoft\Windows\Temporary Internet Files\Content.IE5\I9QEYR76\MCj04406450000[1].wmf"/>
+          <p:cNvPicPr>
+            <a:picLocks noChangeAspect="1" noChangeArrowheads="1"/>
+          </p:cNvPicPr>
+          <p:nvPr/>
+        </p:nvPicPr>
+        <p:blipFill>
+          <a:blip r:embed="rId3" cstate="print"/>
+          <a:srcRect/>
+          <a:stretch>
+            <a:fillRect/>
+          </a:stretch>
+        </p:blipFill>
+        <p:spPr bwMode="auto">
+          <a:xfrm>
+            <a:off x="6858000" y="0"/>
+            <a:ext cx="1828800" cy="1828800"/>
+          </a:xfrm>
+          <a:prstGeom prst="rect">
+            <a:avLst/>
+          </a:prstGeom>
+          <a:noFill/>
+        </p:spPr>
+      </p:pic>
+    </p:spTree>
+  </p:cSld>
+  <p:clrMapOvr>
+    <a:masterClrMapping/>
+  </p:clrMapOvr>
+</p:sld>
+</file>
+
+<file path=ppt/slides/slide3.xml><?xml version="1.0" encoding="utf-8"?>
+<p:sld xmlns:a="http://schemas.openxmlformats.org/drawingml/2006/main" xmlns:r="http://schemas.openxmlformats.org/officeDocument/2006/relationships" xmlns:p="http://schemas.openxmlformats.org/presentationml/2006/main">
+  <p:cSld>
+    <p:spTree>
+      <p:nvGrpSpPr>
+        <p:cNvPr id="1" name=""/>
+        <p:cNvGrpSpPr/>
+        <p:nvPr/>
+      </p:nvGrpSpPr>
+      <p:grpSpPr>
+        <a:xfrm>
+          <a:off x="0" y="0"/>
+          <a:ext cx="0" cy="0"/>
+          <a:chOff x="0" y="0"/>
+          <a:chExt cx="0" cy="0"/>
+        </a:xfrm>
+      </p:grpSpPr>
+      <p:sp>
+        <p:nvSpPr>
+          <p:cNvPr id="2" name="Title 1"/>
+          <p:cNvSpPr>
+            <a:spLocks noGrp="1"/>
+          </p:cNvSpPr>
+          <p:nvPr>
+            <p:ph type="title"/>
+          </p:nvPr>
+        </p:nvSpPr>
+        <p:spPr/>
+        <p:txBody>
+          <a:bodyPr>
+            <a:normAutofit/>
+          </a:bodyPr>
+          <a:lstStyle/>
+          <a:p>
             <a:r>
               <a:rPr lang="en-US" dirty="0" smtClean="0"/>
-              <a:t>CPU?</a:t>
-            </a:r>
-          </a:p>
+              <a:t>Slow downloads</a:t>
+            </a:r>
+            <a:endParaRPr lang="en-US" dirty="0"/>
+          </a:p>
+        </p:txBody>
+      </p:sp>
+      <p:sp>
+        <p:nvSpPr>
+          <p:cNvPr id="3" name="Content Placeholder 2"/>
+          <p:cNvSpPr>
+            <a:spLocks noGrp="1"/>
+          </p:cNvSpPr>
+          <p:nvPr>
+            <p:ph idx="1"/>
+          </p:nvPr>
+        </p:nvSpPr>
+        <p:spPr/>
+        <p:txBody>
+          <a:bodyPr/>
+          <a:lstStyle/>
+          <a:p>
+            <a:endParaRPr lang="en-US"/>
+          </a:p>
+        </p:txBody>
+      </p:sp>
+      <p:pic>
+        <p:nvPicPr>
+          <p:cNvPr id="2050" name="Picture 2"/>
+          <p:cNvPicPr>
+            <a:picLocks noChangeAspect="1" noChangeArrowheads="1"/>
+          </p:cNvPicPr>
+          <p:nvPr/>
+        </p:nvPicPr>
+        <p:blipFill>
+          <a:blip r:embed="rId3" cstate="print"/>
+          <a:srcRect/>
+          <a:stretch>
+            <a:fillRect/>
+          </a:stretch>
+        </p:blipFill>
+        <p:spPr bwMode="auto">
+          <a:xfrm>
+            <a:off x="381000" y="1600200"/>
+            <a:ext cx="8442145" cy="2233613"/>
+          </a:xfrm>
+          <a:prstGeom prst="rect">
+            <a:avLst/>
+          </a:prstGeom>
+          <a:noFill/>
+          <a:ln w="9525">
+            <a:noFill/>
+            <a:miter lim="800000"/>
+            <a:headEnd/>
+            <a:tailEnd/>
+          </a:ln>
+          <a:effectLst/>
+        </p:spPr>
+      </p:pic>
+      <p:pic>
+        <p:nvPicPr>
+          <p:cNvPr id="2051" name="Picture 3" descr="C:\Program Files\Microsoft Office\MEDIA\CAGCAT10\j0286034.wmf"/>
+          <p:cNvPicPr>
+            <a:picLocks noChangeAspect="1" noChangeArrowheads="1"/>
+          </p:cNvPicPr>
+          <p:nvPr/>
+        </p:nvPicPr>
+        <p:blipFill>
+          <a:blip r:embed="rId4" cstate="print"/>
+          <a:srcRect/>
+          <a:stretch>
+            <a:fillRect/>
+          </a:stretch>
+        </p:blipFill>
+        <p:spPr bwMode="auto">
+          <a:xfrm>
+            <a:off x="7497763" y="471488"/>
+            <a:ext cx="919162" cy="885825"/>
+          </a:xfrm>
+          <a:prstGeom prst="rect">
+            <a:avLst/>
+          </a:prstGeom>
+          <a:noFill/>
+        </p:spPr>
+      </p:pic>
+    </p:spTree>
+  </p:cSld>
+  <p:clrMapOvr>
+    <a:masterClrMapping/>
+  </p:clrMapOvr>
+</p:sld>
+</file>
+
+<file path=ppt/slides/slide4.xml><?xml version="1.0" encoding="utf-8"?>
+<p:sld xmlns:a="http://schemas.openxmlformats.org/drawingml/2006/main" xmlns:r="http://schemas.openxmlformats.org/officeDocument/2006/relationships" xmlns:p="http://schemas.openxmlformats.org/presentationml/2006/main">
+  <p:cSld>
+    <p:spTree>
+      <p:nvGrpSpPr>
+        <p:cNvPr id="1" name=""/>
+        <p:cNvGrpSpPr/>
+        <p:nvPr/>
+      </p:nvGrpSpPr>
+      <p:grpSpPr>
+        <a:xfrm>
+          <a:off x="0" y="0"/>
+          <a:ext cx="0" cy="0"/>
+          <a:chOff x="0" y="0"/>
+          <a:chExt cx="0" cy="0"/>
+        </a:xfrm>
+      </p:grpSpPr>
+      <p:sp>
+        <p:nvSpPr>
+          <p:cNvPr id="2" name="Title 1"/>
+          <p:cNvSpPr>
+            <a:spLocks noGrp="1"/>
+          </p:cNvSpPr>
+          <p:nvPr>
+            <p:ph type="title"/>
+          </p:nvPr>
+        </p:nvSpPr>
+        <p:spPr/>
+        <p:txBody>
+          <a:bodyPr/>
+          <a:lstStyle/>
           <a:p>
             <a:r>
               <a:rPr lang="en-US" dirty="0" smtClean="0"/>
-              <a:t>Disk?</a:t>
-            </a:r>
-          </a:p>
+              <a:t>Options</a:t>
+            </a:r>
+            <a:endParaRPr lang="en-US" dirty="0"/>
+          </a:p>
+        </p:txBody>
+      </p:sp>
+      <p:sp>
+        <p:nvSpPr>
+          <p:cNvPr id="3" name="Content Placeholder 2"/>
+          <p:cNvSpPr>
+            <a:spLocks noGrp="1"/>
+          </p:cNvSpPr>
+          <p:nvPr>
+            <p:ph idx="1"/>
+          </p:nvPr>
+        </p:nvSpPr>
+        <p:spPr/>
+        <p:txBody>
+          <a:bodyPr>
+            <a:normAutofit lnSpcReduction="10000"/>
+          </a:bodyPr>
+          <a:lstStyle/>
           <a:p>
             <a:r>
               <a:rPr lang="en-US" dirty="0" smtClean="0"/>
-              <a:t>Internet.</a:t>
+              <a:t>Hit reload.</a:t>
+            </a:r>
+          </a:p>
+          <a:p>
+            <a:r>
+              <a:rPr lang="en-US" dirty="0" smtClean="0"/>
+              <a:t>Go somewhere else.</a:t>
+            </a:r>
+          </a:p>
+          <a:p>
+            <a:r>
+              <a:rPr lang="en-US" dirty="0" smtClean="0"/>
+              <a:t>Download Manager.</a:t>
+            </a:r>
+          </a:p>
+          <a:p>
+            <a:r>
+              <a:rPr lang="en-US" dirty="0" smtClean="0"/>
+              <a:t>Add a local proxy.</a:t>
+            </a:r>
+          </a:p>
+          <a:p>
+            <a:r>
+              <a:rPr lang="en-US" dirty="0" smtClean="0"/>
+              <a:t>New internet connection.</a:t>
+            </a:r>
+          </a:p>
+          <a:p>
+            <a:r>
+              <a:rPr lang="en-US" dirty="0" smtClean="0"/>
+              <a:t>Beg the server to change how they serve the file</a:t>
+            </a:r>
+            <a:r>
+              <a:rPr lang="en-US" dirty="0" smtClean="0"/>
+              <a:t>.</a:t>
+            </a:r>
+          </a:p>
+          <a:p>
+            <a:r>
+              <a:rPr lang="en-US" dirty="0" smtClean="0"/>
+              <a:t>I now give </a:t>
+            </a:r>
+            <a:r>
+              <a:rPr lang="en-US" smtClean="0"/>
+              <a:t>you another option.</a:t>
             </a:r>
             <a:endParaRPr lang="en-US" dirty="0"/>
           </a:p>
         </p:txBody>
       </p:sp>
+    </p:spTree>
+  </p:cSld>
+  <p:clrMapOvr>
+    <a:masterClrMapping/>
+  </p:clrMapOvr>
+</p:sld>
+</file>
+
+<file path=ppt/slides/slide5.xml><?xml version="1.0" encoding="utf-8"?>
+<p:sld xmlns:a="http://schemas.openxmlformats.org/drawingml/2006/main" xmlns:r="http://schemas.openxmlformats.org/officeDocument/2006/relationships" xmlns:p="http://schemas.openxmlformats.org/presentationml/2006/main">
+  <p:cSld>
+    <p:spTree>
+      <p:nvGrpSpPr>
+        <p:cNvPr id="1" name=""/>
+        <p:cNvGrpSpPr/>
+        <p:nvPr/>
+      </p:nvGrpSpPr>
+      <p:grpSpPr>
+        <a:xfrm>
+          <a:off x="0" y="0"/>
+          <a:ext cx="0" cy="0"/>
+          <a:chOff x="0" y="0"/>
+          <a:chExt cx="0" cy="0"/>
+        </a:xfrm>
+      </p:grpSpPr>
+      <p:sp>
+        <p:nvSpPr>
+          <p:cNvPr id="2" name="Title 1"/>
+          <p:cNvSpPr>
+            <a:spLocks noGrp="1"/>
+          </p:cNvSpPr>
+          <p:nvPr>
+            <p:ph type="title"/>
+          </p:nvPr>
+        </p:nvSpPr>
+        <p:spPr/>
+        <p:txBody>
+          <a:bodyPr/>
+          <a:lstStyle/>
+          <a:p>
+            <a:r>
+              <a:rPr lang="en-US" dirty="0" smtClean="0"/>
+              <a:t>Server options</a:t>
+            </a:r>
+            <a:endParaRPr lang="en-US" dirty="0"/>
+          </a:p>
+        </p:txBody>
+      </p:sp>
+      <p:sp>
+        <p:nvSpPr>
+          <p:cNvPr id="3" name="Content Placeholder 2"/>
+          <p:cNvSpPr>
+            <a:spLocks noGrp="1"/>
+          </p:cNvSpPr>
+          <p:nvPr>
+            <p:ph idx="1"/>
+          </p:nvPr>
+        </p:nvSpPr>
+        <p:spPr/>
+        <p:txBody>
+          <a:bodyPr/>
+          <a:lstStyle/>
+          <a:p>
+            <a:r>
+              <a:rPr lang="en-US" dirty="0" smtClean="0"/>
+              <a:t>Buy more servers/move</a:t>
+            </a:r>
+          </a:p>
+          <a:p>
+            <a:r>
+              <a:rPr lang="en-US" dirty="0" smtClean="0"/>
+              <a:t>CDN</a:t>
+            </a:r>
+          </a:p>
+          <a:p>
+            <a:r>
+              <a:rPr lang="en-US" dirty="0" smtClean="0"/>
+              <a:t>Buy more bandwidth.</a:t>
+            </a:r>
+          </a:p>
+          <a:p>
+            <a:r>
+              <a:rPr lang="en-US" dirty="0" smtClean="0"/>
+              <a:t>Turn to P2P.</a:t>
+            </a:r>
+          </a:p>
+        </p:txBody>
+      </p:sp>
+    </p:spTree>
+  </p:cSld>
+  <p:clrMapOvr>
+    <a:masterClrMapping/>
+  </p:clrMapOvr>
+</p:sld>
+</file>
+
+<file path=ppt/slides/slide6.xml><?xml version="1.0" encoding="utf-8"?>
+<p:sld xmlns:a="http://schemas.openxmlformats.org/drawingml/2006/main" xmlns:r="http://schemas.openxmlformats.org/officeDocument/2006/relationships" xmlns:p="http://schemas.openxmlformats.org/presentationml/2006/main">
+  <p:cSld>
+    <p:spTree>
+      <p:nvGrpSpPr>
+        <p:cNvPr id="1" name=""/>
+        <p:cNvGrpSpPr/>
+        <p:nvPr/>
+      </p:nvGrpSpPr>
+      <p:grpSpPr>
+        <a:xfrm>
+          <a:off x="0" y="0"/>
+          <a:ext cx="0" cy="0"/>
+          <a:chOff x="0" y="0"/>
+          <a:chExt cx="0" cy="0"/>
+        </a:xfrm>
+      </p:grpSpPr>
+      <p:sp>
+        <p:nvSpPr>
+          <p:cNvPr id="2" name="Title 1"/>
+          <p:cNvSpPr>
+            <a:spLocks noGrp="1"/>
+          </p:cNvSpPr>
+          <p:nvPr>
+            <p:ph type="title"/>
+          </p:nvPr>
+        </p:nvSpPr>
+        <p:spPr/>
+        <p:txBody>
+          <a:bodyPr/>
+          <a:lstStyle/>
+          <a:p>
+            <a:r>
+              <a:rPr lang="en-US" dirty="0" smtClean="0"/>
+              <a:t>P2P</a:t>
+            </a:r>
+            <a:endParaRPr lang="en-US" dirty="0"/>
+          </a:p>
+        </p:txBody>
+      </p:sp>
+      <p:sp>
+        <p:nvSpPr>
+          <p:cNvPr id="3" name="Content Placeholder 2"/>
+          <p:cNvSpPr>
+            <a:spLocks noGrp="1"/>
+          </p:cNvSpPr>
+          <p:nvPr>
+            <p:ph idx="1"/>
+          </p:nvPr>
+        </p:nvSpPr>
+        <p:spPr/>
+        <p:txBody>
+          <a:bodyPr/>
+          <a:lstStyle/>
+          <a:p>
+            <a:r>
+              <a:rPr lang="en-US" dirty="0" smtClean="0"/>
+              <a:t>Create </a:t>
+            </a:r>
+            <a:r>
+              <a:rPr lang="en-US" dirty="0" err="1" smtClean="0"/>
+              <a:t>BitTorrent</a:t>
+            </a:r>
+            <a:r>
+              <a:rPr lang="en-US" dirty="0" smtClean="0"/>
+              <a:t> File.</a:t>
+            </a:r>
+          </a:p>
+          <a:p>
+            <a:r>
+              <a:rPr lang="en-US" dirty="0" smtClean="0"/>
+              <a:t>Host it, with tracker.</a:t>
+            </a:r>
+          </a:p>
+          <a:p>
+            <a:r>
+              <a:rPr lang="en-US" dirty="0" smtClean="0"/>
+              <a:t>Peers share.</a:t>
+            </a:r>
+          </a:p>
+          <a:p>
+            <a:r>
+              <a:rPr lang="en-US" dirty="0" smtClean="0"/>
+              <a:t>Barrier to use.</a:t>
+            </a:r>
+            <a:endParaRPr lang="en-US" dirty="0"/>
+          </a:p>
+        </p:txBody>
+      </p:sp>
+    </p:spTree>
+  </p:cSld>
+  <p:clrMapOvr>
+    <a:masterClrMapping/>
+  </p:clrMapOvr>
+</p:sld>
+</file>
+
+<file path=ppt/slides/slide7.xml><?xml version="1.0" encoding="utf-8"?>
+<p:sld xmlns:a="http://schemas.openxmlformats.org/drawingml/2006/main" xmlns:r="http://schemas.openxmlformats.org/officeDocument/2006/relationships" xmlns:p="http://schemas.openxmlformats.org/presentationml/2006/main">
+  <p:cSld>
+    <p:spTree>
+      <p:nvGrpSpPr>
+        <p:cNvPr id="1" name=""/>
+        <p:cNvGrpSpPr/>
+        <p:nvPr/>
+      </p:nvGrpSpPr>
+      <p:grpSpPr>
+        <a:xfrm>
+          <a:off x="0" y="0"/>
+          <a:ext cx="0" cy="0"/>
+          <a:chOff x="0" y="0"/>
+          <a:chExt cx="0" cy="0"/>
+        </a:xfrm>
+      </p:grpSpPr>
+      <p:sp>
+        <p:nvSpPr>
+          <p:cNvPr id="2" name="Title 1"/>
+          <p:cNvSpPr>
+            <a:spLocks noGrp="1"/>
+          </p:cNvSpPr>
+          <p:nvPr>
+            <p:ph type="title"/>
+          </p:nvPr>
+        </p:nvSpPr>
+        <p:spPr/>
+        <p:txBody>
+          <a:bodyPr/>
+          <a:lstStyle/>
+          <a:p>
+            <a:r>
+              <a:rPr lang="en-US" dirty="0" smtClean="0"/>
+              <a:t>Hard</a:t>
+            </a:r>
+            <a:endParaRPr lang="en-US" dirty="0"/>
+          </a:p>
+        </p:txBody>
+      </p:sp>
+      <p:sp>
+        <p:nvSpPr>
+          <p:cNvPr id="3" name="Content Placeholder 2"/>
+          <p:cNvSpPr>
+            <a:spLocks noGrp="1"/>
+          </p:cNvSpPr>
+          <p:nvPr>
+            <p:ph idx="1"/>
+          </p:nvPr>
+        </p:nvSpPr>
+        <p:spPr/>
+        <p:txBody>
+          <a:bodyPr/>
+          <a:lstStyle/>
+          <a:p>
+            <a:endParaRPr lang="en-US"/>
+          </a:p>
+        </p:txBody>
+      </p:sp>
+      <p:pic>
+        <p:nvPicPr>
+          <p:cNvPr id="1026" name="Picture 2" descr="C:\Users\packrd\Desktop\fail for OO BT.jpg"/>
+          <p:cNvPicPr>
+            <a:picLocks noChangeAspect="1" noChangeArrowheads="1"/>
+          </p:cNvPicPr>
+          <p:nvPr/>
+        </p:nvPicPr>
+        <p:blipFill>
+          <a:blip r:embed="rId3" cstate="print"/>
+          <a:srcRect/>
+          <a:stretch>
+            <a:fillRect/>
+          </a:stretch>
+        </p:blipFill>
+        <p:spPr bwMode="auto">
+          <a:xfrm>
+            <a:off x="10159" y="1149350"/>
+            <a:ext cx="9133841" cy="5708650"/>
+          </a:xfrm>
+          <a:prstGeom prst="rect">
+            <a:avLst/>
+          </a:prstGeom>
+          <a:noFill/>
+        </p:spPr>
+      </p:pic>
     </p:spTree>
   </p:cSld>
   <p:clrMapOvr>

</xml_diff>

<commit_message>
getting ready for the pres
</commit_message>
<xml_diff>
--- a/thesis_presentation/How to Make the Internet Faster.pptx
+++ b/thesis_presentation/How to Make the Internet Faster.pptx
@@ -5,16 +5,17 @@
     <p:sldMasterId id="2147483648" r:id="rId1"/>
   </p:sldMasterIdLst>
   <p:notesMasterIdLst>
-    <p:notesMasterId r:id="rId9"/>
+    <p:notesMasterId r:id="rId10"/>
   </p:notesMasterIdLst>
   <p:sldIdLst>
     <p:sldId id="256" r:id="rId2"/>
-    <p:sldId id="257" r:id="rId3"/>
-    <p:sldId id="258" r:id="rId4"/>
-    <p:sldId id="259" r:id="rId5"/>
-    <p:sldId id="260" r:id="rId6"/>
-    <p:sldId id="261" r:id="rId7"/>
-    <p:sldId id="262" r:id="rId8"/>
+    <p:sldId id="263" r:id="rId3"/>
+    <p:sldId id="257" r:id="rId4"/>
+    <p:sldId id="258" r:id="rId5"/>
+    <p:sldId id="259" r:id="rId6"/>
+    <p:sldId id="260" r:id="rId7"/>
+    <p:sldId id="261" r:id="rId8"/>
+    <p:sldId id="262" r:id="rId9"/>
   </p:sldIdLst>
   <p:sldSz cx="9144000" cy="6858000" type="screen4x3"/>
   <p:notesSz cx="6858000" cy="9144000"/>
@@ -199,7 +200,7 @@
             <a:fld id="{9826D637-6924-4A4F-8550-0E64EF887888}" type="datetimeFigureOut">
               <a:rPr lang="en-US" smtClean="0"/>
               <a:pPr/>
-              <a:t>4/1/2010</a:t>
+              <a:t>4/8/2010</a:t>
             </a:fld>
             <a:endParaRPr lang="en-US"/>
           </a:p>
@@ -599,31 +600,9 @@
           <a:p>
             <a:r>
               <a:rPr lang="en-US" dirty="0" smtClean="0"/>
-              <a:t>What options do you have?</a:t>
-            </a:r>
-          </a:p>
-          <a:p>
-            <a:endParaRPr lang="en-US" dirty="0" smtClean="0"/>
-          </a:p>
-          <a:p>
-            <a:r>
-              <a:rPr lang="en-US" dirty="0" smtClean="0"/>
-              <a:t>Go and do something else.</a:t>
-            </a:r>
-          </a:p>
-          <a:p>
-            <a:endParaRPr lang="en-US" dirty="0" smtClean="0"/>
-          </a:p>
-          <a:p>
-            <a:r>
-              <a:rPr lang="en-US" dirty="0" smtClean="0"/>
-              <a:t>Add</a:t>
-            </a:r>
-            <a:r>
-              <a:rPr lang="en-US" baseline="0" dirty="0" smtClean="0"/>
-              <a:t> a graph of network speed increasing so slowly compared to processors [?]</a:t>
-            </a:r>
-            <a:endParaRPr lang="en-US" dirty="0" smtClean="0"/>
+              <a:t>It isn’t just me!  This is not me!</a:t>
+            </a:r>
+            <a:endParaRPr lang="en-US" dirty="0"/>
           </a:p>
         </p:txBody>
       </p:sp>
@@ -645,7 +624,7 @@
             <a:fld id="{CFD85767-B34F-4122-8642-982296400DCD}" type="slidenum">
               <a:rPr lang="en-US" smtClean="0"/>
               <a:pPr/>
-              <a:t>3</a:t>
+              <a:t>2</a:t>
             </a:fld>
             <a:endParaRPr lang="en-US"/>
           </a:p>
@@ -705,19 +684,7 @@
           </a:bodyPr>
           <a:lstStyle/>
           <a:p>
-            <a:r>
-              <a:rPr lang="en-US" dirty="0" smtClean="0"/>
-              <a:t>Download manager—for me speeds things up, but</a:t>
-            </a:r>
-            <a:r>
-              <a:rPr lang="en-US" baseline="0" dirty="0" smtClean="0"/>
-              <a:t> hard to use because not integrated, also the server might run out </a:t>
-            </a:r>
-            <a:r>
-              <a:rPr lang="en-US" baseline="0" smtClean="0"/>
-              <a:t>of bandwidth.</a:t>
-            </a:r>
-            <a:endParaRPr lang="en-US" dirty="0"/>
+            <a:endParaRPr lang="en-US"/>
           </a:p>
         </p:txBody>
       </p:sp>
@@ -739,7 +706,7 @@
             <a:fld id="{CFD85767-B34F-4122-8642-982296400DCD}" type="slidenum">
               <a:rPr lang="en-US" smtClean="0"/>
               <a:pPr/>
-              <a:t>4</a:t>
+              <a:t>3</a:t>
             </a:fld>
             <a:endParaRPr lang="en-US"/>
           </a:p>
@@ -801,9 +768,48 @@
           <a:p>
             <a:r>
               <a:rPr lang="en-US" dirty="0" smtClean="0"/>
-              <a:t>More servers closer to you.</a:t>
-            </a:r>
-            <a:endParaRPr lang="en-US" dirty="0"/>
+              <a:t>Today's Internet is slow.  It is.</a:t>
+            </a:r>
+          </a:p>
+          <a:p>
+            <a:r>
+              <a:rPr lang="en-US" dirty="0" smtClean="0"/>
+              <a:t>This is very frustrating to today's work flow, and annoying.</a:t>
+            </a:r>
+          </a:p>
+          <a:p>
+            <a:r>
+              <a:rPr lang="en-US" dirty="0" smtClean="0"/>
+              <a:t>"today's bottleneck is no longer the disk or </a:t>
+            </a:r>
+            <a:r>
+              <a:rPr lang="en-US" dirty="0" err="1" smtClean="0"/>
+              <a:t>cpu</a:t>
+            </a:r>
+            <a:r>
+              <a:rPr lang="en-US" dirty="0" smtClean="0"/>
+              <a:t>--it's the network!"</a:t>
+            </a:r>
+          </a:p>
+          <a:p>
+            <a:r>
+              <a:rPr lang="en-US" dirty="0" smtClean="0"/>
+              <a:t>"all this wasted bandwidth“</a:t>
+            </a:r>
+          </a:p>
+          <a:p>
+            <a:endParaRPr lang="en-US" dirty="0" smtClean="0"/>
+          </a:p>
+          <a:p>
+            <a:r>
+              <a:rPr lang="en-US" dirty="0" smtClean="0"/>
+              <a:t>Add</a:t>
+            </a:r>
+            <a:r>
+              <a:rPr lang="en-US" baseline="0" dirty="0" smtClean="0"/>
+              <a:t> a graph of network speed increasing so slowly compared to processors [?]</a:t>
+            </a:r>
+            <a:endParaRPr lang="en-US" dirty="0" smtClean="0"/>
           </a:p>
         </p:txBody>
       </p:sp>
@@ -825,7 +831,7 @@
             <a:fld id="{CFD85767-B34F-4122-8642-982296400DCD}" type="slidenum">
               <a:rPr lang="en-US" smtClean="0"/>
               <a:pPr/>
-              <a:t>5</a:t>
+              <a:t>4</a:t>
             </a:fld>
             <a:endParaRPr lang="en-US"/>
           </a:p>
@@ -887,26 +893,15 @@
           <a:p>
             <a:r>
               <a:rPr lang="en-US" dirty="0" smtClean="0"/>
-              <a:t>TODO: pictures</a:t>
-            </a:r>
-          </a:p>
-          <a:p>
-            <a:endParaRPr lang="en-US" dirty="0" smtClean="0"/>
-          </a:p>
-          <a:p>
-            <a:r>
-              <a:rPr lang="en-US" dirty="0" smtClean="0"/>
-              <a:t>Barrier: not just the client, but you don’t know if using the client will actually be faster.  Many times it isn’t.</a:t>
-            </a:r>
-          </a:p>
-          <a:p>
-            <a:r>
-              <a:rPr lang="en-US" dirty="0" smtClean="0"/>
-              <a:t>And some</a:t>
+              <a:t>Download manager—for me speeds things up, but</a:t>
             </a:r>
             <a:r>
               <a:rPr lang="en-US" baseline="0" dirty="0" smtClean="0"/>
-              <a:t> sites don’t offer P2P.</a:t>
+              <a:t> hard to use because not integrated, also the server might run out of bandwidth</a:t>
+            </a:r>
+            <a:r>
+              <a:rPr lang="en-US" baseline="0" dirty="0" smtClean="0"/>
+              <a:t>.</a:t>
             </a:r>
           </a:p>
           <a:p>
@@ -915,16 +910,7 @@
           <a:p>
             <a:r>
               <a:rPr lang="en-US" baseline="0" dirty="0" smtClean="0"/>
-              <a:t>Technology is there but not easily accessible.</a:t>
-            </a:r>
-          </a:p>
-          <a:p>
-            <a:endParaRPr lang="en-US" baseline="0" dirty="0" smtClean="0"/>
-          </a:p>
-          <a:p>
-            <a:r>
-              <a:rPr lang="en-US" baseline="0" dirty="0" smtClean="0"/>
-              <a:t>How many sites actually offer you that stuff?</a:t>
+              <a:t>Adding a local proxy doesn’t help if the file hasn’t been downloaded locally already—same exact problem in many cases.</a:t>
             </a:r>
             <a:endParaRPr lang="en-US" dirty="0"/>
           </a:p>
@@ -948,7 +934,7 @@
             <a:fld id="{CFD85767-B34F-4122-8642-982296400DCD}" type="slidenum">
               <a:rPr lang="en-US" smtClean="0"/>
               <a:pPr/>
-              <a:t>6</a:t>
+              <a:t>5</a:t>
             </a:fld>
             <a:endParaRPr lang="en-US"/>
           </a:p>
@@ -1010,7 +996,130 @@
           <a:p>
             <a:r>
               <a:rPr lang="en-US" dirty="0" smtClean="0"/>
-              <a:t>Barrier to entry: know how to use it, choose it, and it has to be fast.  Many people ignore it.</a:t>
+              <a:t>More servers closer to you.</a:t>
+            </a:r>
+            <a:endParaRPr lang="en-US" dirty="0"/>
+          </a:p>
+        </p:txBody>
+      </p:sp>
+      <p:sp>
+        <p:nvSpPr>
+          <p:cNvPr id="4" name="Slide Number Placeholder 3"/>
+          <p:cNvSpPr>
+            <a:spLocks noGrp="1"/>
+          </p:cNvSpPr>
+          <p:nvPr>
+            <p:ph type="sldNum" sz="quarter" idx="10"/>
+          </p:nvPr>
+        </p:nvSpPr>
+        <p:spPr/>
+        <p:txBody>
+          <a:bodyPr/>
+          <a:lstStyle/>
+          <a:p>
+            <a:fld id="{CFD85767-B34F-4122-8642-982296400DCD}" type="slidenum">
+              <a:rPr lang="en-US" smtClean="0"/>
+              <a:pPr/>
+              <a:t>6</a:t>
+            </a:fld>
+            <a:endParaRPr lang="en-US"/>
+          </a:p>
+        </p:txBody>
+      </p:sp>
+    </p:spTree>
+  </p:cSld>
+  <p:clrMapOvr>
+    <a:masterClrMapping/>
+  </p:clrMapOvr>
+</p:notes>
+</file>
+
+<file path=ppt/notesSlides/notesSlide7.xml><?xml version="1.0" encoding="utf-8"?>
+<p:notes xmlns:a="http://schemas.openxmlformats.org/drawingml/2006/main" xmlns:r="http://schemas.openxmlformats.org/officeDocument/2006/relationships" xmlns:p="http://schemas.openxmlformats.org/presentationml/2006/main">
+  <p:cSld>
+    <p:spTree>
+      <p:nvGrpSpPr>
+        <p:cNvPr id="1" name=""/>
+        <p:cNvGrpSpPr/>
+        <p:nvPr/>
+      </p:nvGrpSpPr>
+      <p:grpSpPr>
+        <a:xfrm>
+          <a:off x="0" y="0"/>
+          <a:ext cx="0" cy="0"/>
+          <a:chOff x="0" y="0"/>
+          <a:chExt cx="0" cy="0"/>
+        </a:xfrm>
+      </p:grpSpPr>
+      <p:sp>
+        <p:nvSpPr>
+          <p:cNvPr id="2" name="Slide Image Placeholder 1"/>
+          <p:cNvSpPr>
+            <a:spLocks noGrp="1" noRot="1" noChangeAspect="1"/>
+          </p:cNvSpPr>
+          <p:nvPr>
+            <p:ph type="sldImg"/>
+          </p:nvPr>
+        </p:nvSpPr>
+        <p:spPr/>
+      </p:sp>
+      <p:sp>
+        <p:nvSpPr>
+          <p:cNvPr id="3" name="Notes Placeholder 2"/>
+          <p:cNvSpPr>
+            <a:spLocks noGrp="1"/>
+          </p:cNvSpPr>
+          <p:nvPr>
+            <p:ph type="body" idx="1"/>
+          </p:nvPr>
+        </p:nvSpPr>
+        <p:spPr/>
+        <p:txBody>
+          <a:bodyPr>
+            <a:normAutofit/>
+          </a:bodyPr>
+          <a:lstStyle/>
+          <a:p>
+            <a:r>
+              <a:rPr lang="en-US" dirty="0" smtClean="0"/>
+              <a:t>TODO: pictures</a:t>
+            </a:r>
+          </a:p>
+          <a:p>
+            <a:endParaRPr lang="en-US" dirty="0" smtClean="0"/>
+          </a:p>
+          <a:p>
+            <a:r>
+              <a:rPr lang="en-US" dirty="0" smtClean="0"/>
+              <a:t>Barrier: not just the client, but you don’t know if using the client will actually be faster.  Many times it isn’t.</a:t>
+            </a:r>
+          </a:p>
+          <a:p>
+            <a:r>
+              <a:rPr lang="en-US" dirty="0" smtClean="0"/>
+              <a:t>And some</a:t>
+            </a:r>
+            <a:r>
+              <a:rPr lang="en-US" baseline="0" dirty="0" smtClean="0"/>
+              <a:t> sites don’t offer P2P.</a:t>
+            </a:r>
+          </a:p>
+          <a:p>
+            <a:endParaRPr lang="en-US" baseline="0" dirty="0" smtClean="0"/>
+          </a:p>
+          <a:p>
+            <a:r>
+              <a:rPr lang="en-US" baseline="0" dirty="0" smtClean="0"/>
+              <a:t>Technology is there but not easily accessible.</a:t>
+            </a:r>
+          </a:p>
+          <a:p>
+            <a:endParaRPr lang="en-US" baseline="0" dirty="0" smtClean="0"/>
+          </a:p>
+          <a:p>
+            <a:r>
+              <a:rPr lang="en-US" baseline="0" dirty="0" smtClean="0"/>
+              <a:t>How many sites actually offer you that stuff?</a:t>
             </a:r>
             <a:endParaRPr lang="en-US" dirty="0"/>
           </a:p>
@@ -1035,6 +1144,113 @@
               <a:rPr lang="en-US" smtClean="0"/>
               <a:pPr/>
               <a:t>7</a:t>
+            </a:fld>
+            <a:endParaRPr lang="en-US"/>
+          </a:p>
+        </p:txBody>
+      </p:sp>
+    </p:spTree>
+  </p:cSld>
+  <p:clrMapOvr>
+    <a:masterClrMapping/>
+  </p:clrMapOvr>
+</p:notes>
+</file>
+
+<file path=ppt/notesSlides/notesSlide8.xml><?xml version="1.0" encoding="utf-8"?>
+<p:notes xmlns:a="http://schemas.openxmlformats.org/drawingml/2006/main" xmlns:r="http://schemas.openxmlformats.org/officeDocument/2006/relationships" xmlns:p="http://schemas.openxmlformats.org/presentationml/2006/main">
+  <p:cSld>
+    <p:spTree>
+      <p:nvGrpSpPr>
+        <p:cNvPr id="1" name=""/>
+        <p:cNvGrpSpPr/>
+        <p:nvPr/>
+      </p:nvGrpSpPr>
+      <p:grpSpPr>
+        <a:xfrm>
+          <a:off x="0" y="0"/>
+          <a:ext cx="0" cy="0"/>
+          <a:chOff x="0" y="0"/>
+          <a:chExt cx="0" cy="0"/>
+        </a:xfrm>
+      </p:grpSpPr>
+      <p:sp>
+        <p:nvSpPr>
+          <p:cNvPr id="2" name="Slide Image Placeholder 1"/>
+          <p:cNvSpPr>
+            <a:spLocks noGrp="1" noRot="1" noChangeAspect="1"/>
+          </p:cNvSpPr>
+          <p:nvPr>
+            <p:ph type="sldImg"/>
+          </p:nvPr>
+        </p:nvSpPr>
+        <p:spPr/>
+      </p:sp>
+      <p:sp>
+        <p:nvSpPr>
+          <p:cNvPr id="3" name="Notes Placeholder 2"/>
+          <p:cNvSpPr>
+            <a:spLocks noGrp="1"/>
+          </p:cNvSpPr>
+          <p:nvPr>
+            <p:ph type="body" idx="1"/>
+          </p:nvPr>
+        </p:nvSpPr>
+        <p:spPr/>
+        <p:txBody>
+          <a:bodyPr>
+            <a:normAutofit/>
+          </a:bodyPr>
+          <a:lstStyle/>
+          <a:p>
+            <a:r>
+              <a:rPr lang="en-US" dirty="0" smtClean="0"/>
+              <a:t>Barrier to entry: know how to use it, choose it, and it has to be fast.  Many people ignore it</a:t>
+            </a:r>
+            <a:r>
+              <a:rPr lang="en-US" dirty="0" smtClean="0"/>
+              <a:t>.</a:t>
+            </a:r>
+          </a:p>
+          <a:p>
+            <a:endParaRPr lang="en-US" dirty="0" smtClean="0"/>
+          </a:p>
+          <a:p>
+            <a:r>
+              <a:rPr lang="en-US" dirty="0" smtClean="0"/>
+              <a:t>Barrier for the</a:t>
+            </a:r>
+            <a:r>
+              <a:rPr lang="en-US" baseline="0" dirty="0" smtClean="0"/>
+              <a:t> server too: setting it up.  Barrier to client: extra cost of time </a:t>
+            </a:r>
+            <a:r>
+              <a:rPr lang="en-US" baseline="0" smtClean="0"/>
+              <a:t>to download/unreliable can cause it to cost you extra time.</a:t>
+            </a:r>
+            <a:endParaRPr lang="en-US" dirty="0"/>
+          </a:p>
+        </p:txBody>
+      </p:sp>
+      <p:sp>
+        <p:nvSpPr>
+          <p:cNvPr id="4" name="Slide Number Placeholder 3"/>
+          <p:cNvSpPr>
+            <a:spLocks noGrp="1"/>
+          </p:cNvSpPr>
+          <p:nvPr>
+            <p:ph type="sldNum" sz="quarter" idx="10"/>
+          </p:nvPr>
+        </p:nvSpPr>
+        <p:spPr/>
+        <p:txBody>
+          <a:bodyPr/>
+          <a:lstStyle/>
+          <a:p>
+            <a:fld id="{CFD85767-B34F-4122-8642-982296400DCD}" type="slidenum">
+              <a:rPr lang="en-US" smtClean="0"/>
+              <a:pPr/>
+              <a:t>8</a:t>
             </a:fld>
             <a:endParaRPr lang="en-US"/>
           </a:p>
@@ -1230,7 +1446,7 @@
             <a:fld id="{B41A135E-287C-4591-8C88-153CD277EA84}" type="datetimeFigureOut">
               <a:rPr lang="en-US" smtClean="0"/>
               <a:pPr/>
-              <a:t>4/1/2010</a:t>
+              <a:t>4/8/2010</a:t>
             </a:fld>
             <a:endParaRPr lang="en-US"/>
           </a:p>
@@ -1397,7 +1613,7 @@
             <a:fld id="{B41A135E-287C-4591-8C88-153CD277EA84}" type="datetimeFigureOut">
               <a:rPr lang="en-US" smtClean="0"/>
               <a:pPr/>
-              <a:t>4/1/2010</a:t>
+              <a:t>4/8/2010</a:t>
             </a:fld>
             <a:endParaRPr lang="en-US"/>
           </a:p>
@@ -1574,7 +1790,7 @@
             <a:fld id="{B41A135E-287C-4591-8C88-153CD277EA84}" type="datetimeFigureOut">
               <a:rPr lang="en-US" smtClean="0"/>
               <a:pPr/>
-              <a:t>4/1/2010</a:t>
+              <a:t>4/8/2010</a:t>
             </a:fld>
             <a:endParaRPr lang="en-US"/>
           </a:p>
@@ -1741,7 +1957,7 @@
             <a:fld id="{B41A135E-287C-4591-8C88-153CD277EA84}" type="datetimeFigureOut">
               <a:rPr lang="en-US" smtClean="0"/>
               <a:pPr/>
-              <a:t>4/1/2010</a:t>
+              <a:t>4/8/2010</a:t>
             </a:fld>
             <a:endParaRPr lang="en-US"/>
           </a:p>
@@ -1984,7 +2200,7 @@
             <a:fld id="{B41A135E-287C-4591-8C88-153CD277EA84}" type="datetimeFigureOut">
               <a:rPr lang="en-US" smtClean="0"/>
               <a:pPr/>
-              <a:t>4/1/2010</a:t>
+              <a:t>4/8/2010</a:t>
             </a:fld>
             <a:endParaRPr lang="en-US"/>
           </a:p>
@@ -2269,7 +2485,7 @@
             <a:fld id="{B41A135E-287C-4591-8C88-153CD277EA84}" type="datetimeFigureOut">
               <a:rPr lang="en-US" smtClean="0"/>
               <a:pPr/>
-              <a:t>4/1/2010</a:t>
+              <a:t>4/8/2010</a:t>
             </a:fld>
             <a:endParaRPr lang="en-US"/>
           </a:p>
@@ -2688,7 +2904,7 @@
             <a:fld id="{B41A135E-287C-4591-8C88-153CD277EA84}" type="datetimeFigureOut">
               <a:rPr lang="en-US" smtClean="0"/>
               <a:pPr/>
-              <a:t>4/1/2010</a:t>
+              <a:t>4/8/2010</a:t>
             </a:fld>
             <a:endParaRPr lang="en-US"/>
           </a:p>
@@ -2803,7 +3019,7 @@
             <a:fld id="{B41A135E-287C-4591-8C88-153CD277EA84}" type="datetimeFigureOut">
               <a:rPr lang="en-US" smtClean="0"/>
               <a:pPr/>
-              <a:t>4/1/2010</a:t>
+              <a:t>4/8/2010</a:t>
             </a:fld>
             <a:endParaRPr lang="en-US"/>
           </a:p>
@@ -2895,7 +3111,7 @@
             <a:fld id="{B41A135E-287C-4591-8C88-153CD277EA84}" type="datetimeFigureOut">
               <a:rPr lang="en-US" smtClean="0"/>
               <a:pPr/>
-              <a:t>4/1/2010</a:t>
+              <a:t>4/8/2010</a:t>
             </a:fld>
             <a:endParaRPr lang="en-US"/>
           </a:p>
@@ -3169,7 +3385,7 @@
             <a:fld id="{B41A135E-287C-4591-8C88-153CD277EA84}" type="datetimeFigureOut">
               <a:rPr lang="en-US" smtClean="0"/>
               <a:pPr/>
-              <a:t>4/1/2010</a:t>
+              <a:t>4/8/2010</a:t>
             </a:fld>
             <a:endParaRPr lang="en-US"/>
           </a:p>
@@ -3419,7 +3635,7 @@
             <a:fld id="{B41A135E-287C-4591-8C88-153CD277EA84}" type="datetimeFigureOut">
               <a:rPr lang="en-US" smtClean="0"/>
               <a:pPr/>
-              <a:t>4/1/2010</a:t>
+              <a:t>4/8/2010</a:t>
             </a:fld>
             <a:endParaRPr lang="en-US"/>
           </a:p>
@@ -3629,7 +3845,7 @@
             <a:fld id="{B41A135E-287C-4591-8C88-153CD277EA84}" type="datetimeFigureOut">
               <a:rPr lang="en-US" smtClean="0"/>
               <a:pPr/>
-              <a:t>4/1/2010</a:t>
+              <a:t>4/8/2010</a:t>
             </a:fld>
             <a:endParaRPr lang="en-US"/>
           </a:p>
@@ -4017,7 +4233,11 @@
           <a:p>
             <a:r>
               <a:rPr lang="en-US" dirty="0" smtClean="0"/>
-              <a:t>How to Make Downloading Faster</a:t>
+              <a:t>How to Make </a:t>
+            </a:r>
+            <a:r>
+              <a:rPr lang="en-US" dirty="0" smtClean="0"/>
+              <a:t>The Internet Faster</a:t>
             </a:r>
             <a:endParaRPr lang="en-US" dirty="0"/>
           </a:p>
@@ -4101,6 +4321,129 @@
           <a:p>
             <a:r>
               <a:rPr lang="en-US" dirty="0" smtClean="0"/>
+              <a:t>Thanks!</a:t>
+            </a:r>
+            <a:endParaRPr lang="en-US" dirty="0"/>
+          </a:p>
+        </p:txBody>
+      </p:sp>
+      <p:sp>
+        <p:nvSpPr>
+          <p:cNvPr id="3" name="Content Placeholder 2"/>
+          <p:cNvSpPr>
+            <a:spLocks noGrp="1"/>
+          </p:cNvSpPr>
+          <p:nvPr>
+            <p:ph idx="1"/>
+          </p:nvPr>
+        </p:nvSpPr>
+        <p:spPr/>
+        <p:txBody>
+          <a:bodyPr>
+            <a:normAutofit/>
+          </a:bodyPr>
+          <a:lstStyle/>
+          <a:p>
+            <a:r>
+              <a:rPr lang="en-US" sz="1800" dirty="0" smtClean="0"/>
+              <a:t>Family</a:t>
+            </a:r>
+          </a:p>
+          <a:p>
+            <a:r>
+              <a:rPr lang="en-US" sz="1800" dirty="0" smtClean="0"/>
+              <a:t>Advisors</a:t>
+            </a:r>
+          </a:p>
+          <a:p>
+            <a:r>
+              <a:rPr lang="en-US" sz="1800" dirty="0" err="1" smtClean="0"/>
+              <a:t>wE</a:t>
+            </a:r>
+            <a:r>
+              <a:rPr lang="en-US" sz="1800" dirty="0" smtClean="0"/>
+              <a:t>\=</a:t>
+            </a:r>
+            <a:r>
+              <a:rPr lang="en-US" sz="1800" dirty="0" smtClean="0"/>
+              <a:t>f P'P= \</a:t>
+            </a:r>
+            <a:r>
+              <a:rPr lang="en-US" sz="1800" dirty="0" smtClean="0"/>
+              <a:t>ROVIDE A U966554F545DS6TFDV87654536:01 PM 4/5/20102 098YH6Ya	1W N.I </a:t>
+            </a:r>
+            <a:endParaRPr lang="en-US" sz="1800" dirty="0"/>
+          </a:p>
+        </p:txBody>
+      </p:sp>
+      <p:pic>
+        <p:nvPicPr>
+          <p:cNvPr id="4" name="Picture 4" descr="C:\Users\packrd\AppData\Local\Microsoft\Windows\Temporary Internet Files\Content.IE5\I9QEYR76\MCj04406450000[1].wmf"/>
+          <p:cNvPicPr>
+            <a:picLocks noChangeAspect="1" noChangeArrowheads="1"/>
+          </p:cNvPicPr>
+          <p:nvPr/>
+        </p:nvPicPr>
+        <p:blipFill>
+          <a:blip r:embed="rId3" cstate="print"/>
+          <a:srcRect/>
+          <a:stretch>
+            <a:fillRect/>
+          </a:stretch>
+        </p:blipFill>
+        <p:spPr bwMode="auto">
+          <a:xfrm>
+            <a:off x="6934200" y="228600"/>
+            <a:ext cx="1295400" cy="1295400"/>
+          </a:xfrm>
+          <a:prstGeom prst="rect">
+            <a:avLst/>
+          </a:prstGeom>
+          <a:noFill/>
+        </p:spPr>
+      </p:pic>
+    </p:spTree>
+  </p:cSld>
+  <p:clrMapOvr>
+    <a:masterClrMapping/>
+  </p:clrMapOvr>
+</p:sld>
+</file>
+
+<file path=ppt/slides/slide3.xml><?xml version="1.0" encoding="utf-8"?>
+<p:sld xmlns:a="http://schemas.openxmlformats.org/drawingml/2006/main" xmlns:r="http://schemas.openxmlformats.org/officeDocument/2006/relationships" xmlns:p="http://schemas.openxmlformats.org/presentationml/2006/main">
+  <p:cSld>
+    <p:spTree>
+      <p:nvGrpSpPr>
+        <p:cNvPr id="1" name=""/>
+        <p:cNvGrpSpPr/>
+        <p:nvPr/>
+      </p:nvGrpSpPr>
+      <p:grpSpPr>
+        <a:xfrm>
+          <a:off x="0" y="0"/>
+          <a:ext cx="0" cy="0"/>
+          <a:chOff x="0" y="0"/>
+          <a:chExt cx="0" cy="0"/>
+        </a:xfrm>
+      </p:grpSpPr>
+      <p:sp>
+        <p:nvSpPr>
+          <p:cNvPr id="2" name="Title 1"/>
+          <p:cNvSpPr>
+            <a:spLocks noGrp="1"/>
+          </p:cNvSpPr>
+          <p:nvPr>
+            <p:ph type="title"/>
+          </p:nvPr>
+        </p:nvSpPr>
+        <p:spPr/>
+        <p:txBody>
+          <a:bodyPr/>
+          <a:lstStyle/>
+          <a:p>
+            <a:r>
+              <a:rPr lang="en-US" dirty="0" smtClean="0"/>
               <a:t>Fast download</a:t>
             </a:r>
             <a:endParaRPr lang="en-US" dirty="0"/>
@@ -4135,7 +4478,7 @@
           <p:nvPr/>
         </p:nvPicPr>
         <p:blipFill>
-          <a:blip r:embed="rId2" cstate="print"/>
+          <a:blip r:embed="rId3" cstate="print"/>
           <a:srcRect/>
           <a:stretch>
             <a:fillRect/>
@@ -4161,7 +4504,7 @@
           <p:nvPr/>
         </p:nvPicPr>
         <p:blipFill>
-          <a:blip r:embed="rId3" cstate="print"/>
+          <a:blip r:embed="rId4" cstate="print"/>
           <a:srcRect/>
           <a:stretch>
             <a:fillRect/>
@@ -4169,8 +4512,8 @@
         </p:blipFill>
         <p:spPr bwMode="auto">
           <a:xfrm>
-            <a:off x="6858000" y="0"/>
-            <a:ext cx="1828800" cy="1828800"/>
+            <a:off x="6934200" y="228600"/>
+            <a:ext cx="1295400" cy="1295400"/>
           </a:xfrm>
           <a:prstGeom prst="rect">
             <a:avLst/>
@@ -4186,7 +4529,7 @@
 </p:sld>
 </file>
 
-<file path=ppt/slides/slide3.xml><?xml version="1.0" encoding="utf-8"?>
+<file path=ppt/slides/slide4.xml><?xml version="1.0" encoding="utf-8"?>
 <p:sld xmlns:a="http://schemas.openxmlformats.org/drawingml/2006/main" xmlns:r="http://schemas.openxmlformats.org/officeDocument/2006/relationships" xmlns:p="http://schemas.openxmlformats.org/presentationml/2006/main">
   <p:cSld>
     <p:spTree>
@@ -4314,123 +4657,6 @@
 </p:sld>
 </file>
 
-<file path=ppt/slides/slide4.xml><?xml version="1.0" encoding="utf-8"?>
-<p:sld xmlns:a="http://schemas.openxmlformats.org/drawingml/2006/main" xmlns:r="http://schemas.openxmlformats.org/officeDocument/2006/relationships" xmlns:p="http://schemas.openxmlformats.org/presentationml/2006/main">
-  <p:cSld>
-    <p:spTree>
-      <p:nvGrpSpPr>
-        <p:cNvPr id="1" name=""/>
-        <p:cNvGrpSpPr/>
-        <p:nvPr/>
-      </p:nvGrpSpPr>
-      <p:grpSpPr>
-        <a:xfrm>
-          <a:off x="0" y="0"/>
-          <a:ext cx="0" cy="0"/>
-          <a:chOff x="0" y="0"/>
-          <a:chExt cx="0" cy="0"/>
-        </a:xfrm>
-      </p:grpSpPr>
-      <p:sp>
-        <p:nvSpPr>
-          <p:cNvPr id="2" name="Title 1"/>
-          <p:cNvSpPr>
-            <a:spLocks noGrp="1"/>
-          </p:cNvSpPr>
-          <p:nvPr>
-            <p:ph type="title"/>
-          </p:nvPr>
-        </p:nvSpPr>
-        <p:spPr/>
-        <p:txBody>
-          <a:bodyPr/>
-          <a:lstStyle/>
-          <a:p>
-            <a:r>
-              <a:rPr lang="en-US" dirty="0" smtClean="0"/>
-              <a:t>Options</a:t>
-            </a:r>
-            <a:endParaRPr lang="en-US" dirty="0"/>
-          </a:p>
-        </p:txBody>
-      </p:sp>
-      <p:sp>
-        <p:nvSpPr>
-          <p:cNvPr id="3" name="Content Placeholder 2"/>
-          <p:cNvSpPr>
-            <a:spLocks noGrp="1"/>
-          </p:cNvSpPr>
-          <p:nvPr>
-            <p:ph idx="1"/>
-          </p:nvPr>
-        </p:nvSpPr>
-        <p:spPr/>
-        <p:txBody>
-          <a:bodyPr>
-            <a:normAutofit lnSpcReduction="10000"/>
-          </a:bodyPr>
-          <a:lstStyle/>
-          <a:p>
-            <a:r>
-              <a:rPr lang="en-US" dirty="0" smtClean="0"/>
-              <a:t>Hit reload.</a:t>
-            </a:r>
-          </a:p>
-          <a:p>
-            <a:r>
-              <a:rPr lang="en-US" dirty="0" smtClean="0"/>
-              <a:t>Go somewhere else.</a:t>
-            </a:r>
-          </a:p>
-          <a:p>
-            <a:r>
-              <a:rPr lang="en-US" dirty="0" smtClean="0"/>
-              <a:t>Download Manager.</a:t>
-            </a:r>
-          </a:p>
-          <a:p>
-            <a:r>
-              <a:rPr lang="en-US" dirty="0" smtClean="0"/>
-              <a:t>Add a local proxy.</a:t>
-            </a:r>
-          </a:p>
-          <a:p>
-            <a:r>
-              <a:rPr lang="en-US" dirty="0" smtClean="0"/>
-              <a:t>New internet connection.</a:t>
-            </a:r>
-          </a:p>
-          <a:p>
-            <a:r>
-              <a:rPr lang="en-US" dirty="0" smtClean="0"/>
-              <a:t>Beg the server to change how they serve the file</a:t>
-            </a:r>
-            <a:r>
-              <a:rPr lang="en-US" dirty="0" smtClean="0"/>
-              <a:t>.</a:t>
-            </a:r>
-          </a:p>
-          <a:p>
-            <a:r>
-              <a:rPr lang="en-US" dirty="0" smtClean="0"/>
-              <a:t>I now give </a:t>
-            </a:r>
-            <a:r>
-              <a:rPr lang="en-US" smtClean="0"/>
-              <a:t>you another option.</a:t>
-            </a:r>
-            <a:endParaRPr lang="en-US" dirty="0"/>
-          </a:p>
-        </p:txBody>
-      </p:sp>
-    </p:spTree>
-  </p:cSld>
-  <p:clrMapOvr>
-    <a:masterClrMapping/>
-  </p:clrMapOvr>
-</p:sld>
-</file>
-
 <file path=ppt/slides/slide5.xml><?xml version="1.0" encoding="utf-8"?>
 <p:sld xmlns:a="http://schemas.openxmlformats.org/drawingml/2006/main" xmlns:r="http://schemas.openxmlformats.org/officeDocument/2006/relationships" xmlns:p="http://schemas.openxmlformats.org/presentationml/2006/main">
   <p:cSld>
@@ -4465,7 +4691,7 @@
           <a:p>
             <a:r>
               <a:rPr lang="en-US" dirty="0" smtClean="0"/>
-              <a:t>Server options</a:t>
+              <a:t>Options</a:t>
             </a:r>
             <a:endParaRPr lang="en-US" dirty="0"/>
           </a:p>
@@ -4483,31 +4709,50 @@
         </p:nvSpPr>
         <p:spPr/>
         <p:txBody>
-          <a:bodyPr/>
+          <a:bodyPr>
+            <a:normAutofit/>
+          </a:bodyPr>
           <a:lstStyle/>
           <a:p>
             <a:r>
               <a:rPr lang="en-US" dirty="0" smtClean="0"/>
-              <a:t>Buy more servers/move</a:t>
+              <a:t>Hit reload.</a:t>
             </a:r>
           </a:p>
           <a:p>
             <a:r>
               <a:rPr lang="en-US" dirty="0" smtClean="0"/>
-              <a:t>CDN</a:t>
+              <a:t>Go somewhere else.</a:t>
             </a:r>
           </a:p>
           <a:p>
             <a:r>
               <a:rPr lang="en-US" dirty="0" smtClean="0"/>
-              <a:t>Buy more bandwidth.</a:t>
+              <a:t>Download Manager.</a:t>
             </a:r>
           </a:p>
           <a:p>
             <a:r>
               <a:rPr lang="en-US" dirty="0" smtClean="0"/>
-              <a:t>Turn to P2P.</a:t>
-            </a:r>
+              <a:t>Add a local proxy.</a:t>
+            </a:r>
+          </a:p>
+          <a:p>
+            <a:r>
+              <a:rPr lang="en-US" dirty="0" smtClean="0"/>
+              <a:t>New internet connection.</a:t>
+            </a:r>
+          </a:p>
+          <a:p>
+            <a:r>
+              <a:rPr lang="en-US" dirty="0" smtClean="0"/>
+              <a:t>Beg the server to change how they serve the file</a:t>
+            </a:r>
+            <a:r>
+              <a:rPr lang="en-US" dirty="0" smtClean="0"/>
+              <a:t>.</a:t>
+            </a:r>
+            <a:endParaRPr lang="en-US" dirty="0" smtClean="0"/>
           </a:p>
         </p:txBody>
       </p:sp>
@@ -4553,7 +4798,7 @@
           <a:p>
             <a:r>
               <a:rPr lang="en-US" dirty="0" smtClean="0"/>
-              <a:t>P2P</a:t>
+              <a:t>Server options</a:t>
             </a:r>
             <a:endParaRPr lang="en-US" dirty="0"/>
           </a:p>
@@ -4576,35 +4821,45 @@
           <a:p>
             <a:r>
               <a:rPr lang="en-US" dirty="0" smtClean="0"/>
-              <a:t>Create </a:t>
-            </a:r>
-            <a:r>
-              <a:rPr lang="en-US" dirty="0" err="1" smtClean="0"/>
-              <a:t>BitTorrent</a:t>
-            </a:r>
+              <a:t>Buy more bandwidth.</a:t>
+            </a:r>
+          </a:p>
+          <a:p>
             <a:r>
               <a:rPr lang="en-US" dirty="0" smtClean="0"/>
-              <a:t> File.</a:t>
+              <a:t>Move.</a:t>
             </a:r>
           </a:p>
           <a:p>
             <a:r>
               <a:rPr lang="en-US" dirty="0" smtClean="0"/>
-              <a:t>Host it, with tracker.</a:t>
-            </a:r>
-          </a:p>
-          <a:p>
+              <a:t>Buy </a:t>
+            </a:r>
             <a:r>
               <a:rPr lang="en-US" dirty="0" smtClean="0"/>
-              <a:t>Peers share.</a:t>
-            </a:r>
-          </a:p>
-          <a:p>
+              <a:t>more </a:t>
+            </a:r>
             <a:r>
               <a:rPr lang="en-US" dirty="0" smtClean="0"/>
-              <a:t>Barrier to use.</a:t>
-            </a:r>
-            <a:endParaRPr lang="en-US" dirty="0"/>
+              <a:t>servers.</a:t>
+            </a:r>
+            <a:endParaRPr lang="en-US" dirty="0" smtClean="0"/>
+          </a:p>
+          <a:p>
+            <a:r>
+              <a:rPr lang="en-US" dirty="0" smtClean="0"/>
+              <a:t>CDN</a:t>
+            </a:r>
+          </a:p>
+          <a:p>
+            <a:r>
+              <a:rPr lang="en-US" dirty="0" smtClean="0"/>
+              <a:t>Turn </a:t>
+            </a:r>
+            <a:r>
+              <a:rPr lang="en-US" dirty="0" smtClean="0"/>
+              <a:t>to P2P.</a:t>
+            </a:r>
           </a:p>
         </p:txBody>
       </p:sp>
@@ -4650,7 +4905,108 @@
           <a:p>
             <a:r>
               <a:rPr lang="en-US" dirty="0" smtClean="0"/>
-              <a:t>Hard</a:t>
+              <a:t>P2P</a:t>
+            </a:r>
+            <a:endParaRPr lang="en-US" dirty="0"/>
+          </a:p>
+        </p:txBody>
+      </p:sp>
+      <p:sp>
+        <p:nvSpPr>
+          <p:cNvPr id="3" name="Content Placeholder 2"/>
+          <p:cNvSpPr>
+            <a:spLocks noGrp="1"/>
+          </p:cNvSpPr>
+          <p:nvPr>
+            <p:ph idx="1"/>
+          </p:nvPr>
+        </p:nvSpPr>
+        <p:spPr/>
+        <p:txBody>
+          <a:bodyPr/>
+          <a:lstStyle/>
+          <a:p>
+            <a:r>
+              <a:rPr lang="en-US" dirty="0" smtClean="0"/>
+              <a:t>Peers share.</a:t>
+            </a:r>
+          </a:p>
+          <a:p>
+            <a:r>
+              <a:rPr lang="en-US" dirty="0" smtClean="0"/>
+              <a:t>Create </a:t>
+            </a:r>
+            <a:r>
+              <a:rPr lang="en-US" dirty="0" err="1" smtClean="0"/>
+              <a:t>BitTorrent</a:t>
+            </a:r>
+            <a:r>
+              <a:rPr lang="en-US" dirty="0" smtClean="0"/>
+              <a:t> File.</a:t>
+            </a:r>
+          </a:p>
+          <a:p>
+            <a:r>
+              <a:rPr lang="en-US" dirty="0" smtClean="0"/>
+              <a:t>Host it, with tracker</a:t>
+            </a:r>
+            <a:r>
+              <a:rPr lang="en-US" dirty="0" smtClean="0"/>
+              <a:t>.</a:t>
+            </a:r>
+            <a:endParaRPr lang="en-US" dirty="0" smtClean="0"/>
+          </a:p>
+        </p:txBody>
+      </p:sp>
+    </p:spTree>
+  </p:cSld>
+  <p:clrMapOvr>
+    <a:masterClrMapping/>
+  </p:clrMapOvr>
+</p:sld>
+</file>
+
+<file path=ppt/slides/slide8.xml><?xml version="1.0" encoding="utf-8"?>
+<p:sld xmlns:a="http://schemas.openxmlformats.org/drawingml/2006/main" xmlns:r="http://schemas.openxmlformats.org/officeDocument/2006/relationships" xmlns:p="http://schemas.openxmlformats.org/presentationml/2006/main">
+  <p:cSld>
+    <p:spTree>
+      <p:nvGrpSpPr>
+        <p:cNvPr id="1" name=""/>
+        <p:cNvGrpSpPr/>
+        <p:nvPr/>
+      </p:nvGrpSpPr>
+      <p:grpSpPr>
+        <a:xfrm>
+          <a:off x="0" y="0"/>
+          <a:ext cx="0" cy="0"/>
+          <a:chOff x="0" y="0"/>
+          <a:chExt cx="0" cy="0"/>
+        </a:xfrm>
+      </p:grpSpPr>
+      <p:sp>
+        <p:nvSpPr>
+          <p:cNvPr id="2" name="Title 1"/>
+          <p:cNvSpPr>
+            <a:spLocks noGrp="1"/>
+          </p:cNvSpPr>
+          <p:nvPr>
+            <p:ph type="title"/>
+          </p:nvPr>
+        </p:nvSpPr>
+        <p:spPr/>
+        <p:txBody>
+          <a:bodyPr>
+            <a:normAutofit/>
+          </a:bodyPr>
+          <a:lstStyle/>
+          <a:p>
+            <a:r>
+              <a:rPr lang="en-US" dirty="0" smtClean="0"/>
+              <a:t>Barrier to use</a:t>
+            </a:r>
+            <a:r>
+              <a:rPr lang="en-US" dirty="0" smtClean="0"/>
+              <a:t>.</a:t>
             </a:r>
             <a:endParaRPr lang="en-US" dirty="0"/>
           </a:p>
@@ -4706,6 +5062,13 @@
   <p:clrMapOvr>
     <a:masterClrMapping/>
   </p:clrMapOvr>
+  <p:timing>
+    <p:tnLst>
+      <p:par>
+        <p:cTn id="1" dur="indefinite" restart="never" nodeType="tmRoot"/>
+      </p:par>
+    </p:tnLst>
+  </p:timing>
 </p:sld>
 </file>
 

</xml_diff>

<commit_message>
update from the flash drive
</commit_message>
<xml_diff>
--- a/thesis_presentation/How to Make the Internet Faster.pptx
+++ b/thesis_presentation/How to Make the Internet Faster.pptx
@@ -1065,6 +1065,14 @@
           </a:bodyPr>
           <a:lstStyle/>
           <a:p>
+            <a:r>
+              <a:rPr lang="en-US" dirty="0" smtClean="0"/>
+              <a:t>This is no comparison.  Show once I have a</a:t>
+            </a:r>
+            <a:r>
+              <a:rPr lang="en-US" baseline="0" dirty="0" smtClean="0"/>
+              <a:t> real graph.</a:t>
+            </a:r>
             <a:endParaRPr lang="en-US" dirty="0"/>
           </a:p>
         </p:txBody>
@@ -1147,7 +1155,15 @@
           </a:bodyPr>
           <a:lstStyle/>
           <a:p>
-            <a:endParaRPr lang="en-US"/>
+            <a:r>
+              <a:rPr lang="en-US" dirty="0" smtClean="0"/>
+              <a:t>Say</a:t>
+            </a:r>
+            <a:r>
+              <a:rPr lang="en-US" baseline="0" dirty="0" smtClean="0"/>
+              <a:t> what type of loads we’re going to use (et al).</a:t>
+            </a:r>
+            <a:endParaRPr lang="en-US" dirty="0"/>
           </a:p>
         </p:txBody>
       </p:sp>
@@ -1311,7 +1327,15 @@
           </a:bodyPr>
           <a:lstStyle/>
           <a:p>
-            <a:endParaRPr lang="en-US"/>
+            <a:r>
+              <a:rPr lang="en-US" dirty="0" smtClean="0"/>
+              <a:t>Please another graph here. </a:t>
+            </a:r>
+            <a:r>
+              <a:rPr lang="en-US" smtClean="0"/>
+              <a:t>Please?</a:t>
+            </a:r>
+            <a:endParaRPr lang="en-US" dirty="0"/>
           </a:p>
         </p:txBody>
       </p:sp>
@@ -2322,7 +2346,7 @@
           <a:p>
             <a:r>
               <a:rPr lang="en-US" dirty="0" smtClean="0"/>
-              <a:t>Today's Internet is slow.  It is.</a:t>
+              <a:t>Today's Internet is sometimes slow.  It is.</a:t>
             </a:r>
           </a:p>
           <a:p>
@@ -2355,6 +2379,19 @@
             <a:endParaRPr lang="en-US" dirty="0" smtClean="0"/>
           </a:p>
           <a:p>
+            <a:endParaRPr lang="en-US" dirty="0" smtClean="0"/>
+          </a:p>
+          <a:p>
+            <a:r>
+              <a:rPr lang="en-US" dirty="0" err="1" smtClean="0"/>
+              <a:t>Lodo</a:t>
+            </a:r>
+            <a:r>
+              <a:rPr lang="en-US" dirty="0" smtClean="0"/>
+              <a:t>:</a:t>
+            </a:r>
+          </a:p>
+          <a:p>
             <a:r>
               <a:rPr lang="en-US" dirty="0" smtClean="0"/>
               <a:t>Add</a:t>
@@ -2363,16 +2400,7 @@
               <a:rPr lang="en-US" baseline="0" dirty="0" smtClean="0"/>
               <a:t> a graph of network speed increasing so slowly compared to processors [?]</a:t>
             </a:r>
-          </a:p>
-          <a:p>
             <a:endParaRPr lang="en-US" baseline="0" dirty="0" smtClean="0"/>
-          </a:p>
-          <a:p>
-            <a:r>
-              <a:rPr lang="en-US" baseline="0" dirty="0" smtClean="0"/>
-              <a:t>“exacerbated by the fact that it’s quite possible that one of my co-workers just downloaded this, and if we collaborated, I could have downloaded it much faster.”</a:t>
-            </a:r>
-            <a:endParaRPr lang="en-US" dirty="0" smtClean="0"/>
           </a:p>
         </p:txBody>
       </p:sp>
@@ -2460,13 +2488,8 @@
             </a:r>
             <a:r>
               <a:rPr lang="en-US" baseline="0" dirty="0" smtClean="0"/>
-              <a:t> hard to use because not integrated, also the server might run out of </a:t>
-            </a:r>
-            <a:r>
-              <a:rPr lang="en-US" baseline="0" dirty="0" smtClean="0"/>
-              <a:t>bandwidth.</a:t>
-            </a:r>
-            <a:endParaRPr lang="en-US" baseline="0" dirty="0" smtClean="0"/>
+              <a:t> hard to use because not integrated, also the server might run out of bandwidth.</a:t>
+            </a:r>
           </a:p>
           <a:p>
             <a:endParaRPr lang="en-US" baseline="0" dirty="0" smtClean="0"/>
@@ -2558,6 +2581,34 @@
           </a:bodyPr>
           <a:lstStyle/>
           <a:p>
+            <a:pPr marL="0" marR="0" indent="0" algn="l" defTabSz="914400" rtl="0" eaLnBrk="1" fontAlgn="auto" latinLnBrk="0" hangingPunct="1">
+              <a:lnSpc>
+                <a:spcPct val="100000"/>
+              </a:lnSpc>
+              <a:spcBef>
+                <a:spcPts val="0"/>
+              </a:spcBef>
+              <a:spcAft>
+                <a:spcPts val="0"/>
+              </a:spcAft>
+              <a:buClrTx/>
+              <a:buSzTx/>
+              <a:buFontTx/>
+              <a:buNone/>
+              <a:tabLst/>
+              <a:defRPr/>
+            </a:pPr>
+            <a:r>
+              <a:rPr lang="en-US" baseline="0" dirty="0" smtClean="0"/>
+              <a:t>TODO add CDN </a:t>
+            </a:r>
+            <a:r>
+              <a:rPr lang="en-US" baseline="0" dirty="0" err="1" smtClean="0"/>
+              <a:t>pic</a:t>
+            </a:r>
+            <a:endParaRPr lang="en-US" dirty="0" smtClean="0"/>
+          </a:p>
+          <a:p>
             <a:endParaRPr lang="en-US" dirty="0"/>
           </a:p>
         </p:txBody>
@@ -2655,11 +2706,7 @@
           <a:p>
             <a:r>
               <a:rPr lang="en-US" baseline="0" dirty="0" smtClean="0"/>
-              <a:t>“Melissa style” </a:t>
-            </a:r>
-            <a:r>
-              <a:rPr lang="en-US" baseline="0" dirty="0" smtClean="0"/>
-              <a:t>explanation (you download half, your friend downloads half, you share </a:t>
+              <a:t>“Melissa style” explanation (you download half, your friend downloads half, you share </a:t>
             </a:r>
             <a:r>
               <a:rPr lang="en-US" baseline="0" dirty="0" err="1" smtClean="0"/>
@@ -6143,15 +6190,7 @@
           <a:p>
             <a:r>
               <a:rPr lang="en-US" dirty="0" smtClean="0"/>
-              <a:t>Making </a:t>
-            </a:r>
-            <a:r>
-              <a:rPr lang="en-US" dirty="0" smtClean="0"/>
-              <a:t>Today’s Internet </a:t>
-            </a:r>
-            <a:r>
-              <a:rPr lang="en-US" dirty="0" smtClean="0"/>
-              <a:t>Faster</a:t>
+              <a:t>Making Today’s Internet Faster</a:t>
             </a:r>
             <a:endParaRPr lang="en-US" dirty="0"/>
           </a:p>
@@ -6661,7 +6700,7 @@
 </file>
 
 <file path=ppt/slides/slide15.xml><?xml version="1.0" encoding="utf-8"?>
-<p:sld xmlns:a="http://schemas.openxmlformats.org/drawingml/2006/main" xmlns:r="http://schemas.openxmlformats.org/officeDocument/2006/relationships" xmlns:p="http://schemas.openxmlformats.org/presentationml/2006/main">
+<p:sld xmlns:a="http://schemas.openxmlformats.org/drawingml/2006/main" xmlns:r="http://schemas.openxmlformats.org/officeDocument/2006/relationships" xmlns:p="http://schemas.openxmlformats.org/presentationml/2006/main" show="0">
   <p:cSld>
     <p:spTree>
       <p:nvGrpSpPr>
@@ -6769,6 +6808,7 @@
   <p:clrMapOvr>
     <a:masterClrMapping/>
   </p:clrMapOvr>
+  <p:transition/>
 </p:sld>
 </file>
 
@@ -7025,7 +7065,7 @@
       </p:sp>
       <p:pic>
         <p:nvPicPr>
-          <p:cNvPr id="8194" name="Picture 2"/>
+          <p:cNvPr id="4" name="Picture 3"/>
           <p:cNvPicPr>
             <a:picLocks noChangeAspect="1" noChangeArrowheads="1"/>
           </p:cNvPicPr>
@@ -7040,8 +7080,8 @@
         </p:blipFill>
         <p:spPr bwMode="auto">
           <a:xfrm>
-            <a:off x="457200" y="1600200"/>
-            <a:ext cx="7479155" cy="4410075"/>
+            <a:off x="-9525" y="1852613"/>
+            <a:ext cx="9163050" cy="3152775"/>
           </a:xfrm>
           <a:prstGeom prst="rect">
             <a:avLst/>
@@ -8048,12 +8088,27 @@
             <p:ph idx="1"/>
           </p:nvPr>
         </p:nvSpPr>
-        <p:spPr/>
-        <p:txBody>
-          <a:bodyPr/>
-          <a:lstStyle/>
-          <a:p>
-            <a:endParaRPr lang="en-US"/>
+        <p:spPr>
+          <a:xfrm>
+            <a:off x="457200" y="4038600"/>
+            <a:ext cx="8229600" cy="2087563"/>
+          </a:xfrm>
+        </p:spPr>
+        <p:txBody>
+          <a:bodyPr/>
+          <a:lstStyle/>
+          <a:p>
+            <a:r>
+              <a:rPr lang="en-US" dirty="0" smtClean="0"/>
+              <a:t>Frustration</a:t>
+            </a:r>
+          </a:p>
+          <a:p>
+            <a:r>
+              <a:rPr lang="en-US" dirty="0" smtClean="0"/>
+              <a:t>Wasted bandwidth</a:t>
+            </a:r>
+            <a:endParaRPr lang="en-US" dirty="0"/>
           </a:p>
         </p:txBody>
       </p:sp>
@@ -8158,11 +8213,7 @@
           <a:p>
             <a:r>
               <a:rPr lang="en-US" dirty="0" smtClean="0"/>
-              <a:t>My o</a:t>
-            </a:r>
-            <a:r>
-              <a:rPr lang="en-US" dirty="0" smtClean="0"/>
-              <a:t>ptions</a:t>
+              <a:t>My options</a:t>
             </a:r>
             <a:endParaRPr lang="en-US" dirty="0"/>
           </a:p>
@@ -8211,11 +8262,7 @@
           <a:p>
             <a:r>
               <a:rPr lang="en-US" dirty="0" smtClean="0"/>
-              <a:t>Beg the server to change how they serve the file</a:t>
-            </a:r>
-            <a:r>
-              <a:rPr lang="en-US" dirty="0" smtClean="0"/>
-              <a:t>.</a:t>
+              <a:t>Beg the server to change how they serve the file.</a:t>
             </a:r>
           </a:p>
         </p:txBody>
@@ -8297,11 +8344,7 @@
           <a:p>
             <a:r>
               <a:rPr lang="en-US" dirty="0" smtClean="0"/>
-              <a:t>Buy more servers/rent a </a:t>
-            </a:r>
-            <a:r>
-              <a:rPr lang="en-US" dirty="0" smtClean="0"/>
-              <a:t>CDN</a:t>
+              <a:t>Buy more servers/rent a CDN</a:t>
             </a:r>
           </a:p>
           <a:p>
@@ -8313,13 +8356,8 @@
           <a:p>
             <a:r>
               <a:rPr lang="en-US" dirty="0" smtClean="0"/>
-              <a:t>Flash flood</a:t>
-            </a:r>
-            <a:r>
-              <a:rPr lang="en-US" dirty="0" smtClean="0"/>
-              <a:t>.</a:t>
-            </a:r>
-            <a:endParaRPr lang="en-US" dirty="0" smtClean="0"/>
+              <a:t>Flash flood.</a:t>
+            </a:r>
           </a:p>
           <a:p>
             <a:r>
@@ -8440,11 +8478,7 @@
           <a:p>
             <a:r>
               <a:rPr lang="en-US" dirty="0" smtClean="0"/>
-              <a:t>Peers download and share</a:t>
-            </a:r>
-            <a:r>
-              <a:rPr lang="en-US" dirty="0" smtClean="0"/>
-              <a:t>.</a:t>
+              <a:t>Peers download and share.</a:t>
             </a:r>
           </a:p>
           <a:p>

</xml_diff>

<commit_message>
some good additions...conclusion still needs some love
</commit_message>
<xml_diff>
--- a/thesis_presentation/How to Make the Internet Faster.pptx
+++ b/thesis_presentation/How to Make the Internet Faster.pptx
@@ -5,35 +5,42 @@
     <p:sldMasterId id="2147483648" r:id="rId1"/>
   </p:sldMasterIdLst>
   <p:notesMasterIdLst>
-    <p:notesMasterId r:id="rId28"/>
+    <p:notesMasterId r:id="rId35"/>
   </p:notesMasterIdLst>
   <p:sldIdLst>
     <p:sldId id="256" r:id="rId2"/>
     <p:sldId id="263" r:id="rId3"/>
-    <p:sldId id="257" r:id="rId4"/>
-    <p:sldId id="258" r:id="rId5"/>
-    <p:sldId id="259" r:id="rId6"/>
-    <p:sldId id="260" r:id="rId7"/>
-    <p:sldId id="261" r:id="rId8"/>
-    <p:sldId id="262" r:id="rId9"/>
-    <p:sldId id="265" r:id="rId10"/>
-    <p:sldId id="264" r:id="rId11"/>
-    <p:sldId id="266" r:id="rId12"/>
-    <p:sldId id="267" r:id="rId13"/>
-    <p:sldId id="268" r:id="rId14"/>
-    <p:sldId id="269" r:id="rId15"/>
-    <p:sldId id="281" r:id="rId16"/>
-    <p:sldId id="270" r:id="rId17"/>
-    <p:sldId id="271" r:id="rId18"/>
-    <p:sldId id="272" r:id="rId19"/>
-    <p:sldId id="273" r:id="rId20"/>
-    <p:sldId id="274" r:id="rId21"/>
-    <p:sldId id="275" r:id="rId22"/>
-    <p:sldId id="276" r:id="rId23"/>
-    <p:sldId id="277" r:id="rId24"/>
-    <p:sldId id="278" r:id="rId25"/>
-    <p:sldId id="279" r:id="rId26"/>
-    <p:sldId id="280" r:id="rId27"/>
+    <p:sldId id="284" r:id="rId4"/>
+    <p:sldId id="257" r:id="rId5"/>
+    <p:sldId id="258" r:id="rId6"/>
+    <p:sldId id="259" r:id="rId7"/>
+    <p:sldId id="260" r:id="rId8"/>
+    <p:sldId id="282" r:id="rId9"/>
+    <p:sldId id="261" r:id="rId10"/>
+    <p:sldId id="283" r:id="rId11"/>
+    <p:sldId id="287" r:id="rId12"/>
+    <p:sldId id="262" r:id="rId13"/>
+    <p:sldId id="288" r:id="rId14"/>
+    <p:sldId id="265" r:id="rId15"/>
+    <p:sldId id="266" r:id="rId16"/>
+    <p:sldId id="267" r:id="rId17"/>
+    <p:sldId id="286" r:id="rId18"/>
+    <p:sldId id="285" r:id="rId19"/>
+    <p:sldId id="268" r:id="rId20"/>
+    <p:sldId id="269" r:id="rId21"/>
+    <p:sldId id="281" r:id="rId22"/>
+    <p:sldId id="270" r:id="rId23"/>
+    <p:sldId id="271" r:id="rId24"/>
+    <p:sldId id="272" r:id="rId25"/>
+    <p:sldId id="273" r:id="rId26"/>
+    <p:sldId id="274" r:id="rId27"/>
+    <p:sldId id="275" r:id="rId28"/>
+    <p:sldId id="276" r:id="rId29"/>
+    <p:sldId id="277" r:id="rId30"/>
+    <p:sldId id="278" r:id="rId31"/>
+    <p:sldId id="279" r:id="rId32"/>
+    <p:sldId id="289" r:id="rId33"/>
+    <p:sldId id="280" r:id="rId34"/>
   </p:sldIdLst>
   <p:sldSz cx="9144000" cy="6858000" type="screen4x3"/>
   <p:notesSz cx="6858000" cy="9144000"/>
@@ -530,6 +537,22 @@
           </a:bodyPr>
           <a:lstStyle/>
           <a:p>
+            <a:r>
+              <a:rPr lang="en-US" dirty="0" smtClean="0"/>
+              <a:t>Making P2P more adoptable.</a:t>
+            </a:r>
+          </a:p>
+          <a:p>
+            <a:r>
+              <a:rPr lang="en-US" dirty="0" smtClean="0"/>
+              <a:t>More usable.</a:t>
+            </a:r>
+          </a:p>
+          <a:p>
+            <a:r>
+              <a:rPr lang="en-US" dirty="0" smtClean="0"/>
+              <a:t>Useful in more situations.</a:t>
+            </a:r>
             <a:endParaRPr lang="en-US" dirty="0"/>
           </a:p>
         </p:txBody>
@@ -612,42 +635,10 @@
           </a:bodyPr>
           <a:lstStyle/>
           <a:p>
-            <a:endParaRPr lang="en-US" baseline="0" dirty="0" smtClean="0"/>
-          </a:p>
-          <a:p>
-            <a:r>
-              <a:rPr lang="en-US" dirty="0" smtClean="0"/>
-              <a:t>" [cross each one out in turn] -- ours is a purely client-side modification, so servers don’t have to be</a:t>
-            </a:r>
-            <a:r>
-              <a:rPr lang="en-US" baseline="0" dirty="0" smtClean="0"/>
-              <a:t> set up with extra configuration</a:t>
-            </a:r>
             <a:endParaRPr lang="en-US" dirty="0" smtClean="0"/>
           </a:p>
           <a:p>
-            <a:r>
-              <a:rPr lang="en-US" dirty="0" smtClean="0"/>
-              <a:t>To participate, nor even opt-in ... [3]</a:t>
-            </a:r>
-          </a:p>
-          <a:p>
-            <a:endParaRPr lang="en-US" dirty="0" smtClean="0"/>
-          </a:p>
-          <a:p>
-            <a:r>
-              <a:rPr lang="en-US" dirty="0" smtClean="0"/>
-              <a:t>Ours provides an automatic transition to P2P, so even with small files it can switch automatically, which makes it  more user-friendly [no manual intervention required] [2].</a:t>
-            </a:r>
-          </a:p>
-          <a:p>
-            <a:endParaRPr lang="en-US" dirty="0" smtClean="0"/>
-          </a:p>
-          <a:p>
-            <a:r>
-              <a:rPr lang="en-US" dirty="0" smtClean="0"/>
-              <a:t>Ours uses standard client-server until this is deemed slow, so it "knows" when P2P will be faster, thus alleviating the user from having to choose whether to ignore it or not [1].</a:t>
-            </a:r>
+            <a:endParaRPr lang="en-US" dirty="0"/>
           </a:p>
         </p:txBody>
       </p:sp>
@@ -669,7 +660,7 @@
             <a:fld id="{CFD85767-B34F-4122-8642-982296400DCD}" type="slidenum">
               <a:rPr lang="en-US" smtClean="0"/>
               <a:pPr/>
-              <a:t>10</a:t>
+              <a:t>12</a:t>
             </a:fld>
             <a:endParaRPr lang="en-US"/>
           </a:p>
@@ -729,9 +720,48 @@
           </a:bodyPr>
           <a:lstStyle/>
           <a:p>
-            <a:r>
-              <a:rPr lang="en-US" dirty="0" smtClean="0"/>
-              <a:t>TODO ADD W TO THIS</a:t>
+            <a:pPr marL="0" marR="0" indent="0" algn="l" defTabSz="914400" rtl="0" eaLnBrk="1" fontAlgn="auto" latinLnBrk="0" hangingPunct="1">
+              <a:lnSpc>
+                <a:spcPct val="100000"/>
+              </a:lnSpc>
+              <a:spcBef>
+                <a:spcPts val="0"/>
+              </a:spcBef>
+              <a:spcAft>
+                <a:spcPts val="0"/>
+              </a:spcAft>
+              <a:buClrTx/>
+              <a:buSzTx/>
+              <a:buFontTx/>
+              <a:buNone/>
+              <a:tabLst/>
+              <a:defRPr/>
+            </a:pPr>
+            <a:r>
+              <a:rPr lang="en-US" baseline="0" dirty="0" smtClean="0"/>
+              <a:t>Automatic Swarming, which aims to alleviate these problems.</a:t>
+            </a:r>
+          </a:p>
+          <a:p>
+            <a:endParaRPr lang="en-US" dirty="0" smtClean="0"/>
+          </a:p>
+          <a:p>
+            <a:r>
+              <a:rPr lang="en-US" dirty="0" smtClean="0"/>
+              <a:t>All areas where BT falls short.</a:t>
+            </a:r>
+          </a:p>
+          <a:p>
+            <a:endParaRPr lang="en-US" dirty="0" smtClean="0"/>
+          </a:p>
+          <a:p>
+            <a:r>
+              <a:rPr lang="en-US" dirty="0" smtClean="0"/>
+              <a:t>Also: only go to P2P when necessary</a:t>
+            </a:r>
+            <a:r>
+              <a:rPr lang="en-US" baseline="0" dirty="0" smtClean="0"/>
+              <a:t> (try to be as fast as normal download).</a:t>
             </a:r>
             <a:endParaRPr lang="en-US" dirty="0"/>
           </a:p>
@@ -755,7 +785,7 @@
             <a:fld id="{CFD85767-B34F-4122-8642-982296400DCD}" type="slidenum">
               <a:rPr lang="en-US" smtClean="0"/>
               <a:pPr/>
-              <a:t>11</a:t>
+              <a:t>13</a:t>
             </a:fld>
             <a:endParaRPr lang="en-US"/>
           </a:p>
@@ -815,11 +845,7 @@
           </a:bodyPr>
           <a:lstStyle/>
           <a:p>
-            <a:r>
-              <a:rPr lang="en-US" dirty="0" smtClean="0"/>
-              <a:t>No more depth needed, uh guess.</a:t>
-            </a:r>
-            <a:endParaRPr lang="en-US" dirty="0"/>
+            <a:endParaRPr lang="en-US" dirty="0" smtClean="0"/>
           </a:p>
         </p:txBody>
       </p:sp>
@@ -841,7 +867,7 @@
             <a:fld id="{CFD85767-B34F-4122-8642-982296400DCD}" type="slidenum">
               <a:rPr lang="en-US" smtClean="0"/>
               <a:pPr/>
-              <a:t>12</a:t>
+              <a:t>14</a:t>
             </a:fld>
             <a:endParaRPr lang="en-US"/>
           </a:p>
@@ -901,7 +927,7 @@
           </a:bodyPr>
           <a:lstStyle/>
           <a:p>
-            <a:endParaRPr lang="en-US"/>
+            <a:endParaRPr lang="en-US" dirty="0"/>
           </a:p>
         </p:txBody>
       </p:sp>
@@ -923,7 +949,7 @@
             <a:fld id="{CFD85767-B34F-4122-8642-982296400DCD}" type="slidenum">
               <a:rPr lang="en-US" smtClean="0"/>
               <a:pPr/>
-              <a:t>13</a:t>
+              <a:t>15</a:t>
             </a:fld>
             <a:endParaRPr lang="en-US"/>
           </a:p>
@@ -983,7 +1009,11 @@
           </a:bodyPr>
           <a:lstStyle/>
           <a:p>
-            <a:endParaRPr lang="en-US"/>
+            <a:r>
+              <a:rPr lang="en-US" dirty="0" smtClean="0"/>
+              <a:t>No more depth needed, uh guess.</a:t>
+            </a:r>
+            <a:endParaRPr lang="en-US" dirty="0"/>
           </a:p>
         </p:txBody>
       </p:sp>
@@ -1005,7 +1035,7 @@
             <a:fld id="{CFD85767-B34F-4122-8642-982296400DCD}" type="slidenum">
               <a:rPr lang="en-US" smtClean="0"/>
               <a:pPr/>
-              <a:t>14</a:t>
+              <a:t>16</a:t>
             </a:fld>
             <a:endParaRPr lang="en-US"/>
           </a:p>
@@ -1067,11 +1097,15 @@
           <a:p>
             <a:r>
               <a:rPr lang="en-US" dirty="0" smtClean="0"/>
-              <a:t>This is no comparison.  Show once I have a</a:t>
-            </a:r>
-            <a:r>
-              <a:rPr lang="en-US" baseline="0" dirty="0" smtClean="0"/>
-              <a:t> real graph.</a:t>
+              <a:t>Add </a:t>
+            </a:r>
+            <a:r>
+              <a:rPr lang="en-US" dirty="0" err="1" smtClean="0"/>
+              <a:t>descr</a:t>
+            </a:r>
+            <a:r>
+              <a:rPr lang="en-US" dirty="0" smtClean="0"/>
+              <a:t>. picture here?</a:t>
             </a:r>
             <a:endParaRPr lang="en-US" dirty="0"/>
           </a:p>
@@ -1095,7 +1129,7 @@
             <a:fld id="{CFD85767-B34F-4122-8642-982296400DCD}" type="slidenum">
               <a:rPr lang="en-US" smtClean="0"/>
               <a:pPr/>
-              <a:t>15</a:t>
+              <a:t>17</a:t>
             </a:fld>
             <a:endParaRPr lang="en-US"/>
           </a:p>
@@ -1155,15 +1189,7 @@
           </a:bodyPr>
           <a:lstStyle/>
           <a:p>
-            <a:r>
-              <a:rPr lang="en-US" dirty="0" smtClean="0"/>
-              <a:t>Say</a:t>
-            </a:r>
-            <a:r>
-              <a:rPr lang="en-US" baseline="0" dirty="0" smtClean="0"/>
-              <a:t> what type of loads we’re going to use (et al).</a:t>
-            </a:r>
-            <a:endParaRPr lang="en-US" dirty="0"/>
+            <a:endParaRPr lang="en-US"/>
           </a:p>
         </p:txBody>
       </p:sp>
@@ -1185,7 +1211,7 @@
             <a:fld id="{CFD85767-B34F-4122-8642-982296400DCD}" type="slidenum">
               <a:rPr lang="en-US" smtClean="0"/>
               <a:pPr/>
-              <a:t>16</a:t>
+              <a:t>19</a:t>
             </a:fld>
             <a:endParaRPr lang="en-US"/>
           </a:p>
@@ -1267,7 +1293,7 @@
             <a:fld id="{CFD85767-B34F-4122-8642-982296400DCD}" type="slidenum">
               <a:rPr lang="en-US" smtClean="0"/>
               <a:pPr/>
-              <a:t>17</a:t>
+              <a:t>20</a:t>
             </a:fld>
             <a:endParaRPr lang="en-US"/>
           </a:p>
@@ -1329,11 +1355,11 @@
           <a:p>
             <a:r>
               <a:rPr lang="en-US" dirty="0" smtClean="0"/>
-              <a:t>Please another graph here. </a:t>
-            </a:r>
-            <a:r>
-              <a:rPr lang="en-US" smtClean="0"/>
-              <a:t>Please?</a:t>
+              <a:t>This is no comparison.  Show once I have a</a:t>
+            </a:r>
+            <a:r>
+              <a:rPr lang="en-US" baseline="0" dirty="0" smtClean="0"/>
+              <a:t> real graph.</a:t>
             </a:r>
             <a:endParaRPr lang="en-US" dirty="0"/>
           </a:p>
@@ -1357,7 +1383,7 @@
             <a:fld id="{CFD85767-B34F-4122-8642-982296400DCD}" type="slidenum">
               <a:rPr lang="en-US" smtClean="0"/>
               <a:pPr/>
-              <a:t>18</a:t>
+              <a:t>21</a:t>
             </a:fld>
             <a:endParaRPr lang="en-US"/>
           </a:p>
@@ -1419,11 +1445,11 @@
           <a:p>
             <a:r>
               <a:rPr lang="en-US" dirty="0" smtClean="0"/>
-              <a:t>Not much change, really.  Because it</a:t>
+              <a:t>Say</a:t>
             </a:r>
             <a:r>
               <a:rPr lang="en-US" baseline="0" dirty="0" smtClean="0"/>
-              <a:t> only affected at most the first few,  because after that the server became saturated and T would always fire first.</a:t>
+              <a:t> what type of loads we’re going to use (et al).</a:t>
             </a:r>
             <a:endParaRPr lang="en-US" dirty="0"/>
           </a:p>
@@ -1447,7 +1473,7 @@
             <a:fld id="{CFD85767-B34F-4122-8642-982296400DCD}" type="slidenum">
               <a:rPr lang="en-US" smtClean="0"/>
               <a:pPr/>
-              <a:t>19</a:t>
+              <a:t>22</a:t>
             </a:fld>
             <a:endParaRPr lang="en-US"/>
           </a:p>
@@ -1606,15 +1632,7 @@
           </a:bodyPr>
           <a:lstStyle/>
           <a:p>
-            <a:r>
-              <a:rPr lang="en-US" dirty="0" smtClean="0"/>
-              <a:t>Note that our linger time was 20</a:t>
-            </a:r>
-            <a:r>
-              <a:rPr lang="en-US" baseline="0" dirty="0" smtClean="0"/>
-              <a:t> seconds, so the DHT was becoming less effective under higher load.</a:t>
-            </a:r>
-            <a:endParaRPr lang="en-US" dirty="0"/>
+            <a:endParaRPr lang="en-US"/>
           </a:p>
         </p:txBody>
       </p:sp>
@@ -1636,7 +1654,7 @@
             <a:fld id="{CFD85767-B34F-4122-8642-982296400DCD}" type="slidenum">
               <a:rPr lang="en-US" smtClean="0"/>
               <a:pPr/>
-              <a:t>20</a:t>
+              <a:t>23</a:t>
             </a:fld>
             <a:endParaRPr lang="en-US"/>
           </a:p>
@@ -1696,7 +1714,15 @@
           </a:bodyPr>
           <a:lstStyle/>
           <a:p>
-            <a:endParaRPr lang="en-US"/>
+            <a:r>
+              <a:rPr lang="en-US" dirty="0" smtClean="0"/>
+              <a:t>Please another graph here. </a:t>
+            </a:r>
+            <a:r>
+              <a:rPr lang="en-US" smtClean="0"/>
+              <a:t>Please?</a:t>
+            </a:r>
+            <a:endParaRPr lang="en-US" dirty="0"/>
           </a:p>
         </p:txBody>
       </p:sp>
@@ -1718,7 +1744,7 @@
             <a:fld id="{CFD85767-B34F-4122-8642-982296400DCD}" type="slidenum">
               <a:rPr lang="en-US" smtClean="0"/>
               <a:pPr/>
-              <a:t>21</a:t>
+              <a:t>24</a:t>
             </a:fld>
             <a:endParaRPr lang="en-US"/>
           </a:p>
@@ -1780,11 +1806,11 @@
           <a:p>
             <a:r>
               <a:rPr lang="en-US" dirty="0" smtClean="0"/>
-              <a:t>Fastest</a:t>
+              <a:t>Not much change, really.  Because it</a:t>
             </a:r>
             <a:r>
               <a:rPr lang="en-US" baseline="0" dirty="0" smtClean="0"/>
-              <a:t> was 32 KB, presumably because I download from the last few peers in parallel, so this fits best.</a:t>
+              <a:t> only affected at most the first few,  because after that the server became saturated and T would always fire first.</a:t>
             </a:r>
             <a:endParaRPr lang="en-US" dirty="0"/>
           </a:p>
@@ -1808,7 +1834,7 @@
             <a:fld id="{CFD85767-B34F-4122-8642-982296400DCD}" type="slidenum">
               <a:rPr lang="en-US" smtClean="0"/>
               <a:pPr/>
-              <a:t>22</a:t>
+              <a:t>25</a:t>
             </a:fld>
             <a:endParaRPr lang="en-US"/>
           </a:p>
@@ -1868,7 +1894,15 @@
           </a:bodyPr>
           <a:lstStyle/>
           <a:p>
-            <a:endParaRPr lang="en-US"/>
+            <a:r>
+              <a:rPr lang="en-US" dirty="0" smtClean="0"/>
+              <a:t>Note that our linger time was 20</a:t>
+            </a:r>
+            <a:r>
+              <a:rPr lang="en-US" baseline="0" dirty="0" smtClean="0"/>
+              <a:t> seconds, so the DHT was becoming less effective under higher load.</a:t>
+            </a:r>
+            <a:endParaRPr lang="en-US" dirty="0"/>
           </a:p>
         </p:txBody>
       </p:sp>
@@ -1890,7 +1924,7 @@
             <a:fld id="{CFD85767-B34F-4122-8642-982296400DCD}" type="slidenum">
               <a:rPr lang="en-US" smtClean="0"/>
               <a:pPr/>
-              <a:t>23</a:t>
+              <a:t>26</a:t>
             </a:fld>
             <a:endParaRPr lang="en-US"/>
           </a:p>
@@ -1950,32 +1984,7 @@
           </a:bodyPr>
           <a:lstStyle/>
           <a:p>
-            <a:r>
-              <a:rPr lang="en-US" dirty="0" smtClean="0"/>
-              <a:t>“Ours doesn’t perform</a:t>
-            </a:r>
-            <a:r>
-              <a:rPr lang="en-US" baseline="0" dirty="0" smtClean="0"/>
-              <a:t> as </a:t>
-            </a:r>
-            <a:r>
-              <a:rPr lang="en-US" dirty="0" smtClean="0"/>
-              <a:t>well as BT for</a:t>
-            </a:r>
-            <a:r>
-              <a:rPr lang="en-US" baseline="0" dirty="0" smtClean="0"/>
-              <a:t> large files.”</a:t>
-            </a:r>
-          </a:p>
-          <a:p>
-            <a:endParaRPr lang="en-US" baseline="0" dirty="0" smtClean="0"/>
-          </a:p>
-          <a:p>
-            <a:r>
-              <a:rPr lang="en-US" baseline="0" dirty="0" smtClean="0"/>
-              <a:t>You can see that at about 730 to 882 seconds most of our peers finish the file, and most of the peers download it from peers, so once we get the file out there we work all right, but we could do some work still to increase our speed of propagating the blocks.”</a:t>
-            </a:r>
-            <a:endParaRPr lang="en-US" dirty="0"/>
+            <a:endParaRPr lang="en-US"/>
           </a:p>
         </p:txBody>
       </p:sp>
@@ -1997,7 +2006,7 @@
             <a:fld id="{CFD85767-B34F-4122-8642-982296400DCD}" type="slidenum">
               <a:rPr lang="en-US" smtClean="0"/>
               <a:pPr/>
-              <a:t>24</a:t>
+              <a:t>27</a:t>
             </a:fld>
             <a:endParaRPr lang="en-US"/>
           </a:p>
@@ -2059,44 +2068,11 @@
           <a:p>
             <a:r>
               <a:rPr lang="en-US" dirty="0" smtClean="0"/>
-              <a:t>"real" use is probably currently [who knows for sure] "most useful in the wild" for larger static files, still.  </a:t>
-            </a:r>
-          </a:p>
-          <a:p>
-            <a:endParaRPr lang="en-US" dirty="0" smtClean="0"/>
-          </a:p>
-          <a:p>
-            <a:r>
-              <a:rPr lang="en-US" dirty="0" smtClean="0"/>
-              <a:t>Kind of an auto-</a:t>
-            </a:r>
-            <a:r>
-              <a:rPr lang="en-US" dirty="0" err="1" smtClean="0"/>
-              <a:t>BitTorrent</a:t>
-            </a:r>
-            <a:r>
-              <a:rPr lang="en-US" dirty="0" smtClean="0"/>
-              <a:t> for all files on the Internet, though we have shown it can work well for small files, too,</a:t>
+              <a:t>Fastest</a:t>
             </a:r>
             <a:r>
               <a:rPr lang="en-US" baseline="0" dirty="0" smtClean="0"/>
-              <a:t> so something like this could become</a:t>
-            </a:r>
-          </a:p>
-          <a:p>
-            <a:r>
-              <a:rPr lang="en-US" baseline="0" dirty="0" smtClean="0"/>
-              <a:t>A real contribution to browsing the Internet.</a:t>
-            </a:r>
-            <a:endParaRPr lang="en-US" dirty="0" smtClean="0"/>
-          </a:p>
-          <a:p>
-            <a:endParaRPr lang="en-US" dirty="0" smtClean="0"/>
-          </a:p>
-          <a:p>
-            <a:r>
-              <a:rPr lang="en-US" dirty="0" smtClean="0"/>
-              <a:t>Demo?</a:t>
+              <a:t> was 32 KB, presumably because I download from the last few peers in parallel, so this fits best.</a:t>
             </a:r>
             <a:endParaRPr lang="en-US" dirty="0"/>
           </a:p>
@@ -2120,7 +2096,7 @@
             <a:fld id="{CFD85767-B34F-4122-8642-982296400DCD}" type="slidenum">
               <a:rPr lang="en-US" smtClean="0"/>
               <a:pPr/>
-              <a:t>25</a:t>
+              <a:t>28</a:t>
             </a:fld>
             <a:endParaRPr lang="en-US"/>
           </a:p>
@@ -2180,6 +2156,113 @@
           </a:bodyPr>
           <a:lstStyle/>
           <a:p>
+            <a:endParaRPr lang="en-US"/>
+          </a:p>
+        </p:txBody>
+      </p:sp>
+      <p:sp>
+        <p:nvSpPr>
+          <p:cNvPr id="4" name="Slide Number Placeholder 3"/>
+          <p:cNvSpPr>
+            <a:spLocks noGrp="1"/>
+          </p:cNvSpPr>
+          <p:nvPr>
+            <p:ph type="sldNum" sz="quarter" idx="10"/>
+          </p:nvPr>
+        </p:nvSpPr>
+        <p:spPr/>
+        <p:txBody>
+          <a:bodyPr/>
+          <a:lstStyle/>
+          <a:p>
+            <a:fld id="{CFD85767-B34F-4122-8642-982296400DCD}" type="slidenum">
+              <a:rPr lang="en-US" smtClean="0"/>
+              <a:pPr/>
+              <a:t>29</a:t>
+            </a:fld>
+            <a:endParaRPr lang="en-US"/>
+          </a:p>
+        </p:txBody>
+      </p:sp>
+    </p:spTree>
+  </p:cSld>
+  <p:clrMapOvr>
+    <a:masterClrMapping/>
+  </p:clrMapOvr>
+</p:notes>
+</file>
+
+<file path=ppt/notesSlides/notesSlide27.xml><?xml version="1.0" encoding="utf-8"?>
+<p:notes xmlns:a="http://schemas.openxmlformats.org/drawingml/2006/main" xmlns:r="http://schemas.openxmlformats.org/officeDocument/2006/relationships" xmlns:p="http://schemas.openxmlformats.org/presentationml/2006/main">
+  <p:cSld>
+    <p:spTree>
+      <p:nvGrpSpPr>
+        <p:cNvPr id="1" name=""/>
+        <p:cNvGrpSpPr/>
+        <p:nvPr/>
+      </p:nvGrpSpPr>
+      <p:grpSpPr>
+        <a:xfrm>
+          <a:off x="0" y="0"/>
+          <a:ext cx="0" cy="0"/>
+          <a:chOff x="0" y="0"/>
+          <a:chExt cx="0" cy="0"/>
+        </a:xfrm>
+      </p:grpSpPr>
+      <p:sp>
+        <p:nvSpPr>
+          <p:cNvPr id="2" name="Slide Image Placeholder 1"/>
+          <p:cNvSpPr>
+            <a:spLocks noGrp="1" noRot="1" noChangeAspect="1"/>
+          </p:cNvSpPr>
+          <p:nvPr>
+            <p:ph type="sldImg"/>
+          </p:nvPr>
+        </p:nvSpPr>
+        <p:spPr/>
+      </p:sp>
+      <p:sp>
+        <p:nvSpPr>
+          <p:cNvPr id="3" name="Notes Placeholder 2"/>
+          <p:cNvSpPr>
+            <a:spLocks noGrp="1"/>
+          </p:cNvSpPr>
+          <p:nvPr>
+            <p:ph type="body" idx="1"/>
+          </p:nvPr>
+        </p:nvSpPr>
+        <p:spPr/>
+        <p:txBody>
+          <a:bodyPr>
+            <a:normAutofit/>
+          </a:bodyPr>
+          <a:lstStyle/>
+          <a:p>
+            <a:r>
+              <a:rPr lang="en-US" dirty="0" smtClean="0"/>
+              <a:t>“Ours doesn’t perform</a:t>
+            </a:r>
+            <a:r>
+              <a:rPr lang="en-US" baseline="0" dirty="0" smtClean="0"/>
+              <a:t> as </a:t>
+            </a:r>
+            <a:r>
+              <a:rPr lang="en-US" dirty="0" smtClean="0"/>
+              <a:t>well as BT for</a:t>
+            </a:r>
+            <a:r>
+              <a:rPr lang="en-US" baseline="0" dirty="0" smtClean="0"/>
+              <a:t> large files.”</a:t>
+            </a:r>
+          </a:p>
+          <a:p>
+            <a:endParaRPr lang="en-US" baseline="0" dirty="0" smtClean="0"/>
+          </a:p>
+          <a:p>
+            <a:r>
+              <a:rPr lang="en-US" baseline="0" dirty="0" smtClean="0"/>
+              <a:t>You can see that at about 730 to 882 seconds most of our peers finish the file, and most of the peers download it from peers, so once we get the file out there we work all right, but we could do some work still to increase our speed of propagating the blocks.”</a:t>
+            </a:r>
             <a:endParaRPr lang="en-US" dirty="0"/>
           </a:p>
         </p:txBody>
@@ -2202,7 +2285,247 @@
             <a:fld id="{CFD85767-B34F-4122-8642-982296400DCD}" type="slidenum">
               <a:rPr lang="en-US" smtClean="0"/>
               <a:pPr/>
-              <a:t>26</a:t>
+              <a:t>30</a:t>
+            </a:fld>
+            <a:endParaRPr lang="en-US"/>
+          </a:p>
+        </p:txBody>
+      </p:sp>
+    </p:spTree>
+  </p:cSld>
+  <p:clrMapOvr>
+    <a:masterClrMapping/>
+  </p:clrMapOvr>
+</p:notes>
+</file>
+
+<file path=ppt/notesSlides/notesSlide28.xml><?xml version="1.0" encoding="utf-8"?>
+<p:notes xmlns:a="http://schemas.openxmlformats.org/drawingml/2006/main" xmlns:r="http://schemas.openxmlformats.org/officeDocument/2006/relationships" xmlns:p="http://schemas.openxmlformats.org/presentationml/2006/main">
+  <p:cSld>
+    <p:spTree>
+      <p:nvGrpSpPr>
+        <p:cNvPr id="1" name=""/>
+        <p:cNvGrpSpPr/>
+        <p:nvPr/>
+      </p:nvGrpSpPr>
+      <p:grpSpPr>
+        <a:xfrm>
+          <a:off x="0" y="0"/>
+          <a:ext cx="0" cy="0"/>
+          <a:chOff x="0" y="0"/>
+          <a:chExt cx="0" cy="0"/>
+        </a:xfrm>
+      </p:grpSpPr>
+      <p:sp>
+        <p:nvSpPr>
+          <p:cNvPr id="2" name="Slide Image Placeholder 1"/>
+          <p:cNvSpPr>
+            <a:spLocks noGrp="1" noRot="1" noChangeAspect="1"/>
+          </p:cNvSpPr>
+          <p:nvPr>
+            <p:ph type="sldImg"/>
+          </p:nvPr>
+        </p:nvSpPr>
+        <p:spPr/>
+      </p:sp>
+      <p:sp>
+        <p:nvSpPr>
+          <p:cNvPr id="3" name="Notes Placeholder 2"/>
+          <p:cNvSpPr>
+            <a:spLocks noGrp="1"/>
+          </p:cNvSpPr>
+          <p:nvPr>
+            <p:ph type="body" idx="1"/>
+          </p:nvPr>
+        </p:nvSpPr>
+        <p:spPr/>
+        <p:txBody>
+          <a:bodyPr>
+            <a:normAutofit/>
+          </a:bodyPr>
+          <a:lstStyle/>
+          <a:p>
+            <a:r>
+              <a:rPr lang="en-US" dirty="0" smtClean="0"/>
+              <a:t>"real" use is probably currently [who knows for sure] "most useful in the wild" for larger static files, still.  </a:t>
+            </a:r>
+          </a:p>
+          <a:p>
+            <a:endParaRPr lang="en-US" dirty="0" smtClean="0"/>
+          </a:p>
+          <a:p>
+            <a:r>
+              <a:rPr lang="en-US" dirty="0" smtClean="0"/>
+              <a:t>Kind of an auto-</a:t>
+            </a:r>
+            <a:r>
+              <a:rPr lang="en-US" dirty="0" err="1" smtClean="0"/>
+              <a:t>BitTorrent</a:t>
+            </a:r>
+            <a:r>
+              <a:rPr lang="en-US" dirty="0" smtClean="0"/>
+              <a:t> for all files on the Internet, though we have shown it can work well for small files, too,</a:t>
+            </a:r>
+            <a:r>
+              <a:rPr lang="en-US" baseline="0" dirty="0" smtClean="0"/>
+              <a:t> so something like this could become</a:t>
+            </a:r>
+          </a:p>
+          <a:p>
+            <a:r>
+              <a:rPr lang="en-US" baseline="0" dirty="0" smtClean="0"/>
+              <a:t>A real contribution to browsing the Internet.</a:t>
+            </a:r>
+            <a:endParaRPr lang="en-US" dirty="0" smtClean="0"/>
+          </a:p>
+          <a:p>
+            <a:endParaRPr lang="en-US" dirty="0" smtClean="0"/>
+          </a:p>
+          <a:p>
+            <a:r>
+              <a:rPr lang="en-US" dirty="0" smtClean="0"/>
+              <a:t>Demo?</a:t>
+            </a:r>
+            <a:endParaRPr lang="en-US" dirty="0"/>
+          </a:p>
+        </p:txBody>
+      </p:sp>
+      <p:sp>
+        <p:nvSpPr>
+          <p:cNvPr id="4" name="Slide Number Placeholder 3"/>
+          <p:cNvSpPr>
+            <a:spLocks noGrp="1"/>
+          </p:cNvSpPr>
+          <p:nvPr>
+            <p:ph type="sldNum" sz="quarter" idx="10"/>
+          </p:nvPr>
+        </p:nvSpPr>
+        <p:spPr/>
+        <p:txBody>
+          <a:bodyPr/>
+          <a:lstStyle/>
+          <a:p>
+            <a:fld id="{CFD85767-B34F-4122-8642-982296400DCD}" type="slidenum">
+              <a:rPr lang="en-US" smtClean="0"/>
+              <a:pPr/>
+              <a:t>31</a:t>
+            </a:fld>
+            <a:endParaRPr lang="en-US"/>
+          </a:p>
+        </p:txBody>
+      </p:sp>
+    </p:spTree>
+  </p:cSld>
+  <p:clrMapOvr>
+    <a:masterClrMapping/>
+  </p:clrMapOvr>
+</p:notes>
+</file>
+
+<file path=ppt/notesSlides/notesSlide29.xml><?xml version="1.0" encoding="utf-8"?>
+<p:notes xmlns:a="http://schemas.openxmlformats.org/drawingml/2006/main" xmlns:r="http://schemas.openxmlformats.org/officeDocument/2006/relationships" xmlns:p="http://schemas.openxmlformats.org/presentationml/2006/main">
+  <p:cSld>
+    <p:spTree>
+      <p:nvGrpSpPr>
+        <p:cNvPr id="1" name=""/>
+        <p:cNvGrpSpPr/>
+        <p:nvPr/>
+      </p:nvGrpSpPr>
+      <p:grpSpPr>
+        <a:xfrm>
+          <a:off x="0" y="0"/>
+          <a:ext cx="0" cy="0"/>
+          <a:chOff x="0" y="0"/>
+          <a:chExt cx="0" cy="0"/>
+        </a:xfrm>
+      </p:grpSpPr>
+      <p:sp>
+        <p:nvSpPr>
+          <p:cNvPr id="2" name="Slide Image Placeholder 1"/>
+          <p:cNvSpPr>
+            <a:spLocks noGrp="1" noRot="1" noChangeAspect="1"/>
+          </p:cNvSpPr>
+          <p:nvPr>
+            <p:ph type="sldImg"/>
+          </p:nvPr>
+        </p:nvSpPr>
+        <p:spPr/>
+      </p:sp>
+      <p:sp>
+        <p:nvSpPr>
+          <p:cNvPr id="3" name="Notes Placeholder 2"/>
+          <p:cNvSpPr>
+            <a:spLocks noGrp="1"/>
+          </p:cNvSpPr>
+          <p:nvPr>
+            <p:ph type="body" idx="1"/>
+          </p:nvPr>
+        </p:nvSpPr>
+        <p:spPr/>
+        <p:txBody>
+          <a:bodyPr>
+            <a:normAutofit/>
+          </a:bodyPr>
+          <a:lstStyle/>
+          <a:p>
+            <a:endParaRPr lang="en-US" baseline="0" dirty="0" smtClean="0"/>
+          </a:p>
+          <a:p>
+            <a:r>
+              <a:rPr lang="en-US" dirty="0" smtClean="0"/>
+              <a:t>" [cross each one out in turn] -- ours is a purely client-side modification, so servers don’t have to be</a:t>
+            </a:r>
+            <a:r>
+              <a:rPr lang="en-US" baseline="0" dirty="0" smtClean="0"/>
+              <a:t> set up with extra configuration</a:t>
+            </a:r>
+            <a:endParaRPr lang="en-US" dirty="0" smtClean="0"/>
+          </a:p>
+          <a:p>
+            <a:r>
+              <a:rPr lang="en-US" dirty="0" smtClean="0"/>
+              <a:t>To participate, nor even opt-in ... [3]</a:t>
+            </a:r>
+          </a:p>
+          <a:p>
+            <a:endParaRPr lang="en-US" dirty="0" smtClean="0"/>
+          </a:p>
+          <a:p>
+            <a:r>
+              <a:rPr lang="en-US" dirty="0" smtClean="0"/>
+              <a:t>Ours provides an automatic transition to P2P, so even with small files it can switch automatically, which makes it  more user-friendly [no manual intervention required] [2].</a:t>
+            </a:r>
+          </a:p>
+          <a:p>
+            <a:endParaRPr lang="en-US" dirty="0" smtClean="0"/>
+          </a:p>
+          <a:p>
+            <a:r>
+              <a:rPr lang="en-US" dirty="0" smtClean="0"/>
+              <a:t>Ours uses standard client-server until this is deemed slow, so it "knows" when P2P will be faster, thus alleviating the user from having to choose whether to ignore it or not [1].</a:t>
+            </a:r>
+          </a:p>
+        </p:txBody>
+      </p:sp>
+      <p:sp>
+        <p:nvSpPr>
+          <p:cNvPr id="4" name="Slide Number Placeholder 3"/>
+          <p:cNvSpPr>
+            <a:spLocks noGrp="1"/>
+          </p:cNvSpPr>
+          <p:nvPr>
+            <p:ph type="sldNum" sz="quarter" idx="10"/>
+          </p:nvPr>
+        </p:nvSpPr>
+        <p:spPr/>
+        <p:txBody>
+          <a:bodyPr/>
+          <a:lstStyle/>
+          <a:p>
+            <a:fld id="{CFD85767-B34F-4122-8642-982296400DCD}" type="slidenum">
+              <a:rPr lang="en-US" smtClean="0"/>
+              <a:pPr/>
+              <a:t>32</a:t>
             </a:fld>
             <a:endParaRPr lang="en-US"/>
           </a:p>
@@ -2284,7 +2607,89 @@
             <a:fld id="{CFD85767-B34F-4122-8642-982296400DCD}" type="slidenum">
               <a:rPr lang="en-US" smtClean="0"/>
               <a:pPr/>
-              <a:t>3</a:t>
+              <a:t>4</a:t>
+            </a:fld>
+            <a:endParaRPr lang="en-US"/>
+          </a:p>
+        </p:txBody>
+      </p:sp>
+    </p:spTree>
+  </p:cSld>
+  <p:clrMapOvr>
+    <a:masterClrMapping/>
+  </p:clrMapOvr>
+</p:notes>
+</file>
+
+<file path=ppt/notesSlides/notesSlide30.xml><?xml version="1.0" encoding="utf-8"?>
+<p:notes xmlns:a="http://schemas.openxmlformats.org/drawingml/2006/main" xmlns:r="http://schemas.openxmlformats.org/officeDocument/2006/relationships" xmlns:p="http://schemas.openxmlformats.org/presentationml/2006/main">
+  <p:cSld>
+    <p:spTree>
+      <p:nvGrpSpPr>
+        <p:cNvPr id="1" name=""/>
+        <p:cNvGrpSpPr/>
+        <p:nvPr/>
+      </p:nvGrpSpPr>
+      <p:grpSpPr>
+        <a:xfrm>
+          <a:off x="0" y="0"/>
+          <a:ext cx="0" cy="0"/>
+          <a:chOff x="0" y="0"/>
+          <a:chExt cx="0" cy="0"/>
+        </a:xfrm>
+      </p:grpSpPr>
+      <p:sp>
+        <p:nvSpPr>
+          <p:cNvPr id="2" name="Slide Image Placeholder 1"/>
+          <p:cNvSpPr>
+            <a:spLocks noGrp="1" noRot="1" noChangeAspect="1"/>
+          </p:cNvSpPr>
+          <p:nvPr>
+            <p:ph type="sldImg"/>
+          </p:nvPr>
+        </p:nvSpPr>
+        <p:spPr/>
+      </p:sp>
+      <p:sp>
+        <p:nvSpPr>
+          <p:cNvPr id="3" name="Notes Placeholder 2"/>
+          <p:cNvSpPr>
+            <a:spLocks noGrp="1"/>
+          </p:cNvSpPr>
+          <p:nvPr>
+            <p:ph type="body" idx="1"/>
+          </p:nvPr>
+        </p:nvSpPr>
+        <p:spPr/>
+        <p:txBody>
+          <a:bodyPr>
+            <a:normAutofit/>
+          </a:bodyPr>
+          <a:lstStyle/>
+          <a:p>
+            <a:endParaRPr lang="en-US" dirty="0"/>
+          </a:p>
+        </p:txBody>
+      </p:sp>
+      <p:sp>
+        <p:nvSpPr>
+          <p:cNvPr id="4" name="Slide Number Placeholder 3"/>
+          <p:cNvSpPr>
+            <a:spLocks noGrp="1"/>
+          </p:cNvSpPr>
+          <p:nvPr>
+            <p:ph type="sldNum" sz="quarter" idx="10"/>
+          </p:nvPr>
+        </p:nvSpPr>
+        <p:spPr/>
+        <p:txBody>
+          <a:bodyPr/>
+          <a:lstStyle/>
+          <a:p>
+            <a:fld id="{CFD85767-B34F-4122-8642-982296400DCD}" type="slidenum">
+              <a:rPr lang="en-US" smtClean="0"/>
+              <a:pPr/>
+              <a:t>33</a:t>
             </a:fld>
             <a:endParaRPr lang="en-US"/>
           </a:p>
@@ -2398,9 +2803,16 @@
             </a:r>
             <a:r>
               <a:rPr lang="en-US" baseline="0" dirty="0" smtClean="0"/>
-              <a:t> a graph of network speed increasing so slowly compared to processors [?]</a:t>
-            </a:r>
-            <a:endParaRPr lang="en-US" baseline="0" dirty="0" smtClean="0"/>
+              <a:t> a graph of </a:t>
+            </a:r>
+            <a:r>
+              <a:rPr lang="en-US" baseline="0" dirty="0" smtClean="0"/>
+              <a:t>network </a:t>
+            </a:r>
+            <a:r>
+              <a:rPr lang="en-US" baseline="0" dirty="0" smtClean="0"/>
+              <a:t>speed increasing so slowly compared to processors [?]</a:t>
+            </a:r>
           </a:p>
         </p:txBody>
       </p:sp>
@@ -2422,7 +2834,7 @@
             <a:fld id="{CFD85767-B34F-4122-8642-982296400DCD}" type="slidenum">
               <a:rPr lang="en-US" smtClean="0"/>
               <a:pPr/>
-              <a:t>4</a:t>
+              <a:t>5</a:t>
             </a:fld>
             <a:endParaRPr lang="en-US"/>
           </a:p>
@@ -2497,7 +2909,26 @@
           <a:p>
             <a:r>
               <a:rPr lang="en-US" baseline="0" dirty="0" smtClean="0"/>
-              <a:t>Adding a local proxy doesn’t help if the file hasn’t been downloaded locally already—same exact problem in many cases.</a:t>
+              <a:t>Adding a local proxy doesn’t help if the file hasn’t been downloaded locally already—same exact problem in many cases</a:t>
+            </a:r>
+            <a:r>
+              <a:rPr lang="en-US" baseline="0" dirty="0" smtClean="0"/>
+              <a:t>.</a:t>
+            </a:r>
+          </a:p>
+          <a:p>
+            <a:endParaRPr lang="en-US" baseline="0" dirty="0" smtClean="0"/>
+          </a:p>
+          <a:p>
+            <a:r>
+              <a:rPr lang="en-US" baseline="0" dirty="0" smtClean="0"/>
+              <a:t>“Go and do something else”</a:t>
+            </a:r>
+          </a:p>
+          <a:p>
+            <a:r>
+              <a:rPr lang="en-US" baseline="0" dirty="0" smtClean="0"/>
+              <a:t>“Go and read your email”</a:t>
             </a:r>
             <a:endParaRPr lang="en-US" dirty="0"/>
           </a:p>
@@ -2521,7 +2952,7 @@
             <a:fld id="{CFD85767-B34F-4122-8642-982296400DCD}" type="slidenum">
               <a:rPr lang="en-US" smtClean="0"/>
               <a:pPr/>
-              <a:t>5</a:t>
+              <a:t>6</a:t>
             </a:fld>
             <a:endParaRPr lang="en-US"/>
           </a:p>
@@ -2631,7 +3062,7 @@
             <a:fld id="{CFD85767-B34F-4122-8642-982296400DCD}" type="slidenum">
               <a:rPr lang="en-US" smtClean="0"/>
               <a:pPr/>
-              <a:t>6</a:t>
+              <a:t>7</a:t>
             </a:fld>
             <a:endParaRPr lang="en-US"/>
           </a:p>
@@ -2691,9 +3122,47 @@
           </a:bodyPr>
           <a:lstStyle/>
           <a:p>
-            <a:r>
-              <a:rPr lang="en-US" dirty="0" smtClean="0"/>
-              <a:t>You don’t need any extra servers, peers do most of the extra</a:t>
+            <a:pPr marL="0" marR="0" indent="0" algn="l" defTabSz="914400" rtl="0" eaLnBrk="1" fontAlgn="auto" latinLnBrk="0" hangingPunct="1">
+              <a:lnSpc>
+                <a:spcPct val="100000"/>
+              </a:lnSpc>
+              <a:spcBef>
+                <a:spcPts val="0"/>
+              </a:spcBef>
+              <a:spcAft>
+                <a:spcPts val="0"/>
+              </a:spcAft>
+              <a:buClrTx/>
+              <a:buSzTx/>
+              <a:buFontTx/>
+              <a:buNone/>
+              <a:tabLst/>
+              <a:defRPr/>
+            </a:pPr>
+            <a:r>
+              <a:rPr lang="en-US" baseline="0" dirty="0" smtClean="0"/>
+              <a:t>“Melissa style” explanation (you download half, your friend downloads half, you share </a:t>
+            </a:r>
+            <a:r>
+              <a:rPr lang="en-US" baseline="0" dirty="0" err="1" smtClean="0"/>
+              <a:t>halfs</a:t>
+            </a:r>
+            <a:r>
+              <a:rPr lang="en-US" baseline="0" dirty="0" smtClean="0"/>
+              <a:t>).</a:t>
+            </a:r>
+          </a:p>
+          <a:p>
+            <a:endParaRPr lang="en-US" dirty="0" smtClean="0"/>
+          </a:p>
+          <a:p>
+            <a:r>
+              <a:rPr lang="en-US" dirty="0" smtClean="0"/>
+              <a:t>You </a:t>
+            </a:r>
+            <a:r>
+              <a:rPr lang="en-US" dirty="0" smtClean="0"/>
+              <a:t>don’t need any extra servers, peers do most of the extra</a:t>
             </a:r>
             <a:r>
               <a:rPr lang="en-US" baseline="0" dirty="0" smtClean="0"/>
@@ -2704,19 +3173,59 @@
             <a:endParaRPr lang="en-US" baseline="0" dirty="0" smtClean="0"/>
           </a:p>
           <a:p>
-            <a:r>
-              <a:rPr lang="en-US" baseline="0" dirty="0" smtClean="0"/>
-              <a:t>“Melissa style” explanation (you download half, your friend downloads half, you share </a:t>
-            </a:r>
-            <a:r>
-              <a:rPr lang="en-US" baseline="0" dirty="0" err="1" smtClean="0"/>
-              <a:t>halfs</a:t>
-            </a:r>
-            <a:r>
-              <a:rPr lang="en-US" baseline="0" smtClean="0"/>
-              <a:t>).</a:t>
-            </a:r>
-            <a:endParaRPr lang="en-US" dirty="0"/>
+            <a:pPr marL="0" marR="0" indent="0" algn="l" defTabSz="914400" rtl="0" eaLnBrk="1" fontAlgn="auto" latinLnBrk="0" hangingPunct="1">
+              <a:lnSpc>
+                <a:spcPct val="100000"/>
+              </a:lnSpc>
+              <a:spcBef>
+                <a:spcPts val="0"/>
+              </a:spcBef>
+              <a:spcAft>
+                <a:spcPts val="0"/>
+              </a:spcAft>
+              <a:buClrTx/>
+              <a:buSzTx/>
+              <a:buFontTx/>
+              <a:buNone/>
+              <a:tabLst/>
+              <a:defRPr/>
+            </a:pPr>
+            <a:r>
+              <a:rPr lang="en-US" sz="1200" b="1" i="0" kern="1200" dirty="0" smtClean="0">
+                <a:solidFill>
+                  <a:schemeClr val="tx1"/>
+                </a:solidFill>
+                <a:latin typeface="+mn-lt"/>
+                <a:ea typeface="+mn-ea"/>
+                <a:cs typeface="+mn-cs"/>
+              </a:rPr>
+              <a:t>Bram: “When I created </a:t>
+            </a:r>
+            <a:r>
+              <a:rPr lang="en-US" sz="1200" b="1" i="0" kern="1200" dirty="0" err="1" smtClean="0">
+                <a:solidFill>
+                  <a:schemeClr val="tx1"/>
+                </a:solidFill>
+                <a:latin typeface="+mn-lt"/>
+                <a:ea typeface="+mn-ea"/>
+                <a:cs typeface="+mn-cs"/>
+              </a:rPr>
+              <a:t>BitTorrent</a:t>
+            </a:r>
+            <a:r>
+              <a:rPr lang="en-US" sz="1200" b="1" i="0" kern="1200" dirty="0" smtClean="0">
+                <a:solidFill>
+                  <a:schemeClr val="tx1"/>
+                </a:solidFill>
+                <a:latin typeface="+mn-lt"/>
+                <a:ea typeface="+mn-ea"/>
+                <a:cs typeface="+mn-cs"/>
+              </a:rPr>
+              <a:t> in 2001, my mission was to solve the problem every website has when distributing large, popular files”</a:t>
+            </a:r>
+          </a:p>
+          <a:p>
+            <a:endParaRPr lang="en-US" baseline="0" dirty="0" smtClean="0"/>
           </a:p>
         </p:txBody>
       </p:sp>
@@ -2738,7 +3247,7 @@
             <a:fld id="{CFD85767-B34F-4122-8642-982296400DCD}" type="slidenum">
               <a:rPr lang="en-US" smtClean="0"/>
               <a:pPr/>
-              <a:t>7</a:t>
+              <a:t>9</a:t>
             </a:fld>
             <a:endParaRPr lang="en-US"/>
           </a:p>
@@ -2794,116 +3303,9 @@
         <p:spPr/>
         <p:txBody>
           <a:bodyPr>
-            <a:normAutofit/>
+            <a:normAutofit lnSpcReduction="10000"/>
           </a:bodyPr>
           <a:lstStyle/>
-          <a:p>
-            <a:r>
-              <a:rPr lang="en-US" dirty="0" smtClean="0"/>
-              <a:t>Hard to setup, Hard to use.</a:t>
-            </a:r>
-          </a:p>
-          <a:p>
-            <a:endParaRPr lang="en-US" dirty="0" smtClean="0"/>
-          </a:p>
-          <a:p>
-            <a:r>
-              <a:rPr lang="en-US" dirty="0" smtClean="0"/>
-              <a:t>There are all sorts of barriers that keep this from actually working.</a:t>
-            </a:r>
-          </a:p>
-          <a:p>
-            <a:endParaRPr lang="en-US" dirty="0" smtClean="0"/>
-          </a:p>
-          <a:p>
-            <a:r>
-              <a:rPr lang="en-US" dirty="0" smtClean="0"/>
-              <a:t>TODO new slide</a:t>
-            </a:r>
-          </a:p>
-          <a:p>
-            <a:endParaRPr lang="en-US" dirty="0" smtClean="0"/>
-          </a:p>
-          <a:p>
-            <a:r>
-              <a:rPr lang="en-US" dirty="0" smtClean="0"/>
-              <a:t>1) The server has to set it up per file.</a:t>
-            </a:r>
-          </a:p>
-          <a:p>
-            <a:endParaRPr lang="en-US" dirty="0" smtClean="0"/>
-          </a:p>
-          <a:p>
-            <a:r>
-              <a:rPr lang="en-US" dirty="0" smtClean="0"/>
-              <a:t>2) When a user runs into this, it typically takes extra time in order to download this way, because you have to go</a:t>
-            </a:r>
-            <a:r>
-              <a:rPr lang="en-US" baseline="0" dirty="0" smtClean="0"/>
-              <a:t> through some extra steps, like</a:t>
-            </a:r>
-          </a:p>
-          <a:p>
-            <a:r>
-              <a:rPr lang="en-US" baseline="0" dirty="0" smtClean="0"/>
-              <a:t>Downloading the .torrent file, then waiting some time for your client to contact the tracker, get peer lists, find peers that are willing to share with you, etc.</a:t>
-            </a:r>
-            <a:endParaRPr lang="en-US" dirty="0" smtClean="0"/>
-          </a:p>
-          <a:p>
-            <a:endParaRPr lang="en-US" dirty="0" smtClean="0"/>
-          </a:p>
-          <a:p>
-            <a:r>
-              <a:rPr lang="en-US" dirty="0" smtClean="0"/>
-              <a:t>3) It should be ignored. Typically (at least for me), it’s slower than just downloading it with the link they provide.</a:t>
-            </a:r>
-          </a:p>
-          <a:p>
-            <a:endParaRPr lang="en-US" dirty="0" smtClean="0"/>
-          </a:p>
-          <a:p>
-            <a:endParaRPr lang="en-US" baseline="0" dirty="0" smtClean="0"/>
-          </a:p>
-          <a:p>
-            <a:r>
-              <a:rPr lang="en-US" dirty="0" smtClean="0"/>
-              <a:t>2) small files</a:t>
-            </a:r>
-          </a:p>
-          <a:p>
-            <a:endParaRPr lang="en-US" dirty="0" smtClean="0"/>
-          </a:p>
-          <a:p>
-            <a:r>
-              <a:rPr lang="en-US" dirty="0" smtClean="0"/>
-              <a:t>It would be painful to have to do this for many small files, like browsing a web page.  Up to 10 files for </a:t>
-            </a:r>
-            <a:r>
-              <a:rPr lang="en-US" dirty="0" err="1" smtClean="0"/>
-              <a:t>byu's</a:t>
-            </a:r>
-            <a:r>
-              <a:rPr lang="en-US" dirty="0" smtClean="0"/>
-              <a:t> web site.  Even if they *did* a </a:t>
-            </a:r>
-            <a:r>
-              <a:rPr lang="en-US" dirty="0" err="1" smtClean="0"/>
-              <a:t>BitTorrent</a:t>
-            </a:r>
-            <a:r>
-              <a:rPr lang="en-US" dirty="0" smtClean="0"/>
-              <a:t> file for each of these small files, today’s systems include a manual step in order to download each file.  Modern browsers don’t handle inline p2p.  So P2P basically</a:t>
-            </a:r>
-            <a:r>
-              <a:rPr lang="en-US" baseline="0" dirty="0" smtClean="0"/>
-              <a:t> can’t be used for a typical web page.</a:t>
-            </a:r>
-            <a:endParaRPr lang="en-US" dirty="0" smtClean="0"/>
-          </a:p>
-          <a:p>
-            <a:endParaRPr lang="en-US" dirty="0" smtClean="0"/>
-          </a:p>
           <a:p>
             <a:pPr marL="0" marR="0" indent="0" algn="l" defTabSz="914400" rtl="0" eaLnBrk="1" fontAlgn="auto" latinLnBrk="0" hangingPunct="1">
               <a:lnSpc>
@@ -2923,12 +3325,14 @@
               <a:defRPr/>
             </a:pPr>
             <a:r>
+              <a:rPr lang="en-US" dirty="0" smtClean="0"/>
+              <a:t>Unknown value to the administrator—its typical value is for large popular files, so if you don’t have</a:t>
+            </a:r>
+            <a:r>
               <a:rPr lang="en-US" baseline="0" dirty="0" smtClean="0"/>
-              <a:t>Technology is there but not easily accessible.</a:t>
-            </a:r>
-          </a:p>
-          <a:p>
-            <a:endParaRPr lang="en-US" baseline="0" dirty="0" smtClean="0"/>
+              <a:t> any of those, it’s not worth it.</a:t>
+            </a:r>
+            <a:endParaRPr lang="en-US" dirty="0" smtClean="0"/>
           </a:p>
           <a:p>
             <a:pPr marL="0" marR="0" indent="0" algn="l" defTabSz="914400" rtl="0" eaLnBrk="1" fontAlgn="auto" latinLnBrk="0" hangingPunct="1">
@@ -2948,6 +3352,26 @@
               <a:tabLst/>
               <a:defRPr/>
             </a:pPr>
+            <a:endParaRPr lang="en-US" dirty="0" smtClean="0"/>
+          </a:p>
+          <a:p>
+            <a:pPr marL="0" marR="0" indent="0" algn="l" defTabSz="914400" rtl="0" eaLnBrk="1" fontAlgn="auto" latinLnBrk="0" hangingPunct="1">
+              <a:lnSpc>
+                <a:spcPct val="100000"/>
+              </a:lnSpc>
+              <a:spcBef>
+                <a:spcPts val="0"/>
+              </a:spcBef>
+              <a:spcAft>
+                <a:spcPts val="0"/>
+              </a:spcAft>
+              <a:buClrTx/>
+              <a:buSzTx/>
+              <a:buFontTx/>
+              <a:buNone/>
+              <a:tabLst/>
+              <a:defRPr/>
+            </a:pPr>
             <a:r>
               <a:rPr lang="en-US" dirty="0" smtClean="0"/>
               <a:t>Because of these barriers,</a:t>
@@ -2965,111 +3389,6 @@
               <a:t>, and many users ignore them even when they are, because of unreliable results.</a:t>
             </a:r>
           </a:p>
-          <a:p>
-            <a:endParaRPr lang="en-US" dirty="0" smtClean="0"/>
-          </a:p>
-          <a:p>
-            <a:r>
-              <a:rPr lang="en-US" baseline="0" dirty="0" smtClean="0"/>
-              <a:t>----Some of the same:</a:t>
-            </a:r>
-            <a:endParaRPr lang="en-US" dirty="0" smtClean="0"/>
-          </a:p>
-          <a:p>
-            <a:endParaRPr lang="en-US" dirty="0" smtClean="0"/>
-          </a:p>
-          <a:p>
-            <a:r>
-              <a:rPr lang="en-US" dirty="0" smtClean="0"/>
-              <a:t>It would annoy the user to death with today's system to have to go and get them all manually.  Not as user-friendly</a:t>
-            </a:r>
-          </a:p>
-          <a:p>
-            <a:endParaRPr lang="en-US" dirty="0" smtClean="0"/>
-          </a:p>
-          <a:p>
-            <a:r>
-              <a:rPr lang="en-US" dirty="0" smtClean="0"/>
-              <a:t>Barrier to entry: know how to use it, choose it, and it has to be fast.  Many people ignore it.</a:t>
-            </a:r>
-          </a:p>
-          <a:p>
-            <a:endParaRPr lang="en-US" dirty="0" smtClean="0"/>
-          </a:p>
-          <a:p>
-            <a:r>
-              <a:rPr lang="en-US" dirty="0" smtClean="0"/>
-              <a:t>Barrier for the</a:t>
-            </a:r>
-            <a:r>
-              <a:rPr lang="en-US" baseline="0" dirty="0" smtClean="0"/>
-              <a:t> server too: setting it up.  Barrier to client: extra cost of time to download/unreliable can cause it to cost you extra time.</a:t>
-            </a:r>
-          </a:p>
-          <a:p>
-            <a:endParaRPr lang="en-US" baseline="0" dirty="0" smtClean="0"/>
-          </a:p>
-          <a:p>
-            <a:r>
-              <a:rPr lang="en-US" dirty="0" smtClean="0"/>
-              <a:t>Barrier: not just the client, but you don’t know if using the client will actually be faster.  Many times it isn’t.</a:t>
-            </a:r>
-          </a:p>
-          <a:p>
-            <a:r>
-              <a:rPr lang="en-US" dirty="0" smtClean="0"/>
-              <a:t>And some</a:t>
-            </a:r>
-            <a:r>
-              <a:rPr lang="en-US" baseline="0" dirty="0" smtClean="0"/>
-              <a:t> sites don’t offer P2P.</a:t>
-            </a:r>
-          </a:p>
-          <a:p>
-            <a:endParaRPr lang="en-US" baseline="0" dirty="0" smtClean="0"/>
-          </a:p>
-          <a:p>
-            <a:r>
-              <a:rPr lang="en-US" baseline="0" dirty="0" smtClean="0"/>
-              <a:t>How many sites actually offer you that stuff?</a:t>
-            </a:r>
-          </a:p>
-          <a:p>
-            <a:endParaRPr lang="en-US" baseline="0" dirty="0" smtClean="0"/>
-          </a:p>
-          <a:p>
-            <a:endParaRPr lang="en-US" baseline="0" dirty="0" smtClean="0"/>
-          </a:p>
-          <a:p>
-            <a:r>
-              <a:rPr lang="en-US" dirty="0" smtClean="0"/>
-              <a:t>1) should be ignored typically [it's slower (but you're never sure when), non standard, typically not integrated with normal HTTP sites--except in a few rare cases].</a:t>
-            </a:r>
-          </a:p>
-          <a:p>
-            <a:endParaRPr lang="en-US" dirty="0" smtClean="0"/>
-          </a:p>
-          <a:p>
-            <a:r>
-              <a:rPr lang="en-US" dirty="0" smtClean="0"/>
-              <a:t>3) Though awesome, most servers don't allow you this option [unless they offer large popular files], as it's extra hassle, non-conventional.</a:t>
-            </a:r>
-          </a:p>
-          <a:p>
-            <a:endParaRPr lang="en-US" dirty="0" smtClean="0"/>
-          </a:p>
-          <a:p>
-            <a:r>
-              <a:rPr lang="en-US" dirty="0" smtClean="0"/>
-              <a:t>[plus any other goals that are actually worth mentioning]</a:t>
-            </a:r>
-          </a:p>
-          <a:p>
-            <a:endParaRPr lang="en-US" dirty="0" smtClean="0"/>
-          </a:p>
-          <a:p>
-            <a:endParaRPr lang="en-US" dirty="0"/>
-          </a:p>
         </p:txBody>
       </p:sp>
       <p:sp>
@@ -3090,7 +3409,7 @@
             <a:fld id="{CFD85767-B34F-4122-8642-982296400DCD}" type="slidenum">
               <a:rPr lang="en-US" smtClean="0"/>
               <a:pPr/>
-              <a:t>8</a:t>
+              <a:t>10</a:t>
             </a:fld>
             <a:endParaRPr lang="en-US"/>
           </a:p>
@@ -3150,6 +3469,29 @@
           </a:bodyPr>
           <a:lstStyle/>
           <a:p>
+            <a:r>
+              <a:rPr lang="en-US" dirty="0" smtClean="0"/>
+              <a:t>It would be annoying for small files because it is so manual.</a:t>
+            </a:r>
+          </a:p>
+          <a:p>
+            <a:endParaRPr lang="en-US" dirty="0" smtClean="0"/>
+          </a:p>
+          <a:p>
+            <a:r>
+              <a:rPr lang="en-US" dirty="0" smtClean="0"/>
+              <a:t>2) When a user runs into this, it typically takes extra time in order to download this way, because you have to go</a:t>
+            </a:r>
+            <a:r>
+              <a:rPr lang="en-US" baseline="0" dirty="0" smtClean="0"/>
+              <a:t> through some extra steps, like downloading the .torrent file, then waiting some time for your client to contact the tracker, get peer lists, find peers that are willing to share with you, etc.</a:t>
+            </a:r>
+            <a:endParaRPr lang="en-US" dirty="0" smtClean="0"/>
+          </a:p>
+          <a:p>
+            <a:endParaRPr lang="en-US" dirty="0" smtClean="0"/>
+          </a:p>
+          <a:p>
             <a:pPr marL="0" marR="0" indent="0" algn="l" defTabSz="914400" rtl="0" eaLnBrk="1" fontAlgn="auto" latinLnBrk="0" hangingPunct="1">
               <a:lnSpc>
                 <a:spcPct val="100000"/>
@@ -3169,24 +3511,81 @@
             </a:pPr>
             <a:r>
               <a:rPr lang="en-US" dirty="0" smtClean="0"/>
-              <a:t>We provide</a:t>
+              <a:t>It would be painful to have to do this for many small files, like browsing a web page.  Up to 10 files for </a:t>
+            </a:r>
+            <a:r>
+              <a:rPr lang="en-US" dirty="0" err="1" smtClean="0"/>
+              <a:t>byu's</a:t>
+            </a:r>
+            <a:r>
+              <a:rPr lang="en-US" dirty="0" smtClean="0"/>
+              <a:t> web site.  Even if they *did* a </a:t>
+            </a:r>
+            <a:r>
+              <a:rPr lang="en-US" dirty="0" err="1" smtClean="0"/>
+              <a:t>BitTorrent</a:t>
+            </a:r>
+            <a:r>
+              <a:rPr lang="en-US" dirty="0" smtClean="0"/>
+              <a:t> file for each of these small files, today’s systems include a manual step in order to download each file.  Modern browsers don’t handle inline p2p.  So P2P basically</a:t>
             </a:r>
             <a:r>
               <a:rPr lang="en-US" baseline="0" dirty="0" smtClean="0"/>
-              <a:t> </a:t>
-            </a:r>
-            <a:r>
-              <a:rPr lang="en-US" dirty="0" smtClean="0"/>
-              <a:t>a</a:t>
-            </a:r>
+              <a:t> can’t be used for a typical web page.</a:t>
+            </a:r>
+            <a:endParaRPr lang="en-US" dirty="0" smtClean="0"/>
+          </a:p>
+          <a:p>
+            <a:endParaRPr lang="en-US" dirty="0" smtClean="0"/>
+          </a:p>
+          <a:p>
+            <a:endParaRPr lang="en-US" dirty="0" smtClean="0"/>
+          </a:p>
+          <a:p>
+            <a:pPr marL="0" marR="0" indent="0" algn="l" defTabSz="914400" rtl="0" eaLnBrk="1" fontAlgn="auto" latinLnBrk="0" hangingPunct="1">
+              <a:lnSpc>
+                <a:spcPct val="100000"/>
+              </a:lnSpc>
+              <a:spcBef>
+                <a:spcPts val="0"/>
+              </a:spcBef>
+              <a:spcAft>
+                <a:spcPts val="0"/>
+              </a:spcAft>
+              <a:buClrTx/>
+              <a:buSzTx/>
+              <a:buFontTx/>
+              <a:buNone/>
+              <a:tabLst/>
+              <a:defRPr/>
+            </a:pPr>
             <a:r>
               <a:rPr lang="en-US" baseline="0" dirty="0" smtClean="0"/>
-              <a:t> new option for Internet users—Automatic Swarming, which aims to alleviate these problems.</a:t>
+              <a:t>How many sites actually offer you that stuff?</a:t>
             </a:r>
           </a:p>
           <a:p>
             <a:endParaRPr lang="en-US" dirty="0" smtClean="0"/>
           </a:p>
+          <a:p>
+            <a:r>
+              <a:rPr lang="en-US" dirty="0" smtClean="0"/>
+              <a:t>Normal people do not use </a:t>
+            </a:r>
+            <a:r>
+              <a:rPr lang="en-US" dirty="0" err="1" smtClean="0"/>
+              <a:t>BitTorrent</a:t>
+            </a:r>
+            <a:r>
+              <a:rPr lang="en-US" dirty="0" smtClean="0"/>
+              <a:t>.  Not useful</a:t>
+            </a:r>
+            <a:r>
+              <a:rPr lang="en-US" baseline="0" dirty="0" smtClean="0"/>
+              <a:t> to them.</a:t>
+            </a:r>
+            <a:endParaRPr lang="en-US" dirty="0"/>
+          </a:p>
         </p:txBody>
       </p:sp>
       <p:sp>
@@ -3207,7 +3606,7 @@
             <a:fld id="{CFD85767-B34F-4122-8642-982296400DCD}" type="slidenum">
               <a:rPr lang="en-US" smtClean="0"/>
               <a:pPr/>
-              <a:t>9</a:t>
+              <a:t>11</a:t>
             </a:fld>
             <a:endParaRPr lang="en-US"/>
           </a:p>
@@ -6273,8 +6672,12 @@
           <a:lstStyle/>
           <a:p>
             <a:r>
-              <a:rPr lang="en-US" dirty="0" smtClean="0"/>
-              <a:t>Automatic Swarming Benefits</a:t>
+              <a:rPr lang="en-US" dirty="0" err="1" smtClean="0"/>
+              <a:t>BitTorrent</a:t>
+            </a:r>
+            <a:r>
+              <a:rPr lang="en-US" dirty="0" smtClean="0"/>
+              <a:t> fails</a:t>
             </a:r>
             <a:endParaRPr lang="en-US" dirty="0"/>
           </a:p>
@@ -6292,32 +6695,56 @@
         </p:nvSpPr>
         <p:spPr/>
         <p:txBody>
-          <a:bodyPr/>
-          <a:lstStyle/>
-          <a:p>
-            <a:r>
-              <a:rPr lang="en-US" dirty="0" smtClean="0"/>
-              <a:t>Automatic transition</a:t>
+          <a:bodyPr>
+            <a:normAutofit/>
+          </a:bodyPr>
+          <a:lstStyle/>
+          <a:p>
+            <a:r>
+              <a:rPr lang="en-US" dirty="0" smtClean="0"/>
+              <a:t>Server side.</a:t>
             </a:r>
           </a:p>
           <a:p>
             <a:pPr lvl="1"/>
             <a:r>
               <a:rPr lang="en-US" dirty="0" smtClean="0"/>
-              <a:t>Small files</a:t>
+              <a:t>Per File</a:t>
             </a:r>
           </a:p>
           <a:p>
             <a:pPr lvl="1"/>
             <a:r>
               <a:rPr lang="en-US" dirty="0" smtClean="0"/>
-              <a:t>Client-server plus P2P</a:t>
-            </a:r>
-          </a:p>
-          <a:p>
-            <a:r>
-              <a:rPr lang="en-US" dirty="0" smtClean="0"/>
-              <a:t>Client-side protocol</a:t>
+              <a:t>Have to provide traditional anyway.</a:t>
+            </a:r>
+          </a:p>
+          <a:p>
+            <a:pPr lvl="2"/>
+            <a:r>
+              <a:rPr lang="en-US" dirty="0" smtClean="0"/>
+              <a:t>Lack of clients.</a:t>
+            </a:r>
+          </a:p>
+          <a:p>
+            <a:pPr lvl="1"/>
+            <a:r>
+              <a:rPr lang="en-US" dirty="0" smtClean="0"/>
+              <a:t>Stigma.</a:t>
+            </a:r>
+          </a:p>
+          <a:p>
+            <a:pPr lvl="1"/>
+            <a:r>
+              <a:rPr lang="en-US" dirty="0" smtClean="0"/>
+              <a:t>Extra maintenance.</a:t>
+            </a:r>
+          </a:p>
+          <a:p>
+            <a:pPr lvl="1"/>
+            <a:r>
+              <a:rPr lang="en-US" dirty="0" smtClean="0"/>
+              <a:t>Fast enough</a:t>
             </a:r>
           </a:p>
         </p:txBody>
@@ -6359,22 +6786,258 @@
         </p:nvSpPr>
         <p:spPr/>
         <p:txBody>
+          <a:bodyPr/>
+          <a:lstStyle/>
+          <a:p>
+            <a:r>
+              <a:rPr lang="en-US" dirty="0" err="1" smtClean="0"/>
+              <a:t>BitTorrent</a:t>
+            </a:r>
+            <a:r>
+              <a:rPr lang="en-US" dirty="0" smtClean="0"/>
+              <a:t> fails</a:t>
+            </a:r>
+            <a:endParaRPr lang="en-US" dirty="0"/>
+          </a:p>
+        </p:txBody>
+      </p:sp>
+      <p:sp>
+        <p:nvSpPr>
+          <p:cNvPr id="3" name="Content Placeholder 2"/>
+          <p:cNvSpPr>
+            <a:spLocks noGrp="1"/>
+          </p:cNvSpPr>
+          <p:nvPr>
+            <p:ph idx="1"/>
+          </p:nvPr>
+        </p:nvSpPr>
+        <p:spPr/>
+        <p:txBody>
+          <a:bodyPr>
+            <a:normAutofit fontScale="92500" lnSpcReduction="20000"/>
+          </a:bodyPr>
+          <a:lstStyle/>
+          <a:p>
+            <a:r>
+              <a:rPr lang="en-US" dirty="0" smtClean="0"/>
+              <a:t>Clients</a:t>
+            </a:r>
+          </a:p>
+          <a:p>
+            <a:pPr lvl="1"/>
+            <a:r>
+              <a:rPr lang="en-US" dirty="0" smtClean="0"/>
+              <a:t>Extra </a:t>
+            </a:r>
+            <a:r>
+              <a:rPr lang="en-US" dirty="0" smtClean="0"/>
+              <a:t>setup/time per file.</a:t>
+            </a:r>
+          </a:p>
+          <a:p>
+            <a:pPr lvl="2"/>
+            <a:r>
+              <a:rPr lang="en-US" dirty="0" smtClean="0"/>
+              <a:t>Small files</a:t>
+            </a:r>
+            <a:endParaRPr lang="en-US" dirty="0" smtClean="0"/>
+          </a:p>
+          <a:p>
+            <a:pPr lvl="1"/>
+            <a:r>
+              <a:rPr lang="en-US" dirty="0" smtClean="0"/>
+              <a:t>Techno </a:t>
+            </a:r>
+            <a:r>
+              <a:rPr lang="en-US" dirty="0" err="1" smtClean="0"/>
+              <a:t>intelligencia</a:t>
+            </a:r>
+            <a:endParaRPr lang="en-US" dirty="0" smtClean="0"/>
+          </a:p>
+          <a:p>
+            <a:pPr lvl="1"/>
+            <a:r>
+              <a:rPr lang="en-US" dirty="0" smtClean="0"/>
+              <a:t>Non integrated.</a:t>
+            </a:r>
+          </a:p>
+          <a:p>
+            <a:pPr lvl="2"/>
+            <a:r>
+              <a:rPr lang="en-US" dirty="0" smtClean="0"/>
+              <a:t>Manual.</a:t>
+            </a:r>
+          </a:p>
+          <a:p>
+            <a:pPr lvl="2"/>
+            <a:r>
+              <a:rPr lang="en-US" dirty="0" smtClean="0"/>
+              <a:t>Not HTTP optimized.</a:t>
+            </a:r>
+          </a:p>
+          <a:p>
+            <a:pPr lvl="1"/>
+            <a:r>
+              <a:rPr lang="en-US" dirty="0" smtClean="0"/>
+              <a:t>It should be ignored speed-wise</a:t>
+            </a:r>
+          </a:p>
+          <a:p>
+            <a:pPr lvl="2"/>
+            <a:r>
+              <a:rPr lang="en-US" dirty="0" smtClean="0"/>
+              <a:t>Duplicate</a:t>
+            </a:r>
+            <a:endParaRPr lang="en-US" dirty="0" smtClean="0"/>
+          </a:p>
+          <a:p>
+            <a:pPr lvl="2"/>
+            <a:r>
+              <a:rPr lang="en-US" dirty="0" smtClean="0"/>
+              <a:t>Costs </a:t>
+            </a:r>
+            <a:r>
+              <a:rPr lang="en-US" dirty="0" smtClean="0"/>
+              <a:t>time</a:t>
+            </a:r>
+          </a:p>
+          <a:p>
+            <a:pPr lvl="1"/>
+            <a:r>
+              <a:rPr lang="en-US" dirty="0" smtClean="0"/>
+              <a:t>Not </a:t>
+            </a:r>
+            <a:r>
+              <a:rPr lang="en-US" dirty="0" smtClean="0"/>
+              <a:t>available</a:t>
+            </a:r>
+            <a:r>
+              <a:rPr lang="en-US" dirty="0" smtClean="0"/>
+              <a:t>.</a:t>
+            </a:r>
+            <a:endParaRPr lang="en-US" dirty="0" smtClean="0"/>
+          </a:p>
+        </p:txBody>
+      </p:sp>
+    </p:spTree>
+  </p:cSld>
+  <p:clrMapOvr>
+    <a:masterClrMapping/>
+  </p:clrMapOvr>
+</p:sld>
+</file>
+
+<file path=ppt/slides/slide12.xml><?xml version="1.0" encoding="utf-8"?>
+<p:sld xmlns:a="http://schemas.openxmlformats.org/drawingml/2006/main" xmlns:r="http://schemas.openxmlformats.org/officeDocument/2006/relationships" xmlns:p="http://schemas.openxmlformats.org/presentationml/2006/main">
+  <p:cSld>
+    <p:spTree>
+      <p:nvGrpSpPr>
+        <p:cNvPr id="1" name=""/>
+        <p:cNvGrpSpPr/>
+        <p:nvPr/>
+      </p:nvGrpSpPr>
+      <p:grpSpPr>
+        <a:xfrm>
+          <a:off x="0" y="0"/>
+          <a:ext cx="0" cy="0"/>
+          <a:chOff x="0" y="0"/>
+          <a:chExt cx="0" cy="0"/>
+        </a:xfrm>
+      </p:grpSpPr>
+      <p:sp>
+        <p:nvSpPr>
+          <p:cNvPr id="2" name="Title 1"/>
+          <p:cNvSpPr>
+            <a:spLocks noGrp="1"/>
+          </p:cNvSpPr>
+          <p:nvPr>
+            <p:ph type="title"/>
+          </p:nvPr>
+        </p:nvSpPr>
+        <p:spPr>
+          <a:xfrm>
+            <a:off x="-1143000" y="304800"/>
+            <a:ext cx="8229600" cy="1143000"/>
+          </a:xfrm>
+        </p:spPr>
+        <p:txBody>
           <a:bodyPr>
             <a:normAutofit/>
           </a:bodyPr>
           <a:lstStyle/>
           <a:p>
             <a:r>
-              <a:rPr lang="en-US" dirty="0" smtClean="0"/>
-              <a:t>Monitor Download</a:t>
+              <a:rPr lang="en-US" dirty="0" err="1" smtClean="0"/>
+              <a:t>BitTorrent</a:t>
+            </a:r>
+            <a:r>
+              <a:rPr lang="en-US" dirty="0" smtClean="0"/>
+              <a:t> </a:t>
+            </a:r>
+            <a:r>
+              <a:rPr lang="en-US" dirty="0" smtClean="0"/>
+              <a:t>can Fail</a:t>
             </a:r>
             <a:endParaRPr lang="en-US" dirty="0"/>
+          </a:p>
+        </p:txBody>
+      </p:sp>
+      <p:sp>
+        <p:nvSpPr>
+          <p:cNvPr id="3" name="Content Placeholder 2"/>
+          <p:cNvSpPr>
+            <a:spLocks noGrp="1"/>
+          </p:cNvSpPr>
+          <p:nvPr>
+            <p:ph idx="1"/>
+          </p:nvPr>
+        </p:nvSpPr>
+        <p:spPr/>
+        <p:txBody>
+          <a:bodyPr/>
+          <a:lstStyle/>
+          <a:p>
+            <a:r>
+              <a:rPr lang="en-US" dirty="0" smtClean="0"/>
+              <a:t>Not enough seeds.</a:t>
+            </a:r>
+          </a:p>
+          <a:p>
+            <a:r>
+              <a:rPr lang="en-US" dirty="0" smtClean="0"/>
+              <a:t>Closed ports.</a:t>
+            </a:r>
+          </a:p>
+          <a:p>
+            <a:r>
+              <a:rPr lang="en-US" dirty="0" smtClean="0"/>
+              <a:t>Tracker</a:t>
+            </a:r>
+          </a:p>
+          <a:p>
+            <a:r>
+              <a:rPr lang="en-US" dirty="0" smtClean="0"/>
+              <a:t>Extra files.</a:t>
+            </a:r>
+          </a:p>
+          <a:p>
+            <a:r>
+              <a:rPr lang="en-US" dirty="0" smtClean="0"/>
+              <a:t>Users don’t have client installed.</a:t>
+            </a:r>
+          </a:p>
+          <a:p>
+            <a:r>
+              <a:rPr lang="en-US" dirty="0" smtClean="0"/>
+              <a:t>Clients aren’t configured to use HTTP.</a:t>
+            </a:r>
+            <a:endParaRPr lang="en-US" dirty="0" smtClean="0"/>
           </a:p>
         </p:txBody>
       </p:sp>
       <p:pic>
         <p:nvPicPr>
-          <p:cNvPr id="4099" name="Picture 3" descr="C:\dev\ruby\p2pwebclient\thesis_presentation\algorithm explanation.png"/>
+          <p:cNvPr id="5122" name="Picture 2"/>
           <p:cNvPicPr>
             <a:picLocks noChangeAspect="1" noChangeArrowheads="1"/>
           </p:cNvPicPr>
@@ -6389,8 +7052,282 @@
         </p:blipFill>
         <p:spPr bwMode="auto">
           <a:xfrm>
-            <a:off x="533400" y="1905000"/>
-            <a:ext cx="6953934" cy="4327525"/>
+            <a:off x="6019800" y="304800"/>
+            <a:ext cx="3124200" cy="3238500"/>
+          </a:xfrm>
+          <a:prstGeom prst="rect">
+            <a:avLst/>
+          </a:prstGeom>
+          <a:noFill/>
+          <a:ln w="9525">
+            <a:noFill/>
+            <a:miter lim="800000"/>
+            <a:headEnd/>
+            <a:tailEnd/>
+          </a:ln>
+        </p:spPr>
+      </p:pic>
+    </p:spTree>
+  </p:cSld>
+  <p:clrMapOvr>
+    <a:masterClrMapping/>
+  </p:clrMapOvr>
+  <p:timing>
+    <p:tnLst>
+      <p:par>
+        <p:cTn id="1" dur="indefinite" restart="never" nodeType="tmRoot"/>
+      </p:par>
+    </p:tnLst>
+  </p:timing>
+</p:sld>
+</file>
+
+<file path=ppt/slides/slide13.xml><?xml version="1.0" encoding="utf-8"?>
+<p:sld xmlns:a="http://schemas.openxmlformats.org/drawingml/2006/main" xmlns:r="http://schemas.openxmlformats.org/officeDocument/2006/relationships" xmlns:p="http://schemas.openxmlformats.org/presentationml/2006/main">
+  <p:cSld>
+    <p:spTree>
+      <p:nvGrpSpPr>
+        <p:cNvPr id="1" name=""/>
+        <p:cNvGrpSpPr/>
+        <p:nvPr/>
+      </p:nvGrpSpPr>
+      <p:grpSpPr>
+        <a:xfrm>
+          <a:off x="0" y="0"/>
+          <a:ext cx="0" cy="0"/>
+          <a:chOff x="0" y="0"/>
+          <a:chExt cx="0" cy="0"/>
+        </a:xfrm>
+      </p:grpSpPr>
+      <p:sp>
+        <p:nvSpPr>
+          <p:cNvPr id="2" name="Title 1"/>
+          <p:cNvSpPr>
+            <a:spLocks noGrp="1"/>
+          </p:cNvSpPr>
+          <p:nvPr>
+            <p:ph type="title"/>
+          </p:nvPr>
+        </p:nvSpPr>
+        <p:spPr/>
+        <p:txBody>
+          <a:bodyPr/>
+          <a:lstStyle/>
+          <a:p>
+            <a:r>
+              <a:rPr lang="en-US" dirty="0" smtClean="0"/>
+              <a:t>Automatic Swarming -- Goals</a:t>
+            </a:r>
+            <a:endParaRPr lang="en-US" dirty="0"/>
+          </a:p>
+        </p:txBody>
+      </p:sp>
+      <p:sp>
+        <p:nvSpPr>
+          <p:cNvPr id="3" name="Content Placeholder 2"/>
+          <p:cNvSpPr>
+            <a:spLocks noGrp="1"/>
+          </p:cNvSpPr>
+          <p:nvPr>
+            <p:ph idx="1"/>
+          </p:nvPr>
+        </p:nvSpPr>
+        <p:spPr/>
+        <p:txBody>
+          <a:bodyPr/>
+          <a:lstStyle/>
+          <a:p>
+            <a:r>
+              <a:rPr lang="en-US" dirty="0" smtClean="0"/>
+              <a:t>Work for any file on any server.</a:t>
+            </a:r>
+          </a:p>
+          <a:p>
+            <a:r>
+              <a:rPr lang="en-US" dirty="0" smtClean="0"/>
+              <a:t>Easy on the clients.</a:t>
+            </a:r>
+          </a:p>
+          <a:p>
+            <a:r>
+              <a:rPr lang="en-US" dirty="0" smtClean="0"/>
+              <a:t>No extra dedicated hardware.</a:t>
+            </a:r>
+          </a:p>
+          <a:p>
+            <a:r>
+              <a:rPr lang="en-US" dirty="0" smtClean="0"/>
+              <a:t>Work for small files.</a:t>
+            </a:r>
+          </a:p>
+          <a:p>
+            <a:r>
+              <a:rPr lang="en-US" dirty="0" smtClean="0"/>
+              <a:t>Non intrusive.</a:t>
+            </a:r>
+          </a:p>
+        </p:txBody>
+      </p:sp>
+    </p:spTree>
+  </p:cSld>
+  <p:clrMapOvr>
+    <a:masterClrMapping/>
+  </p:clrMapOvr>
+</p:sld>
+</file>
+
+<file path=ppt/slides/slide14.xml><?xml version="1.0" encoding="utf-8"?>
+<p:sld xmlns:a="http://schemas.openxmlformats.org/drawingml/2006/main" xmlns:r="http://schemas.openxmlformats.org/officeDocument/2006/relationships" xmlns:p="http://schemas.openxmlformats.org/presentationml/2006/main">
+  <p:cSld>
+    <p:spTree>
+      <p:nvGrpSpPr>
+        <p:cNvPr id="1" name=""/>
+        <p:cNvGrpSpPr/>
+        <p:nvPr/>
+      </p:nvGrpSpPr>
+      <p:grpSpPr>
+        <a:xfrm>
+          <a:off x="0" y="0"/>
+          <a:ext cx="0" cy="0"/>
+          <a:chOff x="0" y="0"/>
+          <a:chExt cx="0" cy="0"/>
+        </a:xfrm>
+      </p:grpSpPr>
+      <p:sp>
+        <p:nvSpPr>
+          <p:cNvPr id="2" name="Title 1"/>
+          <p:cNvSpPr>
+            <a:spLocks noGrp="1"/>
+          </p:cNvSpPr>
+          <p:nvPr>
+            <p:ph type="title"/>
+          </p:nvPr>
+        </p:nvSpPr>
+        <p:spPr/>
+        <p:txBody>
+          <a:bodyPr>
+            <a:normAutofit/>
+          </a:bodyPr>
+          <a:lstStyle/>
+          <a:p>
+            <a:r>
+              <a:rPr lang="en-US" dirty="0" smtClean="0"/>
+              <a:t>Automatic Swarming</a:t>
+            </a:r>
+            <a:endParaRPr lang="en-US" dirty="0"/>
+          </a:p>
+        </p:txBody>
+      </p:sp>
+      <p:sp>
+        <p:nvSpPr>
+          <p:cNvPr id="5" name="Content Placeholder 4"/>
+          <p:cNvSpPr>
+            <a:spLocks noGrp="1"/>
+          </p:cNvSpPr>
+          <p:nvPr>
+            <p:ph idx="1"/>
+          </p:nvPr>
+        </p:nvSpPr>
+        <p:spPr/>
+        <p:txBody>
+          <a:bodyPr/>
+          <a:lstStyle/>
+          <a:p>
+            <a:r>
+              <a:rPr lang="en-US" dirty="0" smtClean="0"/>
+              <a:t>Basic Algorithm:</a:t>
+            </a:r>
+          </a:p>
+          <a:p>
+            <a:pPr lvl="1"/>
+            <a:r>
+              <a:rPr lang="en-US" dirty="0" smtClean="0"/>
+              <a:t>Monitor download</a:t>
+            </a:r>
+          </a:p>
+          <a:p>
+            <a:pPr lvl="1"/>
+            <a:r>
+              <a:rPr lang="en-US" dirty="0" smtClean="0"/>
+              <a:t>Automatically switch to a Peer-</a:t>
+            </a:r>
+            <a:r>
+              <a:rPr lang="en-US" dirty="0" smtClean="0"/>
+              <a:t>to-Peer download if it becomes slow.</a:t>
+            </a:r>
+            <a:endParaRPr lang="en-US" dirty="0"/>
+          </a:p>
+        </p:txBody>
+      </p:sp>
+    </p:spTree>
+  </p:cSld>
+  <p:clrMapOvr>
+    <a:masterClrMapping/>
+  </p:clrMapOvr>
+</p:sld>
+</file>
+
+<file path=ppt/slides/slide15.xml><?xml version="1.0" encoding="utf-8"?>
+<p:sld xmlns:a="http://schemas.openxmlformats.org/drawingml/2006/main" xmlns:r="http://schemas.openxmlformats.org/officeDocument/2006/relationships" xmlns:p="http://schemas.openxmlformats.org/presentationml/2006/main">
+  <p:cSld>
+    <p:spTree>
+      <p:nvGrpSpPr>
+        <p:cNvPr id="1" name=""/>
+        <p:cNvGrpSpPr/>
+        <p:nvPr/>
+      </p:nvGrpSpPr>
+      <p:grpSpPr>
+        <a:xfrm>
+          <a:off x="0" y="0"/>
+          <a:ext cx="0" cy="0"/>
+          <a:chOff x="0" y="0"/>
+          <a:chExt cx="0" cy="0"/>
+        </a:xfrm>
+      </p:grpSpPr>
+      <p:sp>
+        <p:nvSpPr>
+          <p:cNvPr id="2" name="Title 1"/>
+          <p:cNvSpPr>
+            <a:spLocks noGrp="1"/>
+          </p:cNvSpPr>
+          <p:nvPr>
+            <p:ph type="title"/>
+          </p:nvPr>
+        </p:nvSpPr>
+        <p:spPr/>
+        <p:txBody>
+          <a:bodyPr>
+            <a:normAutofit/>
+          </a:bodyPr>
+          <a:lstStyle/>
+          <a:p>
+            <a:r>
+              <a:rPr lang="en-US" dirty="0" smtClean="0"/>
+              <a:t>Monitor Download</a:t>
+            </a:r>
+            <a:endParaRPr lang="en-US" dirty="0"/>
+          </a:p>
+        </p:txBody>
+      </p:sp>
+      <p:pic>
+        <p:nvPicPr>
+          <p:cNvPr id="7172" name="Picture 4" descr="C:\rdp\dev\p2pwebclient\thesis_presentation\algorithm explanation.png"/>
+          <p:cNvPicPr>
+            <a:picLocks noChangeAspect="1" noChangeArrowheads="1"/>
+          </p:cNvPicPr>
+          <p:nvPr/>
+        </p:nvPicPr>
+        <p:blipFill>
+          <a:blip r:embed="rId3" cstate="print"/>
+          <a:srcRect/>
+          <a:stretch>
+            <a:fillRect/>
+          </a:stretch>
+        </p:blipFill>
+        <p:spPr bwMode="auto">
+          <a:xfrm>
+            <a:off x="609600" y="1600200"/>
+            <a:ext cx="7543800" cy="4820488"/>
           </a:xfrm>
           <a:prstGeom prst="rect">
             <a:avLst/>
@@ -6403,10 +7340,17 @@
   <p:clrMapOvr>
     <a:masterClrMapping/>
   </p:clrMapOvr>
+  <p:timing>
+    <p:tnLst>
+      <p:par>
+        <p:cTn id="1" dur="indefinite" restart="never" nodeType="tmRoot"/>
+      </p:par>
+    </p:tnLst>
+  </p:timing>
 </p:sld>
 </file>
 
-<file path=ppt/slides/slide12.xml><?xml version="1.0" encoding="utf-8"?>
+<file path=ppt/slides/slide16.xml><?xml version="1.0" encoding="utf-8"?>
 <p:sld xmlns:a="http://schemas.openxmlformats.org/drawingml/2006/main" xmlns:r="http://schemas.openxmlformats.org/officeDocument/2006/relationships" xmlns:p="http://schemas.openxmlformats.org/presentationml/2006/main">
   <p:cSld>
     <p:spTree>
@@ -6502,10 +7446,276 @@
   <p:clrMapOvr>
     <a:masterClrMapping/>
   </p:clrMapOvr>
+  <p:timing>
+    <p:tnLst>
+      <p:par>
+        <p:cTn id="1" dur="indefinite" restart="never" nodeType="tmRoot"/>
+      </p:par>
+    </p:tnLst>
+  </p:timing>
 </p:sld>
 </file>
 
-<file path=ppt/slides/slide13.xml><?xml version="1.0" encoding="utf-8"?>
+<file path=ppt/slides/slide17.xml><?xml version="1.0" encoding="utf-8"?>
+<p:sld xmlns:a="http://schemas.openxmlformats.org/drawingml/2006/main" xmlns:r="http://schemas.openxmlformats.org/officeDocument/2006/relationships" xmlns:p="http://schemas.openxmlformats.org/presentationml/2006/main">
+  <p:cSld>
+    <p:spTree>
+      <p:nvGrpSpPr>
+        <p:cNvPr id="1" name=""/>
+        <p:cNvGrpSpPr/>
+        <p:nvPr/>
+      </p:nvGrpSpPr>
+      <p:grpSpPr>
+        <a:xfrm>
+          <a:off x="0" y="0"/>
+          <a:ext cx="0" cy="0"/>
+          <a:chOff x="0" y="0"/>
+          <a:chExt cx="0" cy="0"/>
+        </a:xfrm>
+      </p:grpSpPr>
+      <p:sp>
+        <p:nvSpPr>
+          <p:cNvPr id="2" name="Title 1"/>
+          <p:cNvSpPr>
+            <a:spLocks noGrp="1"/>
+          </p:cNvSpPr>
+          <p:nvPr>
+            <p:ph type="title"/>
+          </p:nvPr>
+        </p:nvSpPr>
+        <p:spPr/>
+        <p:txBody>
+          <a:bodyPr/>
+          <a:lstStyle/>
+          <a:p>
+            <a:r>
+              <a:rPr lang="en-US" dirty="0" smtClean="0"/>
+              <a:t>Details</a:t>
+            </a:r>
+            <a:endParaRPr lang="en-US" dirty="0"/>
+          </a:p>
+        </p:txBody>
+      </p:sp>
+      <p:sp>
+        <p:nvSpPr>
+          <p:cNvPr id="3" name="Content Placeholder 2"/>
+          <p:cNvSpPr>
+            <a:spLocks noGrp="1"/>
+          </p:cNvSpPr>
+          <p:nvPr>
+            <p:ph idx="1"/>
+          </p:nvPr>
+        </p:nvSpPr>
+        <p:spPr/>
+        <p:txBody>
+          <a:bodyPr/>
+          <a:lstStyle/>
+          <a:p>
+            <a:r>
+              <a:rPr lang="en-US" dirty="0" smtClean="0"/>
+              <a:t>T starts immediately.</a:t>
+            </a:r>
+          </a:p>
+          <a:p>
+            <a:r>
+              <a:rPr lang="en-US" dirty="0" smtClean="0"/>
+              <a:t>R is calculated W seconds after T</a:t>
+            </a:r>
+          </a:p>
+          <a:p>
+            <a:r>
+              <a:rPr lang="en-US" dirty="0" smtClean="0"/>
+              <a:t>Redundant DHT keys.</a:t>
+            </a:r>
+          </a:p>
+          <a:p>
+            <a:r>
+              <a:rPr lang="en-US" dirty="0" smtClean="0"/>
+              <a:t>Polls on lack of peers (1s)</a:t>
+            </a:r>
+          </a:p>
+          <a:p>
+            <a:pPr lvl="1"/>
+            <a:r>
+              <a:rPr lang="en-US" dirty="0" smtClean="0"/>
+              <a:t>Downloads block from origin</a:t>
+            </a:r>
+          </a:p>
+          <a:p>
+            <a:r>
+              <a:rPr lang="en-US" dirty="0" smtClean="0"/>
+              <a:t>Last </a:t>
+            </a:r>
+            <a:r>
+              <a:rPr lang="en-US" dirty="0" smtClean="0"/>
+              <a:t>block problem</a:t>
+            </a:r>
+          </a:p>
+          <a:p>
+            <a:endParaRPr lang="en-US" dirty="0" smtClean="0"/>
+          </a:p>
+        </p:txBody>
+      </p:sp>
+      <p:pic>
+        <p:nvPicPr>
+          <p:cNvPr id="4" name="Picture 3" descr="C:\dev\ruby\p2pwebclient\thesis_presentation\algorithm explanation.png"/>
+          <p:cNvPicPr>
+            <a:picLocks noChangeAspect="1" noChangeArrowheads="1"/>
+          </p:cNvPicPr>
+          <p:nvPr/>
+        </p:nvPicPr>
+        <p:blipFill>
+          <a:blip r:embed="rId3" cstate="print"/>
+          <a:srcRect/>
+          <a:stretch>
+            <a:fillRect/>
+          </a:stretch>
+        </p:blipFill>
+        <p:spPr bwMode="auto">
+          <a:xfrm>
+            <a:off x="4953000" y="4191000"/>
+            <a:ext cx="3982134" cy="2478135"/>
+          </a:xfrm>
+          <a:prstGeom prst="rect">
+            <a:avLst/>
+          </a:prstGeom>
+          <a:noFill/>
+        </p:spPr>
+      </p:pic>
+    </p:spTree>
+  </p:cSld>
+  <p:clrMapOvr>
+    <a:masterClrMapping/>
+  </p:clrMapOvr>
+</p:sld>
+</file>
+
+<file path=ppt/slides/slide18.xml><?xml version="1.0" encoding="utf-8"?>
+<p:sld xmlns:a="http://schemas.openxmlformats.org/drawingml/2006/main" xmlns:r="http://schemas.openxmlformats.org/officeDocument/2006/relationships" xmlns:p="http://schemas.openxmlformats.org/presentationml/2006/main">
+  <p:cSld>
+    <p:spTree>
+      <p:nvGrpSpPr>
+        <p:cNvPr id="1" name=""/>
+        <p:cNvGrpSpPr/>
+        <p:nvPr/>
+      </p:nvGrpSpPr>
+      <p:grpSpPr>
+        <a:xfrm>
+          <a:off x="0" y="0"/>
+          <a:ext cx="0" cy="0"/>
+          <a:chOff x="0" y="0"/>
+          <a:chExt cx="0" cy="0"/>
+        </a:xfrm>
+      </p:grpSpPr>
+      <p:sp>
+        <p:nvSpPr>
+          <p:cNvPr id="2" name="Title 1"/>
+          <p:cNvSpPr>
+            <a:spLocks noGrp="1"/>
+          </p:cNvSpPr>
+          <p:nvPr>
+            <p:ph type="title"/>
+          </p:nvPr>
+        </p:nvSpPr>
+        <p:spPr/>
+        <p:txBody>
+          <a:bodyPr/>
+          <a:lstStyle/>
+          <a:p>
+            <a:r>
+              <a:rPr lang="en-US" dirty="0" smtClean="0"/>
+              <a:t>Methodology.</a:t>
+            </a:r>
+            <a:endParaRPr lang="en-US" dirty="0"/>
+          </a:p>
+        </p:txBody>
+      </p:sp>
+      <p:sp>
+        <p:nvSpPr>
+          <p:cNvPr id="3" name="Content Placeholder 2"/>
+          <p:cNvSpPr>
+            <a:spLocks noGrp="1"/>
+          </p:cNvSpPr>
+          <p:nvPr>
+            <p:ph idx="1"/>
+          </p:nvPr>
+        </p:nvSpPr>
+        <p:spPr/>
+        <p:txBody>
+          <a:bodyPr/>
+          <a:lstStyle/>
+          <a:p>
+            <a:r>
+              <a:rPr lang="en-US" dirty="0" err="1" smtClean="0"/>
+              <a:t>PlanetLab</a:t>
+            </a:r>
+            <a:endParaRPr lang="en-US" dirty="0" smtClean="0"/>
+          </a:p>
+          <a:p>
+            <a:r>
+              <a:rPr lang="en-US" dirty="0" smtClean="0"/>
+              <a:t>Private </a:t>
+            </a:r>
+            <a:r>
+              <a:rPr lang="en-US" dirty="0" err="1" smtClean="0"/>
+              <a:t>OpenDHT</a:t>
+            </a:r>
+            <a:endParaRPr lang="en-US" dirty="0" smtClean="0"/>
+          </a:p>
+          <a:p>
+            <a:r>
+              <a:rPr lang="en-US" dirty="0" smtClean="0"/>
+              <a:t>BYU server </a:t>
+            </a:r>
+          </a:p>
+          <a:p>
+            <a:pPr lvl="1"/>
+            <a:r>
+              <a:rPr lang="en-US" dirty="0" smtClean="0"/>
+              <a:t>256 KB/s</a:t>
+            </a:r>
+          </a:p>
+          <a:p>
+            <a:pPr lvl="1"/>
+            <a:endParaRPr lang="en-US" dirty="0" smtClean="0"/>
+          </a:p>
+        </p:txBody>
+      </p:sp>
+      <p:pic>
+        <p:nvPicPr>
+          <p:cNvPr id="4098" name="Picture 2" descr="C:\Documents and Settings\rdp\Desktop\World50.png"/>
+          <p:cNvPicPr>
+            <a:picLocks noChangeAspect="1" noChangeArrowheads="1"/>
+          </p:cNvPicPr>
+          <p:nvPr/>
+        </p:nvPicPr>
+        <p:blipFill>
+          <a:blip r:embed="rId2" cstate="print"/>
+          <a:srcRect/>
+          <a:stretch>
+            <a:fillRect/>
+          </a:stretch>
+        </p:blipFill>
+        <p:spPr bwMode="auto">
+          <a:xfrm>
+            <a:off x="4000500" y="1447800"/>
+            <a:ext cx="5143500" cy="2571750"/>
+          </a:xfrm>
+          <a:prstGeom prst="rect">
+            <a:avLst/>
+          </a:prstGeom>
+          <a:noFill/>
+        </p:spPr>
+      </p:pic>
+    </p:spTree>
+  </p:cSld>
+  <p:clrMapOvr>
+    <a:masterClrMapping/>
+  </p:clrMapOvr>
+</p:sld>
+</file>
+
+<file path=ppt/slides/slide19.xml><?xml version="1.0" encoding="utf-8"?>
 <p:sld xmlns:a="http://schemas.openxmlformats.org/drawingml/2006/main" xmlns:r="http://schemas.openxmlformats.org/officeDocument/2006/relationships" xmlns:p="http://schemas.openxmlformats.org/presentationml/2006/main">
   <p:cSld>
     <p:spTree>
@@ -6585,7 +7795,95 @@
 </p:sld>
 </file>
 
-<file path=ppt/slides/slide14.xml><?xml version="1.0" encoding="utf-8"?>
+<file path=ppt/slides/slide2.xml><?xml version="1.0" encoding="utf-8"?>
+<p:sld xmlns:a="http://schemas.openxmlformats.org/drawingml/2006/main" xmlns:r="http://schemas.openxmlformats.org/officeDocument/2006/relationships" xmlns:p="http://schemas.openxmlformats.org/presentationml/2006/main">
+  <p:cSld>
+    <p:spTree>
+      <p:nvGrpSpPr>
+        <p:cNvPr id="1" name=""/>
+        <p:cNvGrpSpPr/>
+        <p:nvPr/>
+      </p:nvGrpSpPr>
+      <p:grpSpPr>
+        <a:xfrm>
+          <a:off x="0" y="0"/>
+          <a:ext cx="0" cy="0"/>
+          <a:chOff x="0" y="0"/>
+          <a:chExt cx="0" cy="0"/>
+        </a:xfrm>
+      </p:grpSpPr>
+      <p:sp>
+        <p:nvSpPr>
+          <p:cNvPr id="2" name="Title 1"/>
+          <p:cNvSpPr>
+            <a:spLocks noGrp="1"/>
+          </p:cNvSpPr>
+          <p:nvPr>
+            <p:ph type="title"/>
+          </p:nvPr>
+        </p:nvSpPr>
+        <p:spPr/>
+        <p:txBody>
+          <a:bodyPr/>
+          <a:lstStyle/>
+          <a:p>
+            <a:r>
+              <a:rPr lang="en-US" dirty="0" smtClean="0"/>
+              <a:t>Thanks!</a:t>
+            </a:r>
+            <a:endParaRPr lang="en-US" dirty="0"/>
+          </a:p>
+        </p:txBody>
+      </p:sp>
+      <p:sp>
+        <p:nvSpPr>
+          <p:cNvPr id="3" name="Content Placeholder 2"/>
+          <p:cNvSpPr>
+            <a:spLocks noGrp="1"/>
+          </p:cNvSpPr>
+          <p:nvPr>
+            <p:ph idx="1"/>
+          </p:nvPr>
+        </p:nvSpPr>
+        <p:spPr/>
+        <p:txBody>
+          <a:bodyPr>
+            <a:normAutofit/>
+          </a:bodyPr>
+          <a:lstStyle/>
+          <a:p>
+            <a:r>
+              <a:rPr lang="en-US" sz="1800" dirty="0" smtClean="0"/>
+              <a:t>Family</a:t>
+            </a:r>
+          </a:p>
+          <a:p>
+            <a:r>
+              <a:rPr lang="en-US" sz="1800" dirty="0" smtClean="0"/>
+              <a:t>Teachers</a:t>
+            </a:r>
+          </a:p>
+          <a:p>
+            <a:r>
+              <a:rPr lang="en-US" sz="1800" dirty="0" err="1" smtClean="0"/>
+              <a:t>wE</a:t>
+            </a:r>
+            <a:r>
+              <a:rPr lang="en-US" sz="1800" dirty="0" smtClean="0"/>
+              <a:t>\=f P'P= \ROVIDE A U966554F545DS6TFDV87654536:01 PM 4/5/20102 098YH6Ya	1W N.I </a:t>
+            </a:r>
+          </a:p>
+        </p:txBody>
+      </p:sp>
+    </p:spTree>
+  </p:cSld>
+  <p:clrMapOvr>
+    <a:masterClrMapping/>
+  </p:clrMapOvr>
+</p:sld>
+</file>
+
+<file path=ppt/slides/slide20.xml><?xml version="1.0" encoding="utf-8"?>
 <p:sld xmlns:a="http://schemas.openxmlformats.org/drawingml/2006/main" xmlns:r="http://schemas.openxmlformats.org/officeDocument/2006/relationships" xmlns:p="http://schemas.openxmlformats.org/presentationml/2006/main">
   <p:cSld>
     <p:spTree>
@@ -6699,7 +7997,7 @@
 </p:sld>
 </file>
 
-<file path=ppt/slides/slide15.xml><?xml version="1.0" encoding="utf-8"?>
+<file path=ppt/slides/slide21.xml><?xml version="1.0" encoding="utf-8"?>
 <p:sld xmlns:a="http://schemas.openxmlformats.org/drawingml/2006/main" xmlns:r="http://schemas.openxmlformats.org/officeDocument/2006/relationships" xmlns:p="http://schemas.openxmlformats.org/presentationml/2006/main" show="0">
   <p:cSld>
     <p:spTree>
@@ -6812,7 +8110,7 @@
 </p:sld>
 </file>
 
-<file path=ppt/slides/slide16.xml><?xml version="1.0" encoding="utf-8"?>
+<file path=ppt/slides/slide22.xml><?xml version="1.0" encoding="utf-8"?>
 <p:sld xmlns:a="http://schemas.openxmlformats.org/drawingml/2006/main" xmlns:r="http://schemas.openxmlformats.org/officeDocument/2006/relationships" xmlns:p="http://schemas.openxmlformats.org/presentationml/2006/main">
   <p:cSld>
     <p:spTree>
@@ -6943,7 +8241,7 @@
 </p:sld>
 </file>
 
-<file path=ppt/slides/slide17.xml><?xml version="1.0" encoding="utf-8"?>
+<file path=ppt/slides/slide23.xml><?xml version="1.0" encoding="utf-8"?>
 <p:sld xmlns:a="http://schemas.openxmlformats.org/drawingml/2006/main" xmlns:r="http://schemas.openxmlformats.org/officeDocument/2006/relationships" xmlns:p="http://schemas.openxmlformats.org/presentationml/2006/main">
   <p:cSld>
     <p:spTree>
@@ -7023,7 +8321,7 @@
 </p:sld>
 </file>
 
-<file path=ppt/slides/slide18.xml><?xml version="1.0" encoding="utf-8"?>
+<file path=ppt/slides/slide24.xml><?xml version="1.0" encoding="utf-8"?>
 <p:sld xmlns:a="http://schemas.openxmlformats.org/drawingml/2006/main" xmlns:r="http://schemas.openxmlformats.org/officeDocument/2006/relationships" xmlns:p="http://schemas.openxmlformats.org/presentationml/2006/main">
   <p:cSld>
     <p:spTree>
@@ -7103,7 +8401,7 @@
 </p:sld>
 </file>
 
-<file path=ppt/slides/slide19.xml><?xml version="1.0" encoding="utf-8"?>
+<file path=ppt/slides/slide25.xml><?xml version="1.0" encoding="utf-8"?>
 <p:sld xmlns:a="http://schemas.openxmlformats.org/drawingml/2006/main" xmlns:r="http://schemas.openxmlformats.org/officeDocument/2006/relationships" xmlns:p="http://schemas.openxmlformats.org/presentationml/2006/main">
   <p:cSld>
     <p:spTree>
@@ -7183,95 +8481,7 @@
 </p:sld>
 </file>
 
-<file path=ppt/slides/slide2.xml><?xml version="1.0" encoding="utf-8"?>
-<p:sld xmlns:a="http://schemas.openxmlformats.org/drawingml/2006/main" xmlns:r="http://schemas.openxmlformats.org/officeDocument/2006/relationships" xmlns:p="http://schemas.openxmlformats.org/presentationml/2006/main">
-  <p:cSld>
-    <p:spTree>
-      <p:nvGrpSpPr>
-        <p:cNvPr id="1" name=""/>
-        <p:cNvGrpSpPr/>
-        <p:nvPr/>
-      </p:nvGrpSpPr>
-      <p:grpSpPr>
-        <a:xfrm>
-          <a:off x="0" y="0"/>
-          <a:ext cx="0" cy="0"/>
-          <a:chOff x="0" y="0"/>
-          <a:chExt cx="0" cy="0"/>
-        </a:xfrm>
-      </p:grpSpPr>
-      <p:sp>
-        <p:nvSpPr>
-          <p:cNvPr id="2" name="Title 1"/>
-          <p:cNvSpPr>
-            <a:spLocks noGrp="1"/>
-          </p:cNvSpPr>
-          <p:nvPr>
-            <p:ph type="title"/>
-          </p:nvPr>
-        </p:nvSpPr>
-        <p:spPr/>
-        <p:txBody>
-          <a:bodyPr/>
-          <a:lstStyle/>
-          <a:p>
-            <a:r>
-              <a:rPr lang="en-US" dirty="0" smtClean="0"/>
-              <a:t>Thanks!</a:t>
-            </a:r>
-            <a:endParaRPr lang="en-US" dirty="0"/>
-          </a:p>
-        </p:txBody>
-      </p:sp>
-      <p:sp>
-        <p:nvSpPr>
-          <p:cNvPr id="3" name="Content Placeholder 2"/>
-          <p:cNvSpPr>
-            <a:spLocks noGrp="1"/>
-          </p:cNvSpPr>
-          <p:nvPr>
-            <p:ph idx="1"/>
-          </p:nvPr>
-        </p:nvSpPr>
-        <p:spPr/>
-        <p:txBody>
-          <a:bodyPr>
-            <a:normAutofit/>
-          </a:bodyPr>
-          <a:lstStyle/>
-          <a:p>
-            <a:r>
-              <a:rPr lang="en-US" sz="1800" dirty="0" err="1" smtClean="0"/>
-              <a:t>wE</a:t>
-            </a:r>
-            <a:r>
-              <a:rPr lang="en-US" sz="1800" dirty="0" smtClean="0"/>
-              <a:t>\=f P'P= \ROVIDE A U966554F545DS6TFDV87654536:01 PM 4/5/20102 098YH6Ya	1W N.I </a:t>
-            </a:r>
-          </a:p>
-          <a:p>
-            <a:r>
-              <a:rPr lang="en-US" sz="1800" dirty="0" smtClean="0"/>
-              <a:t>Family</a:t>
-            </a:r>
-          </a:p>
-          <a:p>
-            <a:r>
-              <a:rPr lang="en-US" sz="1800" dirty="0" smtClean="0"/>
-              <a:t>Teachers</a:t>
-            </a:r>
-          </a:p>
-        </p:txBody>
-      </p:sp>
-    </p:spTree>
-  </p:cSld>
-  <p:clrMapOvr>
-    <a:masterClrMapping/>
-  </p:clrMapOvr>
-</p:sld>
-</file>
-
-<file path=ppt/slides/slide20.xml><?xml version="1.0" encoding="utf-8"?>
+<file path=ppt/slides/slide26.xml><?xml version="1.0" encoding="utf-8"?>
 <p:sld xmlns:a="http://schemas.openxmlformats.org/drawingml/2006/main" xmlns:r="http://schemas.openxmlformats.org/officeDocument/2006/relationships" xmlns:p="http://schemas.openxmlformats.org/presentationml/2006/main">
   <p:cSld>
     <p:spTree>
@@ -7351,7 +8561,7 @@
 </p:sld>
 </file>
 
-<file path=ppt/slides/slide21.xml><?xml version="1.0" encoding="utf-8"?>
+<file path=ppt/slides/slide27.xml><?xml version="1.0" encoding="utf-8"?>
 <p:sld xmlns:a="http://schemas.openxmlformats.org/drawingml/2006/main" xmlns:r="http://schemas.openxmlformats.org/officeDocument/2006/relationships" xmlns:p="http://schemas.openxmlformats.org/presentationml/2006/main">
   <p:cSld>
     <p:spTree>
@@ -7433,7 +8643,7 @@
 </p:sld>
 </file>
 
-<file path=ppt/slides/slide22.xml><?xml version="1.0" encoding="utf-8"?>
+<file path=ppt/slides/slide28.xml><?xml version="1.0" encoding="utf-8"?>
 <p:sld xmlns:a="http://schemas.openxmlformats.org/drawingml/2006/main" xmlns:r="http://schemas.openxmlformats.org/officeDocument/2006/relationships" xmlns:p="http://schemas.openxmlformats.org/presentationml/2006/main">
   <p:cSld>
     <p:spTree>
@@ -7513,7 +8723,7 @@
 </p:sld>
 </file>
 
-<file path=ppt/slides/slide23.xml><?xml version="1.0" encoding="utf-8"?>
+<file path=ppt/slides/slide29.xml><?xml version="1.0" encoding="utf-8"?>
 <p:sld xmlns:a="http://schemas.openxmlformats.org/drawingml/2006/main" xmlns:r="http://schemas.openxmlformats.org/officeDocument/2006/relationships" xmlns:p="http://schemas.openxmlformats.org/presentationml/2006/main">
   <p:cSld>
     <p:spTree>
@@ -7595,7 +8805,106 @@
 </p:sld>
 </file>
 
-<file path=ppt/slides/slide24.xml><?xml version="1.0" encoding="utf-8"?>
+<file path=ppt/slides/slide3.xml><?xml version="1.0" encoding="utf-8"?>
+<p:sld xmlns:a="http://schemas.openxmlformats.org/drawingml/2006/main" xmlns:r="http://schemas.openxmlformats.org/officeDocument/2006/relationships" xmlns:p="http://schemas.openxmlformats.org/presentationml/2006/main">
+  <p:cSld>
+    <p:spTree>
+      <p:nvGrpSpPr>
+        <p:cNvPr id="1" name=""/>
+        <p:cNvGrpSpPr/>
+        <p:nvPr/>
+      </p:nvGrpSpPr>
+      <p:grpSpPr>
+        <a:xfrm>
+          <a:off x="0" y="0"/>
+          <a:ext cx="0" cy="0"/>
+          <a:chOff x="0" y="0"/>
+          <a:chExt cx="0" cy="0"/>
+        </a:xfrm>
+      </p:grpSpPr>
+      <p:sp>
+        <p:nvSpPr>
+          <p:cNvPr id="2" name="Title 1"/>
+          <p:cNvSpPr>
+            <a:spLocks noGrp="1"/>
+          </p:cNvSpPr>
+          <p:nvPr>
+            <p:ph type="title"/>
+          </p:nvPr>
+        </p:nvSpPr>
+        <p:spPr/>
+        <p:txBody>
+          <a:bodyPr/>
+          <a:lstStyle/>
+          <a:p>
+            <a:r>
+              <a:rPr lang="en-US" dirty="0" smtClean="0"/>
+              <a:t>Thesis</a:t>
+            </a:r>
+            <a:endParaRPr lang="en-US" dirty="0"/>
+          </a:p>
+        </p:txBody>
+      </p:sp>
+      <p:sp>
+        <p:nvSpPr>
+          <p:cNvPr id="3" name="Content Placeholder 2"/>
+          <p:cNvSpPr>
+            <a:spLocks noGrp="1"/>
+          </p:cNvSpPr>
+          <p:nvPr>
+            <p:ph idx="1"/>
+          </p:nvPr>
+        </p:nvSpPr>
+        <p:spPr/>
+        <p:txBody>
+          <a:bodyPr/>
+          <a:lstStyle/>
+          <a:p>
+            <a:endParaRPr lang="en-US" dirty="0"/>
+          </a:p>
+        </p:txBody>
+      </p:sp>
+      <p:pic>
+        <p:nvPicPr>
+          <p:cNvPr id="3074" name="Picture 2"/>
+          <p:cNvPicPr>
+            <a:picLocks noChangeAspect="1" noChangeArrowheads="1"/>
+          </p:cNvPicPr>
+          <p:nvPr/>
+        </p:nvPicPr>
+        <p:blipFill>
+          <a:blip r:embed="rId2" cstate="print"/>
+          <a:srcRect/>
+          <a:stretch>
+            <a:fillRect/>
+          </a:stretch>
+        </p:blipFill>
+        <p:spPr bwMode="auto">
+          <a:xfrm>
+            <a:off x="1371600" y="1143000"/>
+            <a:ext cx="6419850" cy="5715000"/>
+          </a:xfrm>
+          <a:prstGeom prst="rect">
+            <a:avLst/>
+          </a:prstGeom>
+          <a:noFill/>
+          <a:ln w="9525">
+            <a:noFill/>
+            <a:miter lim="800000"/>
+            <a:headEnd/>
+            <a:tailEnd/>
+          </a:ln>
+        </p:spPr>
+      </p:pic>
+    </p:spTree>
+  </p:cSld>
+  <p:clrMapOvr>
+    <a:masterClrMapping/>
+  </p:clrMapOvr>
+</p:sld>
+</file>
+
+<file path=ppt/slides/slide30.xml><?xml version="1.0" encoding="utf-8"?>
 <p:sld xmlns:a="http://schemas.openxmlformats.org/drawingml/2006/main" xmlns:r="http://schemas.openxmlformats.org/officeDocument/2006/relationships" xmlns:p="http://schemas.openxmlformats.org/presentationml/2006/main">
   <p:cSld>
     <p:spTree>
@@ -7709,7 +9018,7 @@
 </p:sld>
 </file>
 
-<file path=ppt/slides/slide25.xml><?xml version="1.0" encoding="utf-8"?>
+<file path=ppt/slides/slide31.xml><?xml version="1.0" encoding="utf-8"?>
 <p:sld xmlns:a="http://schemas.openxmlformats.org/drawingml/2006/main" xmlns:r="http://schemas.openxmlformats.org/officeDocument/2006/relationships" xmlns:p="http://schemas.openxmlformats.org/presentationml/2006/main">
   <p:cSld>
     <p:spTree>
@@ -7773,25 +9082,12 @@
             <a:pPr lvl="1"/>
             <a:r>
               <a:rPr lang="en-US" dirty="0" smtClean="0"/>
-              <a:t>30 x as fast for small files</a:t>
-            </a:r>
-          </a:p>
-          <a:p>
-            <a:pPr lvl="1"/>
-            <a:r>
-              <a:rPr lang="en-US" dirty="0" smtClean="0"/>
-              <a:t>Transparent to servers</a:t>
-            </a:r>
-          </a:p>
-          <a:p>
-            <a:pPr lvl="1"/>
-            <a:r>
-              <a:rPr lang="en-US" dirty="0" smtClean="0"/>
-              <a:t>Automatic for end users</a:t>
-            </a:r>
-          </a:p>
-          <a:p>
-            <a:pPr lvl="1"/>
+              <a:t>30 x as fast for small </a:t>
+            </a:r>
+            <a:r>
+              <a:rPr lang="en-US" dirty="0" smtClean="0"/>
+              <a:t>files</a:t>
+            </a:r>
             <a:endParaRPr lang="en-US" dirty="0" smtClean="0"/>
           </a:p>
         </p:txBody>
@@ -7804,7 +9100,7 @@
 </p:sld>
 </file>
 
-<file path=ppt/slides/slide26.xml><?xml version="1.0" encoding="utf-8"?>
+<file path=ppt/slides/slide32.xml><?xml version="1.0" encoding="utf-8"?>
 <p:sld xmlns:a="http://schemas.openxmlformats.org/drawingml/2006/main" xmlns:r="http://schemas.openxmlformats.org/officeDocument/2006/relationships" xmlns:p="http://schemas.openxmlformats.org/presentationml/2006/main">
   <p:cSld>
     <p:spTree>
@@ -7838,7 +9134,7 @@
           <a:p>
             <a:r>
               <a:rPr lang="en-US" dirty="0" smtClean="0"/>
-              <a:t>Future Work</a:t>
+              <a:t>Automatic Swarming Benefits</a:t>
             </a:r>
             <a:endParaRPr lang="en-US" dirty="0"/>
           </a:p>
@@ -7861,45 +9157,28 @@
           <a:p>
             <a:r>
               <a:rPr lang="en-US" dirty="0" smtClean="0"/>
-              <a:t>Back off the origin.</a:t>
-            </a:r>
-          </a:p>
-          <a:p>
-            <a:r>
-              <a:rPr lang="en-US" dirty="0" smtClean="0"/>
-              <a:t>Validate Integrity.</a:t>
-            </a:r>
-          </a:p>
-          <a:p>
-            <a:r>
-              <a:rPr lang="en-US" dirty="0" smtClean="0"/>
-              <a:t>Differentiate better for static/non-static.</a:t>
-            </a:r>
-          </a:p>
-          <a:p>
-            <a:r>
-              <a:rPr lang="en-US" dirty="0" smtClean="0"/>
-              <a:t>Better use of the DHT (fairness, speed).</a:t>
-            </a:r>
-          </a:p>
-          <a:p>
-            <a:r>
-              <a:rPr lang="en-US" dirty="0" smtClean="0"/>
-              <a:t>Dynamic parameters.</a:t>
-            </a:r>
-          </a:p>
-          <a:p>
-            <a:r>
-              <a:rPr lang="en-US" dirty="0" smtClean="0"/>
-              <a:t>Incentives.</a:t>
-            </a:r>
-          </a:p>
-          <a:p>
-            <a:r>
-              <a:rPr lang="en-US" dirty="0" smtClean="0"/>
-              <a:t>Privacy.</a:t>
-            </a:r>
-            <a:endParaRPr lang="en-US" dirty="0"/>
+              <a:t>Automatic transition</a:t>
+            </a:r>
+          </a:p>
+          <a:p>
+            <a:pPr lvl="1"/>
+            <a:r>
+              <a:rPr lang="en-US" dirty="0" smtClean="0"/>
+              <a:t>Small files</a:t>
+            </a:r>
+          </a:p>
+          <a:p>
+            <a:pPr lvl="1"/>
+            <a:r>
+              <a:rPr lang="en-US" dirty="0" smtClean="0"/>
+              <a:t>Client-server plus P2P</a:t>
+            </a:r>
+          </a:p>
+          <a:p>
+            <a:r>
+              <a:rPr lang="en-US" dirty="0" smtClean="0"/>
+              <a:t>Client-side protocol</a:t>
+            </a:r>
           </a:p>
         </p:txBody>
       </p:sp>
@@ -7911,7 +9190,114 @@
 </p:sld>
 </file>
 
-<file path=ppt/slides/slide3.xml><?xml version="1.0" encoding="utf-8"?>
+<file path=ppt/slides/slide33.xml><?xml version="1.0" encoding="utf-8"?>
+<p:sld xmlns:a="http://schemas.openxmlformats.org/drawingml/2006/main" xmlns:r="http://schemas.openxmlformats.org/officeDocument/2006/relationships" xmlns:p="http://schemas.openxmlformats.org/presentationml/2006/main">
+  <p:cSld>
+    <p:spTree>
+      <p:nvGrpSpPr>
+        <p:cNvPr id="1" name=""/>
+        <p:cNvGrpSpPr/>
+        <p:nvPr/>
+      </p:nvGrpSpPr>
+      <p:grpSpPr>
+        <a:xfrm>
+          <a:off x="0" y="0"/>
+          <a:ext cx="0" cy="0"/>
+          <a:chOff x="0" y="0"/>
+          <a:chExt cx="0" cy="0"/>
+        </a:xfrm>
+      </p:grpSpPr>
+      <p:sp>
+        <p:nvSpPr>
+          <p:cNvPr id="2" name="Title 1"/>
+          <p:cNvSpPr>
+            <a:spLocks noGrp="1"/>
+          </p:cNvSpPr>
+          <p:nvPr>
+            <p:ph type="title"/>
+          </p:nvPr>
+        </p:nvSpPr>
+        <p:spPr/>
+        <p:txBody>
+          <a:bodyPr/>
+          <a:lstStyle/>
+          <a:p>
+            <a:r>
+              <a:rPr lang="en-US" dirty="0" smtClean="0"/>
+              <a:t>Future Work</a:t>
+            </a:r>
+            <a:endParaRPr lang="en-US" dirty="0"/>
+          </a:p>
+        </p:txBody>
+      </p:sp>
+      <p:sp>
+        <p:nvSpPr>
+          <p:cNvPr id="3" name="Content Placeholder 2"/>
+          <p:cNvSpPr>
+            <a:spLocks noGrp="1"/>
+          </p:cNvSpPr>
+          <p:nvPr>
+            <p:ph idx="1"/>
+          </p:nvPr>
+        </p:nvSpPr>
+        <p:spPr/>
+        <p:txBody>
+          <a:bodyPr/>
+          <a:lstStyle/>
+          <a:p>
+            <a:r>
+              <a:rPr lang="en-US" dirty="0" smtClean="0"/>
+              <a:t>Back off the origin.</a:t>
+            </a:r>
+          </a:p>
+          <a:p>
+            <a:r>
+              <a:rPr lang="en-US" dirty="0" smtClean="0"/>
+              <a:t>Validate Integrity.</a:t>
+            </a:r>
+          </a:p>
+          <a:p>
+            <a:r>
+              <a:rPr lang="en-US" dirty="0" smtClean="0"/>
+              <a:t>Differentiate better for static/non-static.</a:t>
+            </a:r>
+          </a:p>
+          <a:p>
+            <a:r>
+              <a:rPr lang="en-US" dirty="0" smtClean="0"/>
+              <a:t>Better use of the DHT (fairness, speed).</a:t>
+            </a:r>
+          </a:p>
+          <a:p>
+            <a:r>
+              <a:rPr lang="en-US" dirty="0" smtClean="0"/>
+              <a:t>Dynamic parameters.</a:t>
+            </a:r>
+          </a:p>
+          <a:p>
+            <a:r>
+              <a:rPr lang="en-US" dirty="0" smtClean="0"/>
+              <a:t>Incentives.</a:t>
+            </a:r>
+          </a:p>
+          <a:p>
+            <a:r>
+              <a:rPr lang="en-US" dirty="0" smtClean="0"/>
+              <a:t>Privacy.</a:t>
+            </a:r>
+            <a:endParaRPr lang="en-US" dirty="0"/>
+          </a:p>
+        </p:txBody>
+      </p:sp>
+    </p:spTree>
+  </p:cSld>
+  <p:clrMapOvr>
+    <a:masterClrMapping/>
+  </p:clrMapOvr>
+</p:sld>
+</file>
+
+<file path=ppt/slides/slide4.xml><?xml version="1.0" encoding="utf-8"?>
 <p:sld xmlns:a="http://schemas.openxmlformats.org/drawingml/2006/main" xmlns:r="http://schemas.openxmlformats.org/officeDocument/2006/relationships" xmlns:p="http://schemas.openxmlformats.org/presentationml/2006/main">
   <p:cSld>
     <p:spTree>
@@ -8036,7 +9422,7 @@
 </p:sld>
 </file>
 
-<file path=ppt/slides/slide4.xml><?xml version="1.0" encoding="utf-8"?>
+<file path=ppt/slides/slide5.xml><?xml version="1.0" encoding="utf-8"?>
 <p:sld xmlns:a="http://schemas.openxmlformats.org/drawingml/2006/main" xmlns:r="http://schemas.openxmlformats.org/officeDocument/2006/relationships" xmlns:p="http://schemas.openxmlformats.org/presentationml/2006/main">
   <p:cSld>
     <p:spTree>
@@ -8179,102 +9565,6 @@
 </p:sld>
 </file>
 
-<file path=ppt/slides/slide5.xml><?xml version="1.0" encoding="utf-8"?>
-<p:sld xmlns:a="http://schemas.openxmlformats.org/drawingml/2006/main" xmlns:r="http://schemas.openxmlformats.org/officeDocument/2006/relationships" xmlns:p="http://schemas.openxmlformats.org/presentationml/2006/main">
-  <p:cSld>
-    <p:spTree>
-      <p:nvGrpSpPr>
-        <p:cNvPr id="1" name=""/>
-        <p:cNvGrpSpPr/>
-        <p:nvPr/>
-      </p:nvGrpSpPr>
-      <p:grpSpPr>
-        <a:xfrm>
-          <a:off x="0" y="0"/>
-          <a:ext cx="0" cy="0"/>
-          <a:chOff x="0" y="0"/>
-          <a:chExt cx="0" cy="0"/>
-        </a:xfrm>
-      </p:grpSpPr>
-      <p:sp>
-        <p:nvSpPr>
-          <p:cNvPr id="2" name="Title 1"/>
-          <p:cNvSpPr>
-            <a:spLocks noGrp="1"/>
-          </p:cNvSpPr>
-          <p:nvPr>
-            <p:ph type="title"/>
-          </p:nvPr>
-        </p:nvSpPr>
-        <p:spPr/>
-        <p:txBody>
-          <a:bodyPr/>
-          <a:lstStyle/>
-          <a:p>
-            <a:r>
-              <a:rPr lang="en-US" dirty="0" smtClean="0"/>
-              <a:t>My options</a:t>
-            </a:r>
-            <a:endParaRPr lang="en-US" dirty="0"/>
-          </a:p>
-        </p:txBody>
-      </p:sp>
-      <p:sp>
-        <p:nvSpPr>
-          <p:cNvPr id="3" name="Content Placeholder 2"/>
-          <p:cNvSpPr>
-            <a:spLocks noGrp="1"/>
-          </p:cNvSpPr>
-          <p:nvPr>
-            <p:ph idx="1"/>
-          </p:nvPr>
-        </p:nvSpPr>
-        <p:spPr/>
-        <p:txBody>
-          <a:bodyPr>
-            <a:normAutofit/>
-          </a:bodyPr>
-          <a:lstStyle/>
-          <a:p>
-            <a:r>
-              <a:rPr lang="en-US" dirty="0" smtClean="0"/>
-              <a:t>Hit reload.</a:t>
-            </a:r>
-          </a:p>
-          <a:p>
-            <a:r>
-              <a:rPr lang="en-US" dirty="0" smtClean="0"/>
-              <a:t>Try somewhere else.</a:t>
-            </a:r>
-          </a:p>
-          <a:p>
-            <a:r>
-              <a:rPr lang="en-US" dirty="0" smtClean="0"/>
-              <a:t>Download Manager.</a:t>
-            </a:r>
-          </a:p>
-          <a:p>
-            <a:r>
-              <a:rPr lang="en-US" dirty="0" smtClean="0"/>
-              <a:t>Add a local proxy.</a:t>
-            </a:r>
-          </a:p>
-          <a:p>
-            <a:r>
-              <a:rPr lang="en-US" dirty="0" smtClean="0"/>
-              <a:t>Beg the server to change how they serve the file.</a:t>
-            </a:r>
-          </a:p>
-        </p:txBody>
-      </p:sp>
-    </p:spTree>
-  </p:cSld>
-  <p:clrMapOvr>
-    <a:masterClrMapping/>
-  </p:clrMapOvr>
-</p:sld>
-</file>
-
 <file path=ppt/slides/slide6.xml><?xml version="1.0" encoding="utf-8"?>
 <p:sld xmlns:a="http://schemas.openxmlformats.org/drawingml/2006/main" xmlns:r="http://schemas.openxmlformats.org/officeDocument/2006/relationships" xmlns:p="http://schemas.openxmlformats.org/presentationml/2006/main">
   <p:cSld>
@@ -8309,6 +9599,102 @@
           <a:p>
             <a:r>
               <a:rPr lang="en-US" dirty="0" smtClean="0"/>
+              <a:t>User options</a:t>
+            </a:r>
+            <a:endParaRPr lang="en-US" dirty="0"/>
+          </a:p>
+        </p:txBody>
+      </p:sp>
+      <p:sp>
+        <p:nvSpPr>
+          <p:cNvPr id="3" name="Content Placeholder 2"/>
+          <p:cNvSpPr>
+            <a:spLocks noGrp="1"/>
+          </p:cNvSpPr>
+          <p:nvPr>
+            <p:ph idx="1"/>
+          </p:nvPr>
+        </p:nvSpPr>
+        <p:spPr/>
+        <p:txBody>
+          <a:bodyPr>
+            <a:normAutofit/>
+          </a:bodyPr>
+          <a:lstStyle/>
+          <a:p>
+            <a:r>
+              <a:rPr lang="en-US" dirty="0" smtClean="0"/>
+              <a:t>Hit reload.</a:t>
+            </a:r>
+          </a:p>
+          <a:p>
+            <a:r>
+              <a:rPr lang="en-US" dirty="0" smtClean="0"/>
+              <a:t>Try somewhere else.</a:t>
+            </a:r>
+          </a:p>
+          <a:p>
+            <a:r>
+              <a:rPr lang="en-US" dirty="0" smtClean="0"/>
+              <a:t>Download Manager.</a:t>
+            </a:r>
+          </a:p>
+          <a:p>
+            <a:r>
+              <a:rPr lang="en-US" dirty="0" smtClean="0"/>
+              <a:t>Add a local proxy.</a:t>
+            </a:r>
+          </a:p>
+          <a:p>
+            <a:r>
+              <a:rPr lang="en-US" dirty="0" smtClean="0"/>
+              <a:t>Beg the server to change how they serve the file.</a:t>
+            </a:r>
+          </a:p>
+        </p:txBody>
+      </p:sp>
+    </p:spTree>
+  </p:cSld>
+  <p:clrMapOvr>
+    <a:masterClrMapping/>
+  </p:clrMapOvr>
+</p:sld>
+</file>
+
+<file path=ppt/slides/slide7.xml><?xml version="1.0" encoding="utf-8"?>
+<p:sld xmlns:a="http://schemas.openxmlformats.org/drawingml/2006/main" xmlns:r="http://schemas.openxmlformats.org/officeDocument/2006/relationships" xmlns:p="http://schemas.openxmlformats.org/presentationml/2006/main">
+  <p:cSld>
+    <p:spTree>
+      <p:nvGrpSpPr>
+        <p:cNvPr id="1" name=""/>
+        <p:cNvGrpSpPr/>
+        <p:nvPr/>
+      </p:nvGrpSpPr>
+      <p:grpSpPr>
+        <a:xfrm>
+          <a:off x="0" y="0"/>
+          <a:ext cx="0" cy="0"/>
+          <a:chOff x="0" y="0"/>
+          <a:chExt cx="0" cy="0"/>
+        </a:xfrm>
+      </p:grpSpPr>
+      <p:sp>
+        <p:nvSpPr>
+          <p:cNvPr id="2" name="Title 1"/>
+          <p:cNvSpPr>
+            <a:spLocks noGrp="1"/>
+          </p:cNvSpPr>
+          <p:nvPr>
+            <p:ph type="title"/>
+          </p:nvPr>
+        </p:nvSpPr>
+        <p:spPr/>
+        <p:txBody>
+          <a:bodyPr/>
+          <a:lstStyle/>
+          <a:p>
+            <a:r>
+              <a:rPr lang="en-US" dirty="0" smtClean="0"/>
               <a:t>Server options</a:t>
             </a:r>
             <a:endParaRPr lang="en-US" dirty="0"/>
@@ -8356,14 +9742,13 @@
           <a:p>
             <a:r>
               <a:rPr lang="en-US" dirty="0" smtClean="0"/>
-              <a:t>Flash flood.</a:t>
-            </a:r>
-          </a:p>
-          <a:p>
-            <a:r>
-              <a:rPr lang="en-US" dirty="0" smtClean="0"/>
-              <a:t>Turn to P2P.</a:t>
-            </a:r>
+              <a:t>Flash flood</a:t>
+            </a:r>
+            <a:r>
+              <a:rPr lang="en-US" dirty="0" smtClean="0"/>
+              <a:t>.</a:t>
+            </a:r>
+            <a:endParaRPr lang="en-US" dirty="0" smtClean="0"/>
           </a:p>
         </p:txBody>
       </p:sp>
@@ -8401,7 +9786,7 @@
 </p:sld>
 </file>
 
-<file path=ppt/slides/slide7.xml><?xml version="1.0" encoding="utf-8"?>
+<file path=ppt/slides/slide8.xml><?xml version="1.0" encoding="utf-8"?>
 <p:sld xmlns:a="http://schemas.openxmlformats.org/drawingml/2006/main" xmlns:r="http://schemas.openxmlformats.org/officeDocument/2006/relationships" xmlns:p="http://schemas.openxmlformats.org/presentationml/2006/main">
   <p:cSld>
     <p:spTree>
@@ -8435,7 +9820,89 @@
           <a:p>
             <a:r>
               <a:rPr lang="en-US" dirty="0" smtClean="0"/>
-              <a:t>P2P</a:t>
+              <a:t>CDN fails</a:t>
+            </a:r>
+            <a:endParaRPr lang="en-US" dirty="0"/>
+          </a:p>
+        </p:txBody>
+      </p:sp>
+      <p:pic>
+        <p:nvPicPr>
+          <p:cNvPr id="2050" name="Picture 2"/>
+          <p:cNvPicPr>
+            <a:picLocks noGrp="1" noChangeAspect="1" noChangeArrowheads="1"/>
+          </p:cNvPicPr>
+          <p:nvPr>
+            <p:ph idx="1"/>
+          </p:nvPr>
+        </p:nvPicPr>
+        <p:blipFill>
+          <a:blip r:embed="rId2" cstate="print"/>
+          <a:srcRect/>
+          <a:stretch>
+            <a:fillRect/>
+          </a:stretch>
+        </p:blipFill>
+        <p:spPr bwMode="auto">
+          <a:xfrm>
+            <a:off x="457200" y="1600200"/>
+            <a:ext cx="8229600" cy="2188167"/>
+          </a:xfrm>
+          <a:prstGeom prst="rect">
+            <a:avLst/>
+          </a:prstGeom>
+          <a:noFill/>
+          <a:ln w="9525">
+            <a:noFill/>
+            <a:miter lim="800000"/>
+            <a:headEnd/>
+            <a:tailEnd/>
+          </a:ln>
+        </p:spPr>
+      </p:pic>
+    </p:spTree>
+  </p:cSld>
+  <p:clrMapOvr>
+    <a:masterClrMapping/>
+  </p:clrMapOvr>
+</p:sld>
+</file>
+
+<file path=ppt/slides/slide9.xml><?xml version="1.0" encoding="utf-8"?>
+<p:sld xmlns:a="http://schemas.openxmlformats.org/drawingml/2006/main" xmlns:r="http://schemas.openxmlformats.org/officeDocument/2006/relationships" xmlns:p="http://schemas.openxmlformats.org/presentationml/2006/main">
+  <p:cSld>
+    <p:spTree>
+      <p:nvGrpSpPr>
+        <p:cNvPr id="1" name=""/>
+        <p:cNvGrpSpPr/>
+        <p:nvPr/>
+      </p:nvGrpSpPr>
+      <p:grpSpPr>
+        <a:xfrm>
+          <a:off x="0" y="0"/>
+          <a:ext cx="0" cy="0"/>
+          <a:chOff x="0" y="0"/>
+          <a:chExt cx="0" cy="0"/>
+        </a:xfrm>
+      </p:grpSpPr>
+      <p:sp>
+        <p:nvSpPr>
+          <p:cNvPr id="2" name="Title 1"/>
+          <p:cNvSpPr>
+            <a:spLocks noGrp="1"/>
+          </p:cNvSpPr>
+          <p:nvPr>
+            <p:ph type="title"/>
+          </p:nvPr>
+        </p:nvSpPr>
+        <p:spPr/>
+        <p:txBody>
+          <a:bodyPr/>
+          <a:lstStyle/>
+          <a:p>
+            <a:r>
+              <a:rPr lang="en-US" dirty="0" smtClean="0"/>
+              <a:t>Turn to P2P</a:t>
             </a:r>
             <a:endParaRPr lang="en-US" dirty="0"/>
           </a:p>
@@ -8478,17 +9945,22 @@
           <a:p>
             <a:r>
               <a:rPr lang="en-US" dirty="0" smtClean="0"/>
-              <a:t>Peers download and share.</a:t>
-            </a:r>
-          </a:p>
-          <a:p>
-            <a:r>
-              <a:rPr lang="en-US" dirty="0" smtClean="0"/>
-              <a:t>Works </a:t>
-            </a:r>
-            <a:r>
-              <a:rPr lang="en-US" smtClean="0"/>
-              <a:t>well sometimes.</a:t>
+              <a:t>Peers download and </a:t>
+            </a:r>
+            <a:r>
+              <a:rPr lang="en-US" dirty="0" smtClean="0"/>
+              <a:t>share blocks.</a:t>
+            </a:r>
+            <a:endParaRPr lang="en-US" dirty="0" smtClean="0"/>
+          </a:p>
+          <a:p>
+            <a:r>
+              <a:rPr lang="en-US" dirty="0" smtClean="0"/>
+              <a:t>Works well </a:t>
+            </a:r>
+            <a:r>
+              <a:rPr lang="en-US" dirty="0" smtClean="0"/>
+              <a:t>for large popular files.</a:t>
             </a:r>
             <a:endParaRPr lang="en-US" dirty="0" smtClean="0"/>
           </a:p>
@@ -8520,195 +9992,6 @@
           <a:noFill/>
         </p:spPr>
       </p:pic>
-    </p:spTree>
-  </p:cSld>
-  <p:clrMapOvr>
-    <a:masterClrMapping/>
-  </p:clrMapOvr>
-</p:sld>
-</file>
-
-<file path=ppt/slides/slide8.xml><?xml version="1.0" encoding="utf-8"?>
-<p:sld xmlns:a="http://schemas.openxmlformats.org/drawingml/2006/main" xmlns:r="http://schemas.openxmlformats.org/officeDocument/2006/relationships" xmlns:p="http://schemas.openxmlformats.org/presentationml/2006/main">
-  <p:cSld>
-    <p:spTree>
-      <p:nvGrpSpPr>
-        <p:cNvPr id="1" name=""/>
-        <p:cNvGrpSpPr/>
-        <p:nvPr/>
-      </p:nvGrpSpPr>
-      <p:grpSpPr>
-        <a:xfrm>
-          <a:off x="0" y="0"/>
-          <a:ext cx="0" cy="0"/>
-          <a:chOff x="0" y="0"/>
-          <a:chExt cx="0" cy="0"/>
-        </a:xfrm>
-      </p:grpSpPr>
-      <p:sp>
-        <p:nvSpPr>
-          <p:cNvPr id="2" name="Title 1"/>
-          <p:cNvSpPr>
-            <a:spLocks noGrp="1"/>
-          </p:cNvSpPr>
-          <p:nvPr>
-            <p:ph type="title"/>
-          </p:nvPr>
-        </p:nvSpPr>
-        <p:spPr/>
-        <p:txBody>
-          <a:bodyPr>
-            <a:normAutofit/>
-          </a:bodyPr>
-          <a:lstStyle/>
-          <a:p>
-            <a:r>
-              <a:rPr lang="en-US" dirty="0" smtClean="0"/>
-              <a:t>Hard to get right</a:t>
-            </a:r>
-            <a:endParaRPr lang="en-US" dirty="0"/>
-          </a:p>
-        </p:txBody>
-      </p:sp>
-      <p:sp>
-        <p:nvSpPr>
-          <p:cNvPr id="3" name="Content Placeholder 2"/>
-          <p:cNvSpPr>
-            <a:spLocks noGrp="1"/>
-          </p:cNvSpPr>
-          <p:nvPr>
-            <p:ph idx="1"/>
-          </p:nvPr>
-        </p:nvSpPr>
-        <p:spPr/>
-        <p:txBody>
-          <a:bodyPr/>
-          <a:lstStyle/>
-          <a:p>
-            <a:endParaRPr lang="en-US"/>
-          </a:p>
-        </p:txBody>
-      </p:sp>
-      <p:pic>
-        <p:nvPicPr>
-          <p:cNvPr id="1026" name="Picture 2" descr="C:\Users\packrd\Desktop\fail for OO BT.jpg"/>
-          <p:cNvPicPr>
-            <a:picLocks noChangeAspect="1" noChangeArrowheads="1"/>
-          </p:cNvPicPr>
-          <p:nvPr/>
-        </p:nvPicPr>
-        <p:blipFill>
-          <a:blip r:embed="rId3" cstate="print"/>
-          <a:srcRect/>
-          <a:stretch>
-            <a:fillRect/>
-          </a:stretch>
-        </p:blipFill>
-        <p:spPr bwMode="auto">
-          <a:xfrm>
-            <a:off x="10159" y="1149350"/>
-            <a:ext cx="9133841" cy="5708650"/>
-          </a:xfrm>
-          <a:prstGeom prst="rect">
-            <a:avLst/>
-          </a:prstGeom>
-          <a:noFill/>
-        </p:spPr>
-      </p:pic>
-    </p:spTree>
-  </p:cSld>
-  <p:clrMapOvr>
-    <a:masterClrMapping/>
-  </p:clrMapOvr>
-  <p:timing>
-    <p:tnLst>
-      <p:par>
-        <p:cTn id="1" dur="indefinite" restart="never" nodeType="tmRoot"/>
-      </p:par>
-    </p:tnLst>
-  </p:timing>
-</p:sld>
-</file>
-
-<file path=ppt/slides/slide9.xml><?xml version="1.0" encoding="utf-8"?>
-<p:sld xmlns:a="http://schemas.openxmlformats.org/drawingml/2006/main" xmlns:r="http://schemas.openxmlformats.org/officeDocument/2006/relationships" xmlns:p="http://schemas.openxmlformats.org/presentationml/2006/main">
-  <p:cSld>
-    <p:spTree>
-      <p:nvGrpSpPr>
-        <p:cNvPr id="1" name=""/>
-        <p:cNvGrpSpPr/>
-        <p:nvPr/>
-      </p:nvGrpSpPr>
-      <p:grpSpPr>
-        <a:xfrm>
-          <a:off x="0" y="0"/>
-          <a:ext cx="0" cy="0"/>
-          <a:chOff x="0" y="0"/>
-          <a:chExt cx="0" cy="0"/>
-        </a:xfrm>
-      </p:grpSpPr>
-      <p:sp>
-        <p:nvSpPr>
-          <p:cNvPr id="2" name="Title 1"/>
-          <p:cNvSpPr>
-            <a:spLocks noGrp="1"/>
-          </p:cNvSpPr>
-          <p:nvPr>
-            <p:ph type="title"/>
-          </p:nvPr>
-        </p:nvSpPr>
-        <p:spPr/>
-        <p:txBody>
-          <a:bodyPr>
-            <a:normAutofit/>
-          </a:bodyPr>
-          <a:lstStyle/>
-          <a:p>
-            <a:r>
-              <a:rPr lang="en-US" dirty="0" smtClean="0"/>
-              <a:t>Automatic Swarming</a:t>
-            </a:r>
-            <a:endParaRPr lang="en-US" dirty="0"/>
-          </a:p>
-        </p:txBody>
-      </p:sp>
-      <p:sp>
-        <p:nvSpPr>
-          <p:cNvPr id="5" name="Content Placeholder 4"/>
-          <p:cNvSpPr>
-            <a:spLocks noGrp="1"/>
-          </p:cNvSpPr>
-          <p:nvPr>
-            <p:ph idx="1"/>
-          </p:nvPr>
-        </p:nvSpPr>
-        <p:spPr/>
-        <p:txBody>
-          <a:bodyPr/>
-          <a:lstStyle/>
-          <a:p>
-            <a:r>
-              <a:rPr lang="en-US" dirty="0" smtClean="0"/>
-              <a:t>Basic Algorithm:</a:t>
-            </a:r>
-          </a:p>
-          <a:p>
-            <a:pPr lvl="1"/>
-            <a:r>
-              <a:rPr lang="en-US" dirty="0" smtClean="0"/>
-              <a:t>Monitor download</a:t>
-            </a:r>
-          </a:p>
-          <a:p>
-            <a:pPr lvl="1"/>
-            <a:r>
-              <a:rPr lang="en-US" dirty="0" smtClean="0"/>
-              <a:t>Download blocks from Peers when becomes slow.</a:t>
-            </a:r>
-            <a:endParaRPr lang="en-US" dirty="0"/>
-          </a:p>
-        </p:txBody>
-      </p:sp>
     </p:spTree>
   </p:cSld>
   <p:clrMapOvr>

</xml_diff>

<commit_message>
lists my next steps2
</commit_message>
<xml_diff>
--- a/thesis_presentation/How to Make the Internet Faster.pptx
+++ b/thesis_presentation/How to Make the Internet Faster.pptx
@@ -551,8 +551,24 @@
           </a:p>
           <a:p>
             <a:r>
-              <a:rPr lang="en-US" smtClean="0"/>
+              <a:rPr lang="en-US" dirty="0" smtClean="0"/>
               <a:t>take out all periods</a:t>
+            </a:r>
+          </a:p>
+          <a:p>
+            <a:r>
+              <a:rPr lang="en-US" dirty="0" smtClean="0"/>
+              <a:t>Fix references…</a:t>
+            </a:r>
+          </a:p>
+          <a:p>
+            <a:r>
+              <a:rPr lang="en-US" dirty="0" smtClean="0"/>
+              <a:t>Fix that </a:t>
+            </a:r>
+            <a:r>
+              <a:rPr lang="en-US" smtClean="0"/>
+              <a:t>one graph</a:t>
             </a:r>
             <a:endParaRPr lang="en-US" dirty="0"/>
           </a:p>

</xml_diff>

<commit_message>
describe the individual parameter tests, works for me
</commit_message>
<xml_diff>
--- a/thesis_presentation/How to Make the Internet Faster.pptx
+++ b/thesis_presentation/How to Make the Internet Faster.pptx
@@ -5,7 +5,7 @@
     <p:sldMasterId id="2147483648" r:id="rId1"/>
   </p:sldMasterIdLst>
   <p:notesMasterIdLst>
-    <p:notesMasterId r:id="rId35"/>
+    <p:notesMasterId r:id="rId36"/>
   </p:notesMasterIdLst>
   <p:sldIdLst>
     <p:sldId id="256" r:id="rId2"/>
@@ -32,15 +32,16 @@
     <p:sldId id="303" r:id="rId23"/>
     <p:sldId id="281" r:id="rId24"/>
     <p:sldId id="270" r:id="rId25"/>
-    <p:sldId id="274" r:id="rId26"/>
-    <p:sldId id="275" r:id="rId27"/>
-    <p:sldId id="277" r:id="rId28"/>
-    <p:sldId id="278" r:id="rId29"/>
-    <p:sldId id="294" r:id="rId30"/>
-    <p:sldId id="279" r:id="rId31"/>
-    <p:sldId id="298" r:id="rId32"/>
-    <p:sldId id="280" r:id="rId33"/>
-    <p:sldId id="292" r:id="rId34"/>
+    <p:sldId id="308" r:id="rId26"/>
+    <p:sldId id="274" r:id="rId27"/>
+    <p:sldId id="275" r:id="rId28"/>
+    <p:sldId id="277" r:id="rId29"/>
+    <p:sldId id="278" r:id="rId30"/>
+    <p:sldId id="294" r:id="rId31"/>
+    <p:sldId id="279" r:id="rId32"/>
+    <p:sldId id="298" r:id="rId33"/>
+    <p:sldId id="280" r:id="rId34"/>
+    <p:sldId id="292" r:id="rId35"/>
   </p:sldIdLst>
   <p:sldSz cx="9144000" cy="6858000" type="screen4x3"/>
   <p:notesSz cx="6858000" cy="9144000"/>
@@ -1909,6 +1910,18 @@
           </a:bodyPr>
           <a:lstStyle/>
           <a:p>
+            <a:r>
+              <a:rPr lang="en-US" dirty="0" smtClean="0"/>
+              <a:t>Could avoid this</a:t>
+            </a:r>
+            <a:r>
+              <a:rPr lang="en-US" baseline="0" dirty="0" smtClean="0"/>
+              <a:t> slide altogether, I </a:t>
+            </a:r>
+            <a:r>
+              <a:rPr lang="en-US" baseline="0" smtClean="0"/>
+              <a:t>suppose.</a:t>
+            </a:r>
             <a:endParaRPr lang="en-US" dirty="0"/>
           </a:p>
         </p:txBody>
@@ -2013,7 +2026,7 @@
             <a:fld id="{CFD85767-B34F-4122-8642-982296400DCD}" type="slidenum">
               <a:rPr lang="en-US" smtClean="0"/>
               <a:pPr/>
-              <a:t>25</a:t>
+              <a:t>26</a:t>
             </a:fld>
             <a:endParaRPr lang="en-US"/>
           </a:p>
@@ -2095,7 +2108,7 @@
             <a:fld id="{CFD85767-B34F-4122-8642-982296400DCD}" type="slidenum">
               <a:rPr lang="en-US" smtClean="0"/>
               <a:pPr/>
-              <a:t>26</a:t>
+              <a:t>27</a:t>
             </a:fld>
             <a:endParaRPr lang="en-US"/>
           </a:p>
@@ -2177,7 +2190,7 @@
             <a:fld id="{CFD85767-B34F-4122-8642-982296400DCD}" type="slidenum">
               <a:rPr lang="en-US" smtClean="0"/>
               <a:pPr/>
-              <a:t>27</a:t>
+              <a:t>28</a:t>
             </a:fld>
             <a:endParaRPr lang="en-US"/>
           </a:p>
@@ -2283,7 +2296,7 @@
             <a:fld id="{CFD85767-B34F-4122-8642-982296400DCD}" type="slidenum">
               <a:rPr lang="en-US" smtClean="0"/>
               <a:pPr/>
-              <a:t>28</a:t>
+              <a:t>29</a:t>
             </a:fld>
             <a:endParaRPr lang="en-US"/>
           </a:p>
@@ -2365,7 +2378,7 @@
             <a:fld id="{CFD85767-B34F-4122-8642-982296400DCD}" type="slidenum">
               <a:rPr lang="en-US" smtClean="0"/>
               <a:pPr/>
-              <a:t>29</a:t>
+              <a:t>30</a:t>
             </a:fld>
             <a:endParaRPr lang="en-US"/>
           </a:p>
@@ -2529,7 +2542,7 @@
             <a:fld id="{CFD85767-B34F-4122-8642-982296400DCD}" type="slidenum">
               <a:rPr lang="en-US" smtClean="0"/>
               <a:pPr/>
-              <a:t>30</a:t>
+              <a:t>31</a:t>
             </a:fld>
             <a:endParaRPr lang="en-US"/>
           </a:p>
@@ -2611,7 +2624,7 @@
             <a:fld id="{CFD85767-B34F-4122-8642-982296400DCD}" type="slidenum">
               <a:rPr lang="en-US" smtClean="0"/>
               <a:pPr/>
-              <a:t>31</a:t>
+              <a:t>32</a:t>
             </a:fld>
             <a:endParaRPr lang="en-US"/>
           </a:p>
@@ -2693,7 +2706,7 @@
             <a:fld id="{CFD85767-B34F-4122-8642-982296400DCD}" type="slidenum">
               <a:rPr lang="en-US" smtClean="0"/>
               <a:pPr/>
-              <a:t>32</a:t>
+              <a:t>33</a:t>
             </a:fld>
             <a:endParaRPr lang="en-US"/>
           </a:p>
@@ -2775,7 +2788,7 @@
             <a:fld id="{CFD85767-B34F-4122-8642-982296400DCD}" type="slidenum">
               <a:rPr lang="en-US" smtClean="0"/>
               <a:pPr/>
-              <a:t>33</a:t>
+              <a:t>34</a:t>
             </a:fld>
             <a:endParaRPr lang="en-US"/>
           </a:p>
@@ -6433,7 +6446,7 @@
         <p:spPr/>
         <p:txBody>
           <a:bodyPr>
-            <a:normAutofit/>
+            <a:normAutofit fontScale="92500" lnSpcReduction="10000"/>
           </a:bodyPr>
           <a:lstStyle/>
           <a:p>
@@ -6450,6 +6463,32 @@
             </a:r>
           </a:p>
           <a:p>
+            <a:pPr lvl="2"/>
+            <a:r>
+              <a:rPr lang="en-US" dirty="0" smtClean="0"/>
+              <a:t>No transition</a:t>
+            </a:r>
+          </a:p>
+          <a:p>
+            <a:pPr lvl="2"/>
+            <a:r>
+              <a:rPr lang="en-US" dirty="0" smtClean="0"/>
+              <a:t>Extra hop</a:t>
+            </a:r>
+          </a:p>
+          <a:p>
+            <a:pPr lvl="2"/>
+            <a:r>
+              <a:rPr lang="en-US" dirty="0" smtClean="0"/>
+              <a:t>No </a:t>
+            </a:r>
+            <a:r>
+              <a:rPr lang="en-US" dirty="0" smtClean="0"/>
+              <a:t>swarming</a:t>
+            </a:r>
+            <a:endParaRPr lang="en-US" dirty="0" smtClean="0"/>
+          </a:p>
+          <a:p>
             <a:r>
               <a:rPr lang="en-US" dirty="0" smtClean="0"/>
               <a:t>Server-side protocols</a:t>
@@ -6461,6 +6500,14 @@
               <a:rPr lang="en-US" dirty="0" smtClean="0"/>
               <a:t>Backslash</a:t>
             </a:r>
+          </a:p>
+          <a:p>
+            <a:pPr lvl="2"/>
+            <a:r>
+              <a:rPr lang="en-US" dirty="0" smtClean="0"/>
+              <a:t>Limited by servers’ bandwidth</a:t>
+            </a:r>
+            <a:endParaRPr lang="en-US" dirty="0" smtClean="0"/>
           </a:p>
           <a:p>
             <a:r>
@@ -7027,8 +7074,13 @@
           <a:p>
             <a:r>
               <a:rPr lang="en-US" dirty="0" smtClean="0"/>
-              <a:t>Last block problem</a:t>
-            </a:r>
+              <a:t>Last </a:t>
+            </a:r>
+            <a:r>
+              <a:rPr lang="en-US" dirty="0" smtClean="0"/>
+              <a:t>block</a:t>
+            </a:r>
+            <a:endParaRPr lang="en-US" dirty="0" smtClean="0"/>
           </a:p>
         </p:txBody>
       </p:sp>
@@ -7373,13 +7425,17 @@
           <a:p>
             <a:r>
               <a:rPr lang="en-US" dirty="0" smtClean="0"/>
-              <a:t>Download from multiple clients</a:t>
-            </a:r>
-          </a:p>
-          <a:p>
-            <a:r>
-              <a:rPr lang="en-US" dirty="0" smtClean="0"/>
-              <a:t>Run until finish</a:t>
+              <a:t>Start multiple clients over some time</a:t>
+            </a:r>
+          </a:p>
+          <a:p>
+            <a:r>
+              <a:rPr lang="en-US" dirty="0" smtClean="0"/>
+              <a:t>Run </a:t>
+            </a:r>
+            <a:r>
+              <a:rPr lang="en-US" dirty="0" smtClean="0"/>
+              <a:t>until finish</a:t>
             </a:r>
           </a:p>
           <a:p>
@@ -7391,8 +7447,13 @@
           <a:p>
             <a:r>
               <a:rPr lang="en-US" dirty="0" smtClean="0"/>
-              <a:t>Graph percentiles of: </a:t>
-            </a:r>
+              <a:t>Graph </a:t>
+            </a:r>
+            <a:r>
+              <a:rPr lang="en-US" dirty="0" smtClean="0"/>
+              <a:t>percentiles</a:t>
+            </a:r>
+            <a:endParaRPr lang="en-US" dirty="0" smtClean="0"/>
           </a:p>
           <a:p>
             <a:pPr lvl="1"/>
@@ -7434,7 +7495,7 @@
         </p:blipFill>
         <p:spPr bwMode="auto">
           <a:xfrm>
-            <a:off x="7696200" y="3200400"/>
+            <a:off x="7239000" y="1752600"/>
             <a:ext cx="828675" cy="2679970"/>
           </a:xfrm>
           <a:prstGeom prst="rect">
@@ -7530,7 +7591,6 @@
               <a:rPr lang="en-US" dirty="0" smtClean="0"/>
               <a:t>Load</a:t>
             </a:r>
-            <a:endParaRPr lang="en-US" dirty="0" smtClean="0"/>
           </a:p>
           <a:p>
             <a:pPr lvl="1"/>
@@ -7570,7 +7630,11 @@
           <a:p>
             <a:r>
               <a:rPr lang="en-US" dirty="0" smtClean="0"/>
-              <a:t>100 s</a:t>
+              <a:t>100 </a:t>
+            </a:r>
+            <a:r>
+              <a:rPr lang="en-US" dirty="0" smtClean="0"/>
+              <a:t>s</a:t>
             </a:r>
           </a:p>
           <a:p>
@@ -7582,7 +7646,11 @@
           <a:p>
             <a:r>
               <a:rPr lang="en-US" dirty="0" smtClean="0"/>
-              <a:t>Client-server and Automatic Swarming</a:t>
+              <a:t>Both Client-Server </a:t>
+            </a:r>
+            <a:r>
+              <a:rPr lang="en-US" dirty="0" smtClean="0"/>
+              <a:t>and Automatic Swarming</a:t>
             </a:r>
           </a:p>
         </p:txBody>
@@ -8019,12 +8087,16 @@
               <a:rPr lang="en-US" dirty="0" smtClean="0"/>
               <a:t>Automatic Swarming – </a:t>
             </a:r>
+            <a:r>
+              <a:rPr lang="en-US" dirty="0" smtClean="0"/>
+              <a:t/>
+            </a:r>
             <a:br>
               <a:rPr lang="en-US" dirty="0" smtClean="0"/>
             </a:br>
             <a:r>
               <a:rPr lang="en-US" dirty="0" smtClean="0"/>
-              <a:t>Transition Cause</a:t>
+              <a:t>Transition Causes</a:t>
             </a:r>
             <a:endParaRPr lang="en-US" dirty="0"/>
           </a:p>
@@ -8234,7 +8306,7 @@
           <a:p>
             <a:r>
               <a:rPr lang="en-US" dirty="0" smtClean="0"/>
-              <a:t>Best Parameter Values</a:t>
+              <a:t>Individual Parameter Tests</a:t>
             </a:r>
             <a:endParaRPr lang="en-US" dirty="0"/>
           </a:p>
@@ -8252,76 +8324,89 @@
         </p:nvSpPr>
         <p:spPr>
           <a:xfrm>
-            <a:off x="457200" y="2713037"/>
+            <a:off x="381000" y="1600200"/>
             <a:ext cx="8229600" cy="4525963"/>
           </a:xfrm>
         </p:spPr>
         <p:txBody>
           <a:bodyPr>
-            <a:normAutofit/>
+            <a:normAutofit lnSpcReduction="10000"/>
           </a:bodyPr>
           <a:lstStyle/>
           <a:p>
             <a:r>
               <a:rPr lang="en-US" dirty="0" smtClean="0"/>
-              <a:t>T: 0.75 s</a:t>
-            </a:r>
-          </a:p>
-          <a:p>
-            <a:r>
-              <a:rPr lang="en-US" dirty="0" smtClean="0"/>
-              <a:t>W</a:t>
-            </a:r>
-            <a:r>
-              <a:rPr lang="en-US" dirty="0" smtClean="0"/>
-              <a:t>: 0.25 </a:t>
-            </a:r>
-            <a:r>
-              <a:rPr lang="en-US" dirty="0" smtClean="0"/>
-              <a:t>s</a:t>
+              <a:t>Load</a:t>
             </a:r>
           </a:p>
           <a:p>
             <a:pPr lvl="1"/>
             <a:r>
               <a:rPr lang="en-US" dirty="0" smtClean="0"/>
-              <a:t>Prefer low</a:t>
+              <a:t>1000 </a:t>
+            </a:r>
+            <a:r>
+              <a:rPr lang="en-US" dirty="0" smtClean="0"/>
+              <a:t>peers</a:t>
+            </a:r>
+          </a:p>
+          <a:p>
+            <a:pPr lvl="1"/>
+            <a:r>
+              <a:rPr lang="en-US" dirty="0" smtClean="0"/>
+              <a:t>15 peers/s</a:t>
+            </a:r>
+          </a:p>
+          <a:p>
+            <a:pPr lvl="1"/>
+            <a:r>
+              <a:rPr lang="en-US" dirty="0" smtClean="0"/>
+              <a:t>File size: 100 KB</a:t>
+            </a:r>
+          </a:p>
+          <a:p>
+            <a:pPr lvl="1"/>
+            <a:r>
+              <a:rPr lang="en-US" dirty="0" smtClean="0"/>
+              <a:t>R 128 KB/s</a:t>
+            </a:r>
+          </a:p>
+          <a:p>
+            <a:pPr lvl="1"/>
+            <a:r>
+              <a:rPr lang="en-US" dirty="0" smtClean="0"/>
+              <a:t>W 2s</a:t>
+            </a:r>
+          </a:p>
+          <a:p>
+            <a:pPr lvl="1"/>
+            <a:r>
+              <a:rPr lang="en-US" dirty="0" smtClean="0"/>
+              <a:t>T 1s</a:t>
+            </a:r>
+          </a:p>
+          <a:p>
+            <a:pPr lvl="1"/>
+            <a:r>
+              <a:rPr lang="en-US" dirty="0" smtClean="0"/>
+              <a:t>Linger </a:t>
+            </a:r>
+            <a:r>
+              <a:rPr lang="en-US" dirty="0" smtClean="0"/>
+              <a:t>20s</a:t>
             </a:r>
             <a:endParaRPr lang="en-US" dirty="0" smtClean="0"/>
           </a:p>
           <a:p>
             <a:r>
               <a:rPr lang="en-US" dirty="0" smtClean="0"/>
-              <a:t>R: 160 KB/s</a:t>
-            </a:r>
-          </a:p>
-          <a:p>
-            <a:r>
-              <a:rPr lang="en-US" dirty="0" smtClean="0"/>
-              <a:t>Block </a:t>
-            </a:r>
-            <a:r>
-              <a:rPr lang="en-US" dirty="0" smtClean="0"/>
-              <a:t>size: 32 </a:t>
-            </a:r>
-            <a:r>
-              <a:rPr lang="en-US" dirty="0" smtClean="0"/>
-              <a:t>KB</a:t>
-            </a:r>
-          </a:p>
-          <a:p>
-            <a:pPr lvl="1"/>
-            <a:r>
-              <a:rPr lang="en-US" dirty="0" smtClean="0"/>
-              <a:t>Parallelize</a:t>
+              <a:t>Vary one parameter</a:t>
+            </a:r>
+            <a:r>
+              <a:rPr lang="en-US" smtClean="0"/>
+              <a:t>, hold rest constant</a:t>
             </a:r>
             <a:endParaRPr lang="en-US" dirty="0" smtClean="0"/>
-          </a:p>
-          <a:p>
-            <a:r>
-              <a:rPr lang="en-US" dirty="0" smtClean="0"/>
-              <a:t>Peer concurrency count: 16 +</a:t>
-            </a:r>
           </a:p>
         </p:txBody>
       </p:sp>
@@ -8342,7 +8427,7 @@
         </p:blipFill>
         <p:spPr bwMode="auto">
           <a:xfrm>
-            <a:off x="3031661" y="1142999"/>
+            <a:off x="3539303" y="1219200"/>
             <a:ext cx="5604697" cy="3581401"/>
           </a:xfrm>
           <a:prstGeom prst="rect">
@@ -8395,34 +8480,6 @@
         </p:nvSpPr>
         <p:spPr/>
         <p:txBody>
-          <a:bodyPr/>
-          <a:lstStyle/>
-          <a:p>
-            <a:r>
-              <a:rPr lang="en-US" dirty="0" smtClean="0"/>
-              <a:t>Full Web Page</a:t>
-            </a:r>
-            <a:endParaRPr lang="en-US" dirty="0"/>
-          </a:p>
-        </p:txBody>
-      </p:sp>
-      <p:sp>
-        <p:nvSpPr>
-          <p:cNvPr id="5" name="Content Placeholder 2"/>
-          <p:cNvSpPr>
-            <a:spLocks noGrp="1"/>
-          </p:cNvSpPr>
-          <p:nvPr>
-            <p:ph idx="1"/>
-          </p:nvPr>
-        </p:nvSpPr>
-        <p:spPr>
-          <a:xfrm>
-            <a:off x="457200" y="1600200"/>
-            <a:ext cx="8229600" cy="4525963"/>
-          </a:xfrm>
-        </p:spPr>
-        <p:txBody>
           <a:bodyPr>
             <a:normAutofit/>
           </a:bodyPr>
@@ -8430,15 +8487,7 @@
           <a:p>
             <a:r>
               <a:rPr lang="en-US" dirty="0" smtClean="0"/>
-              <a:t>100 KB file, </a:t>
-            </a:r>
-            <a:r>
-              <a:rPr lang="en-US" smtClean="0"/>
-              <a:t>10 10K </a:t>
-            </a:r>
-            <a:r>
-              <a:rPr lang="en-US" dirty="0" smtClean="0"/>
-              <a:t>files</a:t>
+              <a:t>Optimal Values</a:t>
             </a:r>
             <a:endParaRPr lang="en-US" dirty="0"/>
           </a:p>
@@ -8446,7 +8495,7 @@
       </p:sp>
       <p:sp>
         <p:nvSpPr>
-          <p:cNvPr id="6" name="Content Placeholder 2"/>
+          <p:cNvPr id="4" name="Content Placeholder 2"/>
           <p:cNvSpPr txBox="1">
             <a:spLocks/>
           </p:cNvSpPr>
@@ -8454,8 +8503,8 @@
         </p:nvSpPr>
         <p:spPr>
           <a:xfrm>
-            <a:off x="533400" y="5608637"/>
-            <a:ext cx="8229600" cy="1249363"/>
+            <a:off x="457200" y="2057400"/>
+            <a:ext cx="8229600" cy="4525963"/>
           </a:xfrm>
           <a:prstGeom prst="rect">
             <a:avLst/>
@@ -8466,6 +8515,38 @@
             <a:normAutofit/>
           </a:bodyPr>
           <a:lstStyle/>
+          <a:p>
+            <a:pPr marL="342900" lvl="0" indent="-342900">
+              <a:spcBef>
+                <a:spcPct val="20000"/>
+              </a:spcBef>
+              <a:buFont typeface="Arial" pitchFamily="34" charset="0"/>
+              <a:buChar char="•"/>
+              <a:defRPr/>
+            </a:pPr>
+            <a:r>
+              <a:rPr lang="en-US" sz="3200" dirty="0" smtClean="0"/>
+              <a:t>T: 0.75 </a:t>
+            </a:r>
+            <a:r>
+              <a:rPr lang="en-US" sz="3200" dirty="0" smtClean="0"/>
+              <a:t>s</a:t>
+            </a:r>
+          </a:p>
+          <a:p>
+            <a:pPr marL="742950" lvl="1" indent="-285750">
+              <a:spcBef>
+                <a:spcPct val="20000"/>
+              </a:spcBef>
+              <a:buFont typeface="Arial" pitchFamily="34" charset="0"/>
+              <a:buChar char="–"/>
+              <a:defRPr/>
+            </a:pPr>
+            <a:r>
+              <a:rPr lang="en-US" sz="2800" dirty="0" smtClean="0"/>
+              <a:t>Prefer low</a:t>
+            </a:r>
+          </a:p>
           <a:p>
             <a:pPr marL="342900" marR="0" lvl="0" indent="-342900" algn="l" defTabSz="914400" rtl="0" eaLnBrk="1" fontAlgn="auto" latinLnBrk="0" hangingPunct="1">
               <a:lnSpc>
@@ -8485,8 +8566,21 @@
               <a:defRPr/>
             </a:pPr>
             <a:r>
-              <a:rPr lang="en-US" sz="3200" dirty="0" smtClean="0"/>
-              <a:t>10 x as much load on the DHT</a:t>
+              <a:rPr kumimoji="0" lang="en-US" sz="3200" b="0" i="0" u="none" strike="noStrike" kern="1200" cap="none" spc="0" normalizeH="0" baseline="0" noProof="0" dirty="0" smtClean="0">
+                <a:ln>
+                  <a:noFill/>
+                </a:ln>
+                <a:solidFill>
+                  <a:schemeClr val="tx1"/>
+                </a:solidFill>
+                <a:effectLst/>
+                <a:uLnTx/>
+                <a:uFillTx/>
+                <a:latin typeface="+mn-lt"/>
+                <a:ea typeface="+mn-ea"/>
+                <a:cs typeface="+mn-cs"/>
+              </a:rPr>
+              <a:t>R: 160 KB/s</a:t>
             </a:r>
           </a:p>
           <a:p>
@@ -8508,8 +8602,347 @@
               <a:defRPr/>
             </a:pPr>
             <a:r>
+              <a:rPr kumimoji="0" lang="en-US" sz="3200" b="0" i="0" u="none" strike="noStrike" kern="1200" cap="none" spc="0" normalizeH="0" baseline="0" noProof="0" dirty="0" smtClean="0">
+                <a:ln>
+                  <a:noFill/>
+                </a:ln>
+                <a:solidFill>
+                  <a:schemeClr val="tx1"/>
+                </a:solidFill>
+                <a:effectLst/>
+                <a:uLnTx/>
+                <a:uFillTx/>
+                <a:latin typeface="+mn-lt"/>
+                <a:ea typeface="+mn-ea"/>
+                <a:cs typeface="+mn-cs"/>
+              </a:rPr>
+              <a:t>W: 0.25 s</a:t>
+            </a:r>
+          </a:p>
+          <a:p>
+            <a:pPr marL="742950" marR="0" lvl="1" indent="-285750" algn="l" defTabSz="914400" rtl="0" eaLnBrk="1" fontAlgn="auto" latinLnBrk="0" hangingPunct="1">
+              <a:lnSpc>
+                <a:spcPct val="100000"/>
+              </a:lnSpc>
+              <a:spcBef>
+                <a:spcPct val="20000"/>
+              </a:spcBef>
+              <a:spcAft>
+                <a:spcPts val="0"/>
+              </a:spcAft>
+              <a:buClrTx/>
+              <a:buSzTx/>
+              <a:buFont typeface="Arial" pitchFamily="34" charset="0"/>
+              <a:buChar char="–"/>
+              <a:tabLst/>
+              <a:defRPr/>
+            </a:pPr>
+            <a:r>
+              <a:rPr kumimoji="0" lang="en-US" sz="2800" b="0" i="0" u="none" strike="noStrike" kern="1200" cap="none" spc="0" normalizeH="0" baseline="0" noProof="0" dirty="0" smtClean="0">
+                <a:ln>
+                  <a:noFill/>
+                </a:ln>
+                <a:solidFill>
+                  <a:schemeClr val="tx1"/>
+                </a:solidFill>
+                <a:effectLst/>
+                <a:uLnTx/>
+                <a:uFillTx/>
+                <a:latin typeface="+mn-lt"/>
+                <a:ea typeface="+mn-ea"/>
+                <a:cs typeface="+mn-cs"/>
+              </a:rPr>
+              <a:t>Prefer low</a:t>
+            </a:r>
+          </a:p>
+          <a:p>
+            <a:pPr marL="342900" marR="0" lvl="0" indent="-342900" algn="l" defTabSz="914400" rtl="0" eaLnBrk="1" fontAlgn="auto" latinLnBrk="0" hangingPunct="1">
+              <a:lnSpc>
+                <a:spcPct val="100000"/>
+              </a:lnSpc>
+              <a:spcBef>
+                <a:spcPct val="20000"/>
+              </a:spcBef>
+              <a:spcAft>
+                <a:spcPts val="0"/>
+              </a:spcAft>
+              <a:buClrTx/>
+              <a:buSzTx/>
+              <a:buFont typeface="Arial" pitchFamily="34" charset="0"/>
+              <a:buChar char="•"/>
+              <a:tabLst/>
+              <a:defRPr/>
+            </a:pPr>
+            <a:r>
+              <a:rPr kumimoji="0" lang="en-US" sz="3200" b="0" i="0" u="none" strike="noStrike" kern="1200" cap="none" spc="0" normalizeH="0" baseline="0" noProof="0" dirty="0" smtClean="0">
+                <a:ln>
+                  <a:noFill/>
+                </a:ln>
+                <a:solidFill>
+                  <a:schemeClr val="tx1"/>
+                </a:solidFill>
+                <a:effectLst/>
+                <a:uLnTx/>
+                <a:uFillTx/>
+                <a:latin typeface="+mn-lt"/>
+                <a:ea typeface="+mn-ea"/>
+                <a:cs typeface="+mn-cs"/>
+              </a:rPr>
+              <a:t>Block size: 32 KB</a:t>
+            </a:r>
+          </a:p>
+          <a:p>
+            <a:pPr marL="742950" marR="0" lvl="1" indent="-285750" algn="l" defTabSz="914400" rtl="0" eaLnBrk="1" fontAlgn="auto" latinLnBrk="0" hangingPunct="1">
+              <a:lnSpc>
+                <a:spcPct val="100000"/>
+              </a:lnSpc>
+              <a:spcBef>
+                <a:spcPct val="20000"/>
+              </a:spcBef>
+              <a:spcAft>
+                <a:spcPts val="0"/>
+              </a:spcAft>
+              <a:buClrTx/>
+              <a:buSzTx/>
+              <a:buFont typeface="Arial" pitchFamily="34" charset="0"/>
+              <a:buChar char="–"/>
+              <a:tabLst/>
+              <a:defRPr/>
+            </a:pPr>
+            <a:r>
+              <a:rPr kumimoji="0" lang="en-US" sz="2800" b="0" i="0" u="none" strike="noStrike" kern="1200" cap="none" spc="0" normalizeH="0" baseline="0" noProof="0" dirty="0" smtClean="0">
+                <a:ln>
+                  <a:noFill/>
+                </a:ln>
+                <a:solidFill>
+                  <a:schemeClr val="tx1"/>
+                </a:solidFill>
+                <a:effectLst/>
+                <a:uLnTx/>
+                <a:uFillTx/>
+                <a:latin typeface="+mn-lt"/>
+                <a:ea typeface="+mn-ea"/>
+                <a:cs typeface="+mn-cs"/>
+              </a:rPr>
+              <a:t>Parallelize</a:t>
+            </a:r>
+          </a:p>
+          <a:p>
+            <a:pPr marL="342900" marR="0" lvl="0" indent="-342900" algn="l" defTabSz="914400" rtl="0" eaLnBrk="1" fontAlgn="auto" latinLnBrk="0" hangingPunct="1">
+              <a:lnSpc>
+                <a:spcPct val="100000"/>
+              </a:lnSpc>
+              <a:spcBef>
+                <a:spcPct val="20000"/>
+              </a:spcBef>
+              <a:spcAft>
+                <a:spcPts val="0"/>
+              </a:spcAft>
+              <a:buClrTx/>
+              <a:buSzTx/>
+              <a:buFont typeface="Arial" pitchFamily="34" charset="0"/>
+              <a:buChar char="•"/>
+              <a:tabLst/>
+              <a:defRPr/>
+            </a:pPr>
+            <a:r>
+              <a:rPr kumimoji="0" lang="en-US" sz="3200" b="0" i="0" u="none" strike="noStrike" kern="1200" cap="none" spc="0" normalizeH="0" baseline="0" noProof="0" dirty="0" smtClean="0">
+                <a:ln>
+                  <a:noFill/>
+                </a:ln>
+                <a:solidFill>
+                  <a:schemeClr val="tx1"/>
+                </a:solidFill>
+                <a:effectLst/>
+                <a:uLnTx/>
+                <a:uFillTx/>
+                <a:latin typeface="+mn-lt"/>
+                <a:ea typeface="+mn-ea"/>
+                <a:cs typeface="+mn-cs"/>
+              </a:rPr>
+              <a:t>Peer concurrency count: 16 +</a:t>
+            </a:r>
+          </a:p>
+        </p:txBody>
+      </p:sp>
+      <p:pic>
+        <p:nvPicPr>
+          <p:cNvPr id="5" name="Picture 4" descr="C:\rdp\dev\p2pwebclient\thesis_presentation\algorithm explanation.png"/>
+          <p:cNvPicPr>
+            <a:picLocks noChangeAspect="1" noChangeArrowheads="1"/>
+          </p:cNvPicPr>
+          <p:nvPr/>
+        </p:nvPicPr>
+        <p:blipFill>
+          <a:blip r:embed="rId2" cstate="print"/>
+          <a:srcRect/>
+          <a:stretch>
+            <a:fillRect/>
+          </a:stretch>
+        </p:blipFill>
+        <p:spPr bwMode="auto">
+          <a:xfrm>
+            <a:off x="3790204" y="1219200"/>
+            <a:ext cx="5246949" cy="3352800"/>
+          </a:xfrm>
+          <a:prstGeom prst="rect">
+            <a:avLst/>
+          </a:prstGeom>
+          <a:noFill/>
+        </p:spPr>
+      </p:pic>
+    </p:spTree>
+  </p:cSld>
+  <p:clrMapOvr>
+    <a:masterClrMapping/>
+  </p:clrMapOvr>
+</p:sld>
+</file>
+
+<file path=ppt/slides/slide26.xml><?xml version="1.0" encoding="utf-8"?>
+<p:sld xmlns:a="http://schemas.openxmlformats.org/drawingml/2006/main" xmlns:r="http://schemas.openxmlformats.org/officeDocument/2006/relationships" xmlns:p="http://schemas.openxmlformats.org/presentationml/2006/main">
+  <p:cSld>
+    <p:spTree>
+      <p:nvGrpSpPr>
+        <p:cNvPr id="1" name=""/>
+        <p:cNvGrpSpPr/>
+        <p:nvPr/>
+      </p:nvGrpSpPr>
+      <p:grpSpPr>
+        <a:xfrm>
+          <a:off x="0" y="0"/>
+          <a:ext cx="0" cy="0"/>
+          <a:chOff x="0" y="0"/>
+          <a:chExt cx="0" cy="0"/>
+        </a:xfrm>
+      </p:grpSpPr>
+      <p:sp>
+        <p:nvSpPr>
+          <p:cNvPr id="2" name="Title 1"/>
+          <p:cNvSpPr>
+            <a:spLocks noGrp="1"/>
+          </p:cNvSpPr>
+          <p:nvPr>
+            <p:ph type="title"/>
+          </p:nvPr>
+        </p:nvSpPr>
+        <p:spPr/>
+        <p:txBody>
+          <a:bodyPr/>
+          <a:lstStyle/>
+          <a:p>
+            <a:r>
+              <a:rPr lang="en-US" dirty="0" smtClean="0"/>
+              <a:t>Full Web Page</a:t>
+            </a:r>
+            <a:endParaRPr lang="en-US" dirty="0"/>
+          </a:p>
+        </p:txBody>
+      </p:sp>
+      <p:sp>
+        <p:nvSpPr>
+          <p:cNvPr id="5" name="Content Placeholder 2"/>
+          <p:cNvSpPr>
+            <a:spLocks noGrp="1"/>
+          </p:cNvSpPr>
+          <p:nvPr>
+            <p:ph idx="1"/>
+          </p:nvPr>
+        </p:nvSpPr>
+        <p:spPr>
+          <a:xfrm>
+            <a:off x="457200" y="1600200"/>
+            <a:ext cx="8229600" cy="4525963"/>
+          </a:xfrm>
+        </p:spPr>
+        <p:txBody>
+          <a:bodyPr>
+            <a:normAutofit/>
+          </a:bodyPr>
+          <a:lstStyle/>
+          <a:p>
+            <a:r>
+              <a:rPr lang="en-US" dirty="0" smtClean="0"/>
+              <a:t>100 KB file, 10 10K files</a:t>
+            </a:r>
+            <a:endParaRPr lang="en-US" dirty="0"/>
+          </a:p>
+        </p:txBody>
+      </p:sp>
+      <p:sp>
+        <p:nvSpPr>
+          <p:cNvPr id="6" name="Content Placeholder 2"/>
+          <p:cNvSpPr txBox="1">
+            <a:spLocks/>
+          </p:cNvSpPr>
+          <p:nvPr/>
+        </p:nvSpPr>
+        <p:spPr>
+          <a:xfrm>
+            <a:off x="533400" y="5608637"/>
+            <a:ext cx="8229600" cy="1249363"/>
+          </a:xfrm>
+          <a:prstGeom prst="rect">
+            <a:avLst/>
+          </a:prstGeom>
+        </p:spPr>
+        <p:txBody>
+          <a:bodyPr vert="horz" lIns="91440" tIns="45720" rIns="91440" bIns="45720" rtlCol="0">
+            <a:normAutofit/>
+          </a:bodyPr>
+          <a:lstStyle/>
+          <a:p>
+            <a:pPr marL="342900" marR="0" lvl="0" indent="-342900" algn="l" defTabSz="914400" rtl="0" eaLnBrk="1" fontAlgn="auto" latinLnBrk="0" hangingPunct="1">
+              <a:lnSpc>
+                <a:spcPct val="100000"/>
+              </a:lnSpc>
+              <a:spcBef>
+                <a:spcPct val="20000"/>
+              </a:spcBef>
+              <a:spcAft>
+                <a:spcPts val="0"/>
+              </a:spcAft>
+              <a:buClrTx/>
+              <a:buSzTx/>
+              <a:buFont typeface="Arial" pitchFamily="34" charset="0"/>
+              <a:buChar char="•"/>
+              <a:tabLst/>
+              <a:defRPr/>
+            </a:pPr>
+            <a:r>
               <a:rPr lang="en-US" sz="3200" dirty="0" smtClean="0"/>
-              <a:t>Linger time was set to 20 seconds</a:t>
+              <a:t>10 x as much load on the DHT</a:t>
+            </a:r>
+          </a:p>
+          <a:p>
+            <a:pPr marL="342900" marR="0" lvl="0" indent="-342900" algn="l" defTabSz="914400" rtl="0" eaLnBrk="1" fontAlgn="auto" latinLnBrk="0" hangingPunct="1">
+              <a:lnSpc>
+                <a:spcPct val="100000"/>
+              </a:lnSpc>
+              <a:spcBef>
+                <a:spcPct val="20000"/>
+              </a:spcBef>
+              <a:spcAft>
+                <a:spcPts val="0"/>
+              </a:spcAft>
+              <a:buClrTx/>
+              <a:buSzTx/>
+              <a:buFont typeface="Arial" pitchFamily="34" charset="0"/>
+              <a:buChar char="•"/>
+              <a:tabLst/>
+              <a:defRPr/>
+            </a:pPr>
+            <a:r>
+              <a:rPr lang="en-US" sz="3200" dirty="0" smtClean="0"/>
+              <a:t>Linger time </a:t>
+            </a:r>
+            <a:r>
+              <a:rPr lang="en-US" sz="3200" dirty="0" smtClean="0"/>
+              <a:t>20 </a:t>
+            </a:r>
+            <a:r>
+              <a:rPr lang="en-US" sz="3200" dirty="0" smtClean="0"/>
+              <a:t>seconds</a:t>
             </a:r>
             <a:endParaRPr kumimoji="0" lang="en-US" sz="3200" b="0" i="0" u="none" strike="noStrike" kern="1200" cap="none" spc="0" normalizeH="0" baseline="0" noProof="0" dirty="0" smtClean="0">
               <a:ln>
@@ -8575,7 +9008,7 @@
 </p:sld>
 </file>
 
-<file path=ppt/slides/slide26.xml><?xml version="1.0" encoding="utf-8"?>
+<file path=ppt/slides/slide27.xml><?xml version="1.0" encoding="utf-8"?>
 <p:sld xmlns:a="http://schemas.openxmlformats.org/drawingml/2006/main" xmlns:r="http://schemas.openxmlformats.org/officeDocument/2006/relationships" xmlns:p="http://schemas.openxmlformats.org/presentationml/2006/main">
   <p:cSld>
     <p:spTree>
@@ -8692,7 +9125,7 @@
 </p:sld>
 </file>
 
-<file path=ppt/slides/slide27.xml><?xml version="1.0" encoding="utf-8"?>
+<file path=ppt/slides/slide28.xml><?xml version="1.0" encoding="utf-8"?>
 <p:sld xmlns:a="http://schemas.openxmlformats.org/drawingml/2006/main" xmlns:r="http://schemas.openxmlformats.org/officeDocument/2006/relationships" xmlns:p="http://schemas.openxmlformats.org/presentationml/2006/main">
   <p:cSld>
     <p:spTree>
@@ -8781,7 +9214,7 @@
 </p:sld>
 </file>
 
-<file path=ppt/slides/slide28.xml><?xml version="1.0" encoding="utf-8"?>
+<file path=ppt/slides/slide29.xml><?xml version="1.0" encoding="utf-8"?>
 <p:sld xmlns:a="http://schemas.openxmlformats.org/drawingml/2006/main" xmlns:r="http://schemas.openxmlformats.org/officeDocument/2006/relationships" xmlns:p="http://schemas.openxmlformats.org/presentationml/2006/main">
   <p:cSld>
     <p:spTree>
@@ -8978,104 +9411,6 @@
           </a:ln>
         </p:spPr>
       </p:pic>
-    </p:spTree>
-  </p:cSld>
-  <p:clrMapOvr>
-    <a:masterClrMapping/>
-  </p:clrMapOvr>
-  <p:timing>
-    <p:tnLst>
-      <p:par>
-        <p:cTn id="1" dur="indefinite" restart="never" nodeType="tmRoot"/>
-      </p:par>
-    </p:tnLst>
-  </p:timing>
-</p:sld>
-</file>
-
-<file path=ppt/slides/slide29.xml><?xml version="1.0" encoding="utf-8"?>
-<p:sld xmlns:a="http://schemas.openxmlformats.org/drawingml/2006/main" xmlns:r="http://schemas.openxmlformats.org/officeDocument/2006/relationships" xmlns:p="http://schemas.openxmlformats.org/presentationml/2006/main">
-  <p:cSld>
-    <p:spTree>
-      <p:nvGrpSpPr>
-        <p:cNvPr id="1" name=""/>
-        <p:cNvGrpSpPr/>
-        <p:nvPr/>
-      </p:nvGrpSpPr>
-      <p:grpSpPr>
-        <a:xfrm>
-          <a:off x="0" y="0"/>
-          <a:ext cx="0" cy="0"/>
-          <a:chOff x="0" y="0"/>
-          <a:chExt cx="0" cy="0"/>
-        </a:xfrm>
-      </p:grpSpPr>
-      <p:sp>
-        <p:nvSpPr>
-          <p:cNvPr id="2" name="Title 1"/>
-          <p:cNvSpPr>
-            <a:spLocks noGrp="1"/>
-          </p:cNvSpPr>
-          <p:nvPr>
-            <p:ph type="title"/>
-          </p:nvPr>
-        </p:nvSpPr>
-        <p:spPr/>
-        <p:txBody>
-          <a:bodyPr>
-            <a:normAutofit fontScale="90000"/>
-          </a:bodyPr>
-          <a:lstStyle/>
-          <a:p>
-            <a:r>
-              <a:rPr lang="en-US" dirty="0" smtClean="0"/>
-              <a:t>BitTorrent’s Large File Optimizations</a:t>
-            </a:r>
-            <a:endParaRPr lang="en-US" dirty="0"/>
-          </a:p>
-        </p:txBody>
-      </p:sp>
-      <p:sp>
-        <p:nvSpPr>
-          <p:cNvPr id="3" name="Content Placeholder 2"/>
-          <p:cNvSpPr>
-            <a:spLocks noGrp="1"/>
-          </p:cNvSpPr>
-          <p:nvPr>
-            <p:ph idx="1"/>
-          </p:nvPr>
-        </p:nvSpPr>
-        <p:spPr/>
-        <p:txBody>
-          <a:bodyPr/>
-          <a:lstStyle/>
-          <a:p>
-            <a:r>
-              <a:rPr lang="en-US" dirty="0" smtClean="0"/>
-              <a:t>Seeds limit outgoing connections</a:t>
-            </a:r>
-          </a:p>
-          <a:p>
-            <a:r>
-              <a:rPr lang="en-US" dirty="0" smtClean="0"/>
-              <a:t>Favors stronger connections</a:t>
-            </a:r>
-          </a:p>
-          <a:p>
-            <a:r>
-              <a:rPr lang="en-US" dirty="0" smtClean="0"/>
-              <a:t>Dedicated tracker</a:t>
-            </a:r>
-          </a:p>
-          <a:p>
-            <a:r>
-              <a:rPr lang="en-US" dirty="0" smtClean="0"/>
-              <a:t>Rarest Block First</a:t>
-            </a:r>
-            <a:endParaRPr lang="en-US" dirty="0"/>
-          </a:p>
-        </p:txBody>
-      </p:sp>
     </p:spTree>
   </p:cSld>
   <p:clrMapOvr>
@@ -9342,72 +9677,57 @@
         </p:nvSpPr>
         <p:spPr/>
         <p:txBody>
+          <a:bodyPr>
+            <a:normAutofit fontScale="90000"/>
+          </a:bodyPr>
+          <a:lstStyle/>
+          <a:p>
+            <a:r>
+              <a:rPr lang="en-US" dirty="0" smtClean="0"/>
+              <a:t>BitTorrent’s Large File Optimizations</a:t>
+            </a:r>
+            <a:endParaRPr lang="en-US" dirty="0"/>
+          </a:p>
+        </p:txBody>
+      </p:sp>
+      <p:sp>
+        <p:nvSpPr>
+          <p:cNvPr id="3" name="Content Placeholder 2"/>
+          <p:cNvSpPr>
+            <a:spLocks noGrp="1"/>
+          </p:cNvSpPr>
+          <p:nvPr>
+            <p:ph idx="1"/>
+          </p:nvPr>
+        </p:nvSpPr>
+        <p:spPr/>
+        <p:txBody>
           <a:bodyPr/>
           <a:lstStyle/>
           <a:p>
             <a:r>
               <a:rPr lang="en-US" dirty="0" smtClean="0"/>
-              <a:t>Conclusion</a:t>
+              <a:t>Seeds limit outgoing connections</a:t>
+            </a:r>
+          </a:p>
+          <a:p>
+            <a:r>
+              <a:rPr lang="en-US" dirty="0" smtClean="0"/>
+              <a:t>Favors stronger connections</a:t>
+            </a:r>
+          </a:p>
+          <a:p>
+            <a:r>
+              <a:rPr lang="en-US" dirty="0" smtClean="0"/>
+              <a:t>Dedicated tracker</a:t>
+            </a:r>
+          </a:p>
+          <a:p>
+            <a:r>
+              <a:rPr lang="en-US" dirty="0" smtClean="0"/>
+              <a:t>Rarest Block First</a:t>
             </a:r>
             <a:endParaRPr lang="en-US" dirty="0"/>
-          </a:p>
-        </p:txBody>
-      </p:sp>
-      <p:sp>
-        <p:nvSpPr>
-          <p:cNvPr id="3" name="Content Placeholder 2"/>
-          <p:cNvSpPr>
-            <a:spLocks noGrp="1"/>
-          </p:cNvSpPr>
-          <p:nvPr>
-            <p:ph idx="1"/>
-          </p:nvPr>
-        </p:nvSpPr>
-        <p:spPr/>
-        <p:txBody>
-          <a:bodyPr>
-            <a:normAutofit/>
-          </a:bodyPr>
-          <a:lstStyle/>
-          <a:p>
-            <a:r>
-              <a:rPr lang="en-US" dirty="0" smtClean="0"/>
-              <a:t>Feasible transition to Peer-to-Peer download</a:t>
-            </a:r>
-          </a:p>
-          <a:p>
-            <a:r>
-              <a:rPr lang="en-US" smtClean="0"/>
-              <a:t>30x </a:t>
-            </a:r>
-            <a:r>
-              <a:rPr lang="en-US" dirty="0" smtClean="0"/>
-              <a:t>as fast for small files (flash crowd)</a:t>
-            </a:r>
-          </a:p>
-          <a:p>
-            <a:r>
-              <a:rPr lang="en-US" dirty="0" smtClean="0"/>
-              <a:t>20x as fast for web pages</a:t>
-            </a:r>
-          </a:p>
-          <a:p>
-            <a:r>
-              <a:rPr lang="en-US" dirty="0" smtClean="0"/>
-              <a:t>Reduces load on the server</a:t>
-            </a:r>
-          </a:p>
-          <a:p>
-            <a:r>
-              <a:rPr lang="en-US" dirty="0" smtClean="0"/>
-              <a:t>Make swarming more usable/adoptable</a:t>
-            </a:r>
-          </a:p>
-          <a:p>
-            <a:pPr lvl="1">
-              <a:buNone/>
-            </a:pPr>
-            <a:endParaRPr lang="en-US" dirty="0" smtClean="0"/>
           </a:p>
         </p:txBody>
       </p:sp>
@@ -9460,7 +9780,7 @@
           <a:p>
             <a:r>
               <a:rPr lang="en-US" dirty="0" smtClean="0"/>
-              <a:t>Automatic Swarming -- Goals</a:t>
+              <a:t>Conclusion</a:t>
             </a:r>
             <a:endParaRPr lang="en-US" dirty="0"/>
           </a:p>
@@ -9478,37 +9798,49 @@
         </p:nvSpPr>
         <p:spPr/>
         <p:txBody>
-          <a:bodyPr/>
-          <a:lstStyle/>
-          <a:p>
-            <a:r>
-              <a:rPr lang="en-US" dirty="0" smtClean="0"/>
-              <a:t>Work for any file on any server without configuration</a:t>
-            </a:r>
-          </a:p>
-          <a:p>
-            <a:r>
-              <a:rPr lang="en-US" dirty="0" smtClean="0"/>
-              <a:t>Easy for client use</a:t>
-            </a:r>
-          </a:p>
-          <a:p>
-            <a:r>
-              <a:rPr lang="en-US" dirty="0" smtClean="0"/>
-              <a:t>No extra dedicated hardware</a:t>
-            </a:r>
-          </a:p>
-          <a:p>
-            <a:r>
-              <a:rPr lang="en-US" dirty="0" smtClean="0"/>
-              <a:t>Work for small files</a:t>
-            </a:r>
-          </a:p>
-          <a:p>
-            <a:r>
-              <a:rPr lang="en-US" dirty="0" smtClean="0"/>
-              <a:t>Non intrusive</a:t>
-            </a:r>
+          <a:bodyPr>
+            <a:normAutofit/>
+          </a:bodyPr>
+          <a:lstStyle/>
+          <a:p>
+            <a:r>
+              <a:rPr lang="en-US" dirty="0" smtClean="0"/>
+              <a:t>Feasible transition to Peer-to-Peer download</a:t>
+            </a:r>
+          </a:p>
+          <a:p>
+            <a:r>
+              <a:rPr lang="en-US" smtClean="0"/>
+              <a:t>30x </a:t>
+            </a:r>
+            <a:r>
+              <a:rPr lang="en-US" dirty="0" smtClean="0"/>
+              <a:t>as fast for small files (flash crowd)</a:t>
+            </a:r>
+          </a:p>
+          <a:p>
+            <a:r>
+              <a:rPr lang="en-US" dirty="0" smtClean="0"/>
+              <a:t>20x as fast for web pages</a:t>
+            </a:r>
+          </a:p>
+          <a:p>
+            <a:r>
+              <a:rPr lang="en-US" dirty="0" smtClean="0"/>
+              <a:t>Reduces load on the server</a:t>
+            </a:r>
+          </a:p>
+          <a:p>
+            <a:r>
+              <a:rPr lang="en-US" dirty="0" smtClean="0"/>
+              <a:t>Make swarming more usable/adoptable</a:t>
+            </a:r>
+          </a:p>
+          <a:p>
+            <a:pPr lvl="1">
+              <a:buNone/>
+            </a:pPr>
+            <a:endParaRPr lang="en-US" dirty="0" smtClean="0"/>
           </a:p>
         </p:txBody>
       </p:sp>
@@ -9561,7 +9893,7 @@
           <a:p>
             <a:r>
               <a:rPr lang="en-US" dirty="0" smtClean="0"/>
-              <a:t>Future Work</a:t>
+              <a:t>Automatic Swarming -- Goals</a:t>
             </a:r>
             <a:endParaRPr lang="en-US" dirty="0"/>
           </a:p>
@@ -9579,60 +9911,36 @@
         </p:nvSpPr>
         <p:spPr/>
         <p:txBody>
-          <a:bodyPr>
-            <a:normAutofit fontScale="92500" lnSpcReduction="10000"/>
-          </a:bodyPr>
-          <a:lstStyle/>
-          <a:p>
-            <a:r>
-              <a:rPr lang="en-US" dirty="0" smtClean="0"/>
-              <a:t>Improve DHT performance</a:t>
-            </a:r>
-          </a:p>
-          <a:p>
-            <a:r>
-              <a:rPr lang="en-US" dirty="0" smtClean="0"/>
-              <a:t>Improve automatic swarming for large files</a:t>
-            </a:r>
-          </a:p>
-          <a:p>
-            <a:r>
-              <a:rPr lang="en-US" dirty="0" smtClean="0"/>
-              <a:t>General performance tuning and dynamic selection of parameters</a:t>
-            </a:r>
-          </a:p>
-          <a:p>
-            <a:pPr lvl="1"/>
-            <a:r>
-              <a:rPr lang="en-US" dirty="0" smtClean="0"/>
-              <a:t>Better use of the DHT</a:t>
-            </a:r>
-          </a:p>
-          <a:p>
-            <a:pPr lvl="1"/>
-            <a:r>
-              <a:rPr lang="en-US" dirty="0" smtClean="0"/>
-              <a:t>Staleness</a:t>
-            </a:r>
-          </a:p>
-          <a:p>
-            <a:r>
-              <a:rPr lang="en-US" dirty="0" smtClean="0"/>
-              <a:t>BitTorrent features</a:t>
-            </a:r>
-          </a:p>
-          <a:p>
-            <a:pPr lvl="1"/>
-            <a:r>
-              <a:rPr lang="en-US" dirty="0" smtClean="0"/>
-              <a:t>Validate Integrity</a:t>
-            </a:r>
-          </a:p>
-          <a:p>
-            <a:pPr lvl="1"/>
-            <a:r>
-              <a:rPr lang="en-US" dirty="0" smtClean="0"/>
-              <a:t>Incentives</a:t>
+          <a:bodyPr/>
+          <a:lstStyle/>
+          <a:p>
+            <a:r>
+              <a:rPr lang="en-US" dirty="0" smtClean="0"/>
+              <a:t>Work for any file on any server without configuration</a:t>
+            </a:r>
+          </a:p>
+          <a:p>
+            <a:r>
+              <a:rPr lang="en-US" dirty="0" smtClean="0"/>
+              <a:t>Easy for client use</a:t>
+            </a:r>
+          </a:p>
+          <a:p>
+            <a:r>
+              <a:rPr lang="en-US" dirty="0" smtClean="0"/>
+              <a:t>No extra dedicated hardware</a:t>
+            </a:r>
+          </a:p>
+          <a:p>
+            <a:r>
+              <a:rPr lang="en-US" dirty="0" smtClean="0"/>
+              <a:t>Work for small files</a:t>
+            </a:r>
+          </a:p>
+          <a:p>
+            <a:r>
+              <a:rPr lang="en-US" dirty="0" smtClean="0"/>
+              <a:t>Non intrusive</a:t>
             </a:r>
           </a:p>
         </p:txBody>
@@ -9653,6 +9961,131 @@
 </file>
 
 <file path=ppt/slides/slide33.xml><?xml version="1.0" encoding="utf-8"?>
+<p:sld xmlns:a="http://schemas.openxmlformats.org/drawingml/2006/main" xmlns:r="http://schemas.openxmlformats.org/officeDocument/2006/relationships" xmlns:p="http://schemas.openxmlformats.org/presentationml/2006/main">
+  <p:cSld>
+    <p:spTree>
+      <p:nvGrpSpPr>
+        <p:cNvPr id="1" name=""/>
+        <p:cNvGrpSpPr/>
+        <p:nvPr/>
+      </p:nvGrpSpPr>
+      <p:grpSpPr>
+        <a:xfrm>
+          <a:off x="0" y="0"/>
+          <a:ext cx="0" cy="0"/>
+          <a:chOff x="0" y="0"/>
+          <a:chExt cx="0" cy="0"/>
+        </a:xfrm>
+      </p:grpSpPr>
+      <p:sp>
+        <p:nvSpPr>
+          <p:cNvPr id="2" name="Title 1"/>
+          <p:cNvSpPr>
+            <a:spLocks noGrp="1"/>
+          </p:cNvSpPr>
+          <p:nvPr>
+            <p:ph type="title"/>
+          </p:nvPr>
+        </p:nvSpPr>
+        <p:spPr/>
+        <p:txBody>
+          <a:bodyPr/>
+          <a:lstStyle/>
+          <a:p>
+            <a:r>
+              <a:rPr lang="en-US" dirty="0" smtClean="0"/>
+              <a:t>Future Work</a:t>
+            </a:r>
+            <a:endParaRPr lang="en-US" dirty="0"/>
+          </a:p>
+        </p:txBody>
+      </p:sp>
+      <p:sp>
+        <p:nvSpPr>
+          <p:cNvPr id="3" name="Content Placeholder 2"/>
+          <p:cNvSpPr>
+            <a:spLocks noGrp="1"/>
+          </p:cNvSpPr>
+          <p:nvPr>
+            <p:ph idx="1"/>
+          </p:nvPr>
+        </p:nvSpPr>
+        <p:spPr/>
+        <p:txBody>
+          <a:bodyPr>
+            <a:normAutofit fontScale="92500" lnSpcReduction="10000"/>
+          </a:bodyPr>
+          <a:lstStyle/>
+          <a:p>
+            <a:r>
+              <a:rPr lang="en-US" dirty="0" smtClean="0"/>
+              <a:t>Improve DHT performance</a:t>
+            </a:r>
+          </a:p>
+          <a:p>
+            <a:r>
+              <a:rPr lang="en-US" dirty="0" smtClean="0"/>
+              <a:t>Improve automatic swarming for large files</a:t>
+            </a:r>
+          </a:p>
+          <a:p>
+            <a:r>
+              <a:rPr lang="en-US" dirty="0" smtClean="0"/>
+              <a:t>General performance tuning and dynamic selection of parameters</a:t>
+            </a:r>
+          </a:p>
+          <a:p>
+            <a:pPr lvl="1"/>
+            <a:r>
+              <a:rPr lang="en-US" dirty="0" smtClean="0"/>
+              <a:t>Better use of the DHT</a:t>
+            </a:r>
+          </a:p>
+          <a:p>
+            <a:pPr lvl="1"/>
+            <a:r>
+              <a:rPr lang="en-US" dirty="0" smtClean="0"/>
+              <a:t>Staleness</a:t>
+            </a:r>
+          </a:p>
+          <a:p>
+            <a:r>
+              <a:rPr lang="en-US" dirty="0" smtClean="0"/>
+              <a:t>BitTorrent features</a:t>
+            </a:r>
+          </a:p>
+          <a:p>
+            <a:pPr lvl="1"/>
+            <a:r>
+              <a:rPr lang="en-US" dirty="0" smtClean="0"/>
+              <a:t>Validate Integrity</a:t>
+            </a:r>
+          </a:p>
+          <a:p>
+            <a:pPr lvl="1"/>
+            <a:r>
+              <a:rPr lang="en-US" dirty="0" smtClean="0"/>
+              <a:t>Incentives</a:t>
+            </a:r>
+          </a:p>
+        </p:txBody>
+      </p:sp>
+    </p:spTree>
+  </p:cSld>
+  <p:clrMapOvr>
+    <a:masterClrMapping/>
+  </p:clrMapOvr>
+  <p:timing>
+    <p:tnLst>
+      <p:par>
+        <p:cTn id="1" dur="indefinite" restart="never" nodeType="tmRoot"/>
+      </p:par>
+    </p:tnLst>
+  </p:timing>
+</p:sld>
+</file>
+
+<file path=ppt/slides/slide34.xml><?xml version="1.0" encoding="utf-8"?>
 <p:sld xmlns:a="http://schemas.openxmlformats.org/drawingml/2006/main" xmlns:r="http://schemas.openxmlformats.org/officeDocument/2006/relationships" xmlns:p="http://schemas.openxmlformats.org/presentationml/2006/main">
   <p:cSld>
     <p:spTree>

</xml_diff>